<commit_message>
Worked on the measurement and processor design chapters, incorporated Daniel's revised version of the introduction. Added figures to the chapter on Grover's algorithm to compare the algorithm to a classical search algorithm.
</commit_message>
<xml_diff>
--- a/material/figures/2-qubit-processor/measurement setup.pptx
+++ b/material/figures/2-qubit-processor/measurement setup.pptx
@@ -288,7 +288,8 @@
           <a:p>
             <a:fld id="{B9E39FB9-1184-4BFA-89AE-DC8B5833E156}" type="datetimeFigureOut">
               <a:rPr lang="de-DE" smtClean="0"/>
-              <a:t>16.03.2012</a:t>
+              <a:pPr/>
+              <a:t>11.06.2012</a:t>
             </a:fld>
             <a:endParaRPr lang="de-DE"/>
           </a:p>
@@ -330,6 +331,7 @@
           <a:p>
             <a:fld id="{17B8F9D7-AB2A-4F7B-BDB6-FB2C9DD2B742}" type="slidenum">
               <a:rPr lang="de-DE" smtClean="0"/>
+              <a:pPr/>
               <a:t>‹Nr.›</a:t>
             </a:fld>
             <a:endParaRPr lang="de-DE"/>
@@ -453,7 +455,8 @@
           <a:p>
             <a:fld id="{B9E39FB9-1184-4BFA-89AE-DC8B5833E156}" type="datetimeFigureOut">
               <a:rPr lang="de-DE" smtClean="0"/>
-              <a:t>16.03.2012</a:t>
+              <a:pPr/>
+              <a:t>11.06.2012</a:t>
             </a:fld>
             <a:endParaRPr lang="de-DE"/>
           </a:p>
@@ -495,6 +498,7 @@
           <a:p>
             <a:fld id="{17B8F9D7-AB2A-4F7B-BDB6-FB2C9DD2B742}" type="slidenum">
               <a:rPr lang="de-DE" smtClean="0"/>
+              <a:pPr/>
               <a:t>‹Nr.›</a:t>
             </a:fld>
             <a:endParaRPr lang="de-DE"/>
@@ -628,7 +632,8 @@
           <a:p>
             <a:fld id="{B9E39FB9-1184-4BFA-89AE-DC8B5833E156}" type="datetimeFigureOut">
               <a:rPr lang="de-DE" smtClean="0"/>
-              <a:t>16.03.2012</a:t>
+              <a:pPr/>
+              <a:t>11.06.2012</a:t>
             </a:fld>
             <a:endParaRPr lang="de-DE"/>
           </a:p>
@@ -670,6 +675,7 @@
           <a:p>
             <a:fld id="{17B8F9D7-AB2A-4F7B-BDB6-FB2C9DD2B742}" type="slidenum">
               <a:rPr lang="de-DE" smtClean="0"/>
+              <a:pPr/>
               <a:t>‹Nr.›</a:t>
             </a:fld>
             <a:endParaRPr lang="de-DE"/>
@@ -793,7 +799,8 @@
           <a:p>
             <a:fld id="{B9E39FB9-1184-4BFA-89AE-DC8B5833E156}" type="datetimeFigureOut">
               <a:rPr lang="de-DE" smtClean="0"/>
-              <a:t>16.03.2012</a:t>
+              <a:pPr/>
+              <a:t>11.06.2012</a:t>
             </a:fld>
             <a:endParaRPr lang="de-DE"/>
           </a:p>
@@ -835,6 +842,7 @@
           <a:p>
             <a:fld id="{17B8F9D7-AB2A-4F7B-BDB6-FB2C9DD2B742}" type="slidenum">
               <a:rPr lang="de-DE" smtClean="0"/>
+              <a:pPr/>
               <a:t>‹Nr.›</a:t>
             </a:fld>
             <a:endParaRPr lang="de-DE"/>
@@ -1034,7 +1042,8 @@
           <a:p>
             <a:fld id="{B9E39FB9-1184-4BFA-89AE-DC8B5833E156}" type="datetimeFigureOut">
               <a:rPr lang="de-DE" smtClean="0"/>
-              <a:t>16.03.2012</a:t>
+              <a:pPr/>
+              <a:t>11.06.2012</a:t>
             </a:fld>
             <a:endParaRPr lang="de-DE"/>
           </a:p>
@@ -1076,6 +1085,7 @@
           <a:p>
             <a:fld id="{17B8F9D7-AB2A-4F7B-BDB6-FB2C9DD2B742}" type="slidenum">
               <a:rPr lang="de-DE" smtClean="0"/>
+              <a:pPr/>
               <a:t>‹Nr.›</a:t>
             </a:fld>
             <a:endParaRPr lang="de-DE"/>
@@ -1317,7 +1327,8 @@
           <a:p>
             <a:fld id="{B9E39FB9-1184-4BFA-89AE-DC8B5833E156}" type="datetimeFigureOut">
               <a:rPr lang="de-DE" smtClean="0"/>
-              <a:t>16.03.2012</a:t>
+              <a:pPr/>
+              <a:t>11.06.2012</a:t>
             </a:fld>
             <a:endParaRPr lang="de-DE"/>
           </a:p>
@@ -1359,6 +1370,7 @@
           <a:p>
             <a:fld id="{17B8F9D7-AB2A-4F7B-BDB6-FB2C9DD2B742}" type="slidenum">
               <a:rPr lang="de-DE" smtClean="0"/>
+              <a:pPr/>
               <a:t>‹Nr.›</a:t>
             </a:fld>
             <a:endParaRPr lang="de-DE"/>
@@ -1734,7 +1746,8 @@
           <a:p>
             <a:fld id="{B9E39FB9-1184-4BFA-89AE-DC8B5833E156}" type="datetimeFigureOut">
               <a:rPr lang="de-DE" smtClean="0"/>
-              <a:t>16.03.2012</a:t>
+              <a:pPr/>
+              <a:t>11.06.2012</a:t>
             </a:fld>
             <a:endParaRPr lang="de-DE"/>
           </a:p>
@@ -1776,6 +1789,7 @@
           <a:p>
             <a:fld id="{17B8F9D7-AB2A-4F7B-BDB6-FB2C9DD2B742}" type="slidenum">
               <a:rPr lang="de-DE" smtClean="0"/>
+              <a:pPr/>
               <a:t>‹Nr.›</a:t>
             </a:fld>
             <a:endParaRPr lang="de-DE"/>
@@ -1847,7 +1861,8 @@
           <a:p>
             <a:fld id="{B9E39FB9-1184-4BFA-89AE-DC8B5833E156}" type="datetimeFigureOut">
               <a:rPr lang="de-DE" smtClean="0"/>
-              <a:t>16.03.2012</a:t>
+              <a:pPr/>
+              <a:t>11.06.2012</a:t>
             </a:fld>
             <a:endParaRPr lang="de-DE"/>
           </a:p>
@@ -1889,6 +1904,7 @@
           <a:p>
             <a:fld id="{17B8F9D7-AB2A-4F7B-BDB6-FB2C9DD2B742}" type="slidenum">
               <a:rPr lang="de-DE" smtClean="0"/>
+              <a:pPr/>
               <a:t>‹Nr.›</a:t>
             </a:fld>
             <a:endParaRPr lang="de-DE"/>
@@ -1937,7 +1953,8 @@
           <a:p>
             <a:fld id="{B9E39FB9-1184-4BFA-89AE-DC8B5833E156}" type="datetimeFigureOut">
               <a:rPr lang="de-DE" smtClean="0"/>
-              <a:t>16.03.2012</a:t>
+              <a:pPr/>
+              <a:t>11.06.2012</a:t>
             </a:fld>
             <a:endParaRPr lang="de-DE"/>
           </a:p>
@@ -1979,6 +1996,7 @@
           <a:p>
             <a:fld id="{17B8F9D7-AB2A-4F7B-BDB6-FB2C9DD2B742}" type="slidenum">
               <a:rPr lang="de-DE" smtClean="0"/>
+              <a:pPr/>
               <a:t>‹Nr.›</a:t>
             </a:fld>
             <a:endParaRPr lang="de-DE"/>
@@ -2209,7 +2227,8 @@
           <a:p>
             <a:fld id="{B9E39FB9-1184-4BFA-89AE-DC8B5833E156}" type="datetimeFigureOut">
               <a:rPr lang="de-DE" smtClean="0"/>
-              <a:t>16.03.2012</a:t>
+              <a:pPr/>
+              <a:t>11.06.2012</a:t>
             </a:fld>
             <a:endParaRPr lang="de-DE"/>
           </a:p>
@@ -2251,6 +2270,7 @@
           <a:p>
             <a:fld id="{17B8F9D7-AB2A-4F7B-BDB6-FB2C9DD2B742}" type="slidenum">
               <a:rPr lang="de-DE" smtClean="0"/>
+              <a:pPr/>
               <a:t>‹Nr.›</a:t>
             </a:fld>
             <a:endParaRPr lang="de-DE"/>
@@ -2457,7 +2477,8 @@
           <a:p>
             <a:fld id="{B9E39FB9-1184-4BFA-89AE-DC8B5833E156}" type="datetimeFigureOut">
               <a:rPr lang="de-DE" smtClean="0"/>
-              <a:t>16.03.2012</a:t>
+              <a:pPr/>
+              <a:t>11.06.2012</a:t>
             </a:fld>
             <a:endParaRPr lang="de-DE"/>
           </a:p>
@@ -2499,6 +2520,7 @@
           <a:p>
             <a:fld id="{17B8F9D7-AB2A-4F7B-BDB6-FB2C9DD2B742}" type="slidenum">
               <a:rPr lang="de-DE" smtClean="0"/>
+              <a:pPr/>
               <a:t>‹Nr.›</a:t>
             </a:fld>
             <a:endParaRPr lang="de-DE"/>
@@ -2665,7 +2687,8 @@
           <a:p>
             <a:fld id="{B9E39FB9-1184-4BFA-89AE-DC8B5833E156}" type="datetimeFigureOut">
               <a:rPr lang="de-DE" smtClean="0"/>
-              <a:t>16.03.2012</a:t>
+              <a:pPr/>
+              <a:t>11.06.2012</a:t>
             </a:fld>
             <a:endParaRPr lang="de-DE"/>
           </a:p>
@@ -2743,6 +2766,7 @@
           <a:p>
             <a:fld id="{17B8F9D7-AB2A-4F7B-BDB6-FB2C9DD2B742}" type="slidenum">
               <a:rPr lang="de-DE" smtClean="0"/>
+              <a:pPr/>
               <a:t>‹Nr.›</a:t>
             </a:fld>
             <a:endParaRPr lang="de-DE"/>
@@ -3113,7 +3137,7 @@
               </a:path>
             </a:pathLst>
           </a:custGeom>
-          <a:ln w="28575">
+          <a:ln w="12700">
             <a:solidFill>
               <a:schemeClr val="tx1"/>
             </a:solidFill>
@@ -3220,7 +3244,7 @@
               </a:path>
             </a:pathLst>
           </a:custGeom>
-          <a:ln w="28575">
+          <a:ln w="12700">
             <a:solidFill>
               <a:schemeClr val="tx1"/>
             </a:solidFill>
@@ -3266,7 +3290,7 @@
             <a:avLst/>
           </a:prstGeom>
           <a:noFill/>
-          <a:ln w="9525">
+          <a:ln w="12700">
             <a:solidFill>
               <a:srgbClr val="00B050"/>
             </a:solidFill>
@@ -3301,7 +3325,7 @@
             <a:avLst/>
           </a:prstGeom>
           <a:noFill/>
-          <a:ln w="9525">
+          <a:ln w="12700">
             <a:solidFill>
               <a:srgbClr val="00B050"/>
             </a:solidFill>
@@ -3381,7 +3405,7 @@
             </a:pathLst>
           </a:custGeom>
           <a:noFill/>
-          <a:ln w="9525">
+          <a:ln w="12700">
             <a:solidFill>
               <a:srgbClr val="00B050"/>
             </a:solidFill>
@@ -3461,7 +3485,7 @@
             </a:pathLst>
           </a:custGeom>
           <a:noFill/>
-          <a:ln w="9525">
+          <a:ln w="12700">
             <a:solidFill>
               <a:srgbClr val="00B050"/>
             </a:solidFill>
@@ -3493,7 +3517,7 @@
           <a:prstGeom prst="line">
             <a:avLst/>
           </a:prstGeom>
-          <a:ln>
+          <a:ln w="12700">
             <a:solidFill>
               <a:srgbClr val="FF0000"/>
             </a:solidFill>
@@ -3529,7 +3553,7 @@
           <a:prstGeom prst="line">
             <a:avLst/>
           </a:prstGeom>
-          <a:ln>
+          <a:ln w="12700">
             <a:solidFill>
               <a:srgbClr val="7030A0"/>
             </a:solidFill>
@@ -3565,7 +3589,7 @@
           <a:prstGeom prst="line">
             <a:avLst/>
           </a:prstGeom>
-          <a:ln>
+          <a:ln w="12700">
             <a:solidFill>
               <a:schemeClr val="accent4">
                 <a:lumMod val="75000"/>
@@ -3603,7 +3627,7 @@
           <a:prstGeom prst="line">
             <a:avLst/>
           </a:prstGeom>
-          <a:ln>
+          <a:ln w="12700">
             <a:solidFill>
               <a:srgbClr val="0070C0"/>
             </a:solidFill>
@@ -3641,7 +3665,7 @@
           <a:prstGeom prst="line">
             <a:avLst/>
           </a:prstGeom>
-          <a:ln w="38100">
+          <a:ln w="12700">
             <a:solidFill>
               <a:schemeClr val="bg1">
                 <a:lumMod val="65000"/>
@@ -3959,498 +3983,462 @@
       </p:sp>
       <p:grpSp>
         <p:nvGrpSpPr>
-          <p:cNvPr id="14" name="Group 55"/>
-          <p:cNvGrpSpPr>
-            <a:grpSpLocks/>
-          </p:cNvGrpSpPr>
+          <p:cNvPr id="237" name="Gruppieren 236"/>
+          <p:cNvGrpSpPr/>
           <p:nvPr/>
         </p:nvGrpSpPr>
-        <p:grpSpPr bwMode="auto">
+        <p:grpSpPr>
           <a:xfrm>
-            <a:off x="1330473" y="5163112"/>
-            <a:ext cx="354232" cy="465658"/>
-            <a:chOff x="1651" y="3350"/>
-            <a:chExt cx="311" cy="387"/>
+            <a:off x="1297667" y="5163112"/>
+            <a:ext cx="349676" cy="465658"/>
+            <a:chOff x="1284789" y="5163112"/>
+            <a:chExt cx="349676" cy="465658"/>
           </a:xfrm>
         </p:grpSpPr>
-        <p:grpSp>
-          <p:nvGrpSpPr>
-            <p:cNvPr id="223" name="Group 56"/>
-            <p:cNvGrpSpPr>
-              <a:grpSpLocks/>
-            </p:cNvGrpSpPr>
+        <p:sp>
+          <p:nvSpPr>
+            <p:cNvPr id="231" name="Oval 57"/>
+            <p:cNvSpPr>
+              <a:spLocks noChangeArrowheads="1"/>
+            </p:cNvSpPr>
             <p:nvPr/>
-          </p:nvGrpSpPr>
-          <p:grpSpPr bwMode="auto">
+          </p:nvSpPr>
+          <p:spPr bwMode="auto">
             <a:xfrm>
-              <a:off x="1651" y="3493"/>
-              <a:ext cx="308" cy="244"/>
-              <a:chOff x="1651" y="3493"/>
-              <a:chExt cx="308" cy="244"/>
+              <a:off x="1284789" y="5478364"/>
+              <a:ext cx="349676" cy="150406"/>
             </a:xfrm>
-          </p:grpSpPr>
-          <p:sp>
-            <p:nvSpPr>
-              <p:cNvPr id="231" name="Oval 57"/>
-              <p:cNvSpPr>
-                <a:spLocks noChangeArrowheads="1"/>
-              </p:cNvSpPr>
-              <p:nvPr/>
-            </p:nvSpPr>
-            <p:spPr bwMode="auto">
-              <a:xfrm>
-                <a:off x="1651" y="3612"/>
-                <a:ext cx="307" cy="125"/>
-              </a:xfrm>
-              <a:prstGeom prst="ellipse">
-                <a:avLst/>
-              </a:prstGeom>
+            <a:prstGeom prst="ellipse">
+              <a:avLst/>
+            </a:prstGeom>
+            <a:solidFill>
+              <a:srgbClr val="FFFFFF"/>
+            </a:solidFill>
+            <a:ln w="12700">
               <a:solidFill>
-                <a:srgbClr val="FFFFFF"/>
+                <a:srgbClr val="FF33CC"/>
               </a:solidFill>
-              <a:ln w="12600">
-                <a:solidFill>
-                  <a:srgbClr val="FF33CC"/>
-                </a:solidFill>
-                <a:miter lim="800000"/>
-                <a:headEnd/>
-                <a:tailEnd/>
-              </a:ln>
-              <a:effectLst/>
-            </p:spPr>
-            <p:txBody>
-              <a:bodyPr wrap="none" anchor="ctr"/>
-              <a:lstStyle/>
-              <a:p>
-                <a:endParaRPr lang="de-DE" sz="1100"/>
-              </a:p>
-            </p:txBody>
-          </p:sp>
-          <p:sp>
-            <p:nvSpPr>
-              <p:cNvPr id="232" name="Oval 58"/>
-              <p:cNvSpPr>
-                <a:spLocks noChangeArrowheads="1"/>
-              </p:cNvSpPr>
-              <p:nvPr/>
-            </p:nvSpPr>
-            <p:spPr bwMode="auto">
-              <a:xfrm>
-                <a:off x="1652" y="3590"/>
-                <a:ext cx="307" cy="125"/>
-              </a:xfrm>
-              <a:prstGeom prst="ellipse">
-                <a:avLst/>
-              </a:prstGeom>
+              <a:miter lim="800000"/>
+              <a:headEnd/>
+              <a:tailEnd/>
+            </a:ln>
+            <a:effectLst/>
+          </p:spPr>
+          <p:txBody>
+            <a:bodyPr wrap="none" anchor="ctr"/>
+            <a:lstStyle/>
+            <a:p>
+              <a:endParaRPr lang="de-DE" sz="1100"/>
+            </a:p>
+          </p:txBody>
+        </p:sp>
+        <p:sp>
+          <p:nvSpPr>
+            <p:cNvPr id="232" name="Oval 58"/>
+            <p:cNvSpPr>
+              <a:spLocks noChangeArrowheads="1"/>
+            </p:cNvSpPr>
+            <p:nvPr/>
+          </p:nvSpPr>
+          <p:spPr bwMode="auto">
+            <a:xfrm>
+              <a:off x="1284789" y="5451892"/>
+              <a:ext cx="349676" cy="150406"/>
+            </a:xfrm>
+            <a:prstGeom prst="ellipse">
+              <a:avLst/>
+            </a:prstGeom>
+            <a:solidFill>
+              <a:srgbClr val="FFFFFF"/>
+            </a:solidFill>
+            <a:ln w="12700">
               <a:solidFill>
-                <a:srgbClr val="FFFFFF"/>
+                <a:srgbClr val="FF33CC"/>
               </a:solidFill>
-              <a:ln w="12600">
-                <a:solidFill>
-                  <a:srgbClr val="FF33CC"/>
-                </a:solidFill>
-                <a:miter lim="800000"/>
-                <a:headEnd/>
-                <a:tailEnd/>
-              </a:ln>
-              <a:effectLst/>
-            </p:spPr>
-            <p:txBody>
-              <a:bodyPr wrap="none" anchor="ctr"/>
-              <a:lstStyle/>
-              <a:p>
-                <a:endParaRPr lang="de-DE" sz="1100"/>
-              </a:p>
-            </p:txBody>
-          </p:sp>
-          <p:sp>
-            <p:nvSpPr>
-              <p:cNvPr id="233" name="Oval 59"/>
-              <p:cNvSpPr>
-                <a:spLocks noChangeArrowheads="1"/>
-              </p:cNvSpPr>
-              <p:nvPr/>
-            </p:nvSpPr>
-            <p:spPr bwMode="auto">
-              <a:xfrm>
-                <a:off x="1652" y="3569"/>
-                <a:ext cx="307" cy="125"/>
-              </a:xfrm>
-              <a:prstGeom prst="ellipse">
-                <a:avLst/>
-              </a:prstGeom>
+              <a:miter lim="800000"/>
+              <a:headEnd/>
+              <a:tailEnd/>
+            </a:ln>
+            <a:effectLst/>
+          </p:spPr>
+          <p:txBody>
+            <a:bodyPr wrap="none" anchor="ctr"/>
+            <a:lstStyle/>
+            <a:p>
+              <a:endParaRPr lang="de-DE" sz="1100"/>
+            </a:p>
+          </p:txBody>
+        </p:sp>
+        <p:sp>
+          <p:nvSpPr>
+            <p:cNvPr id="233" name="Oval 59"/>
+            <p:cNvSpPr>
+              <a:spLocks noChangeArrowheads="1"/>
+            </p:cNvSpPr>
+            <p:nvPr/>
+          </p:nvSpPr>
+          <p:spPr bwMode="auto">
+            <a:xfrm>
+              <a:off x="1284789" y="5426624"/>
+              <a:ext cx="349676" cy="150406"/>
+            </a:xfrm>
+            <a:prstGeom prst="ellipse">
+              <a:avLst/>
+            </a:prstGeom>
+            <a:solidFill>
+              <a:srgbClr val="FFFFFF"/>
+            </a:solidFill>
+            <a:ln w="12700">
               <a:solidFill>
-                <a:srgbClr val="FFFFFF"/>
+                <a:srgbClr val="FF33CC"/>
               </a:solidFill>
-              <a:ln w="12600">
-                <a:solidFill>
-                  <a:srgbClr val="FF33CC"/>
-                </a:solidFill>
-                <a:miter lim="800000"/>
-                <a:headEnd/>
-                <a:tailEnd/>
-              </a:ln>
-              <a:effectLst/>
-            </p:spPr>
-            <p:txBody>
-              <a:bodyPr wrap="none" anchor="ctr"/>
-              <a:lstStyle/>
-              <a:p>
-                <a:endParaRPr lang="de-DE" sz="1100"/>
-              </a:p>
-            </p:txBody>
-          </p:sp>
-          <p:sp>
-            <p:nvSpPr>
-              <p:cNvPr id="234" name="Oval 60"/>
-              <p:cNvSpPr>
-                <a:spLocks noChangeArrowheads="1"/>
-              </p:cNvSpPr>
-              <p:nvPr/>
-            </p:nvSpPr>
-            <p:spPr bwMode="auto">
-              <a:xfrm>
-                <a:off x="1652" y="3544"/>
-                <a:ext cx="307" cy="125"/>
-              </a:xfrm>
-              <a:prstGeom prst="ellipse">
-                <a:avLst/>
-              </a:prstGeom>
+              <a:miter lim="800000"/>
+              <a:headEnd/>
+              <a:tailEnd/>
+            </a:ln>
+            <a:effectLst/>
+          </p:spPr>
+          <p:txBody>
+            <a:bodyPr wrap="none" anchor="ctr"/>
+            <a:lstStyle/>
+            <a:p>
+              <a:endParaRPr lang="de-DE" sz="1100"/>
+            </a:p>
+          </p:txBody>
+        </p:sp>
+        <p:sp>
+          <p:nvSpPr>
+            <p:cNvPr id="234" name="Oval 60"/>
+            <p:cNvSpPr>
+              <a:spLocks noChangeArrowheads="1"/>
+            </p:cNvSpPr>
+            <p:nvPr/>
+          </p:nvSpPr>
+          <p:spPr bwMode="auto">
+            <a:xfrm>
+              <a:off x="1284789" y="5396543"/>
+              <a:ext cx="349676" cy="150406"/>
+            </a:xfrm>
+            <a:prstGeom prst="ellipse">
+              <a:avLst/>
+            </a:prstGeom>
+            <a:solidFill>
+              <a:srgbClr val="FFFFFF"/>
+            </a:solidFill>
+            <a:ln w="12700">
               <a:solidFill>
-                <a:srgbClr val="FFFFFF"/>
+                <a:srgbClr val="FF33CC"/>
               </a:solidFill>
-              <a:ln w="12600">
-                <a:solidFill>
-                  <a:srgbClr val="FF33CC"/>
-                </a:solidFill>
-                <a:miter lim="800000"/>
-                <a:headEnd/>
-                <a:tailEnd/>
-              </a:ln>
-              <a:effectLst/>
-            </p:spPr>
-            <p:txBody>
-              <a:bodyPr wrap="none" anchor="ctr"/>
-              <a:lstStyle/>
-              <a:p>
-                <a:endParaRPr lang="de-DE" sz="1100"/>
-              </a:p>
-            </p:txBody>
-          </p:sp>
-          <p:sp>
-            <p:nvSpPr>
-              <p:cNvPr id="235" name="Oval 61"/>
-              <p:cNvSpPr>
-                <a:spLocks noChangeArrowheads="1"/>
-              </p:cNvSpPr>
-              <p:nvPr/>
-            </p:nvSpPr>
-            <p:spPr bwMode="auto">
-              <a:xfrm>
-                <a:off x="1652" y="3518"/>
-                <a:ext cx="307" cy="125"/>
-              </a:xfrm>
-              <a:prstGeom prst="ellipse">
-                <a:avLst/>
-              </a:prstGeom>
+              <a:miter lim="800000"/>
+              <a:headEnd/>
+              <a:tailEnd/>
+            </a:ln>
+            <a:effectLst/>
+          </p:spPr>
+          <p:txBody>
+            <a:bodyPr wrap="none" anchor="ctr"/>
+            <a:lstStyle/>
+            <a:p>
+              <a:endParaRPr lang="de-DE" sz="1100"/>
+            </a:p>
+          </p:txBody>
+        </p:sp>
+        <p:sp>
+          <p:nvSpPr>
+            <p:cNvPr id="235" name="Oval 61"/>
+            <p:cNvSpPr>
+              <a:spLocks noChangeArrowheads="1"/>
+            </p:cNvSpPr>
+            <p:nvPr/>
+          </p:nvSpPr>
+          <p:spPr bwMode="auto">
+            <a:xfrm>
+              <a:off x="1284789" y="5365258"/>
+              <a:ext cx="349676" cy="150406"/>
+            </a:xfrm>
+            <a:prstGeom prst="ellipse">
+              <a:avLst/>
+            </a:prstGeom>
+            <a:solidFill>
+              <a:srgbClr val="FFFFFF"/>
+            </a:solidFill>
+            <a:ln w="12700">
               <a:solidFill>
-                <a:srgbClr val="FFFFFF"/>
+                <a:srgbClr val="FF33CC"/>
               </a:solidFill>
-              <a:ln w="12600">
-                <a:solidFill>
-                  <a:srgbClr val="FF33CC"/>
-                </a:solidFill>
-                <a:miter lim="800000"/>
-                <a:headEnd/>
-                <a:tailEnd/>
-              </a:ln>
-              <a:effectLst/>
-            </p:spPr>
-            <p:txBody>
-              <a:bodyPr wrap="none" anchor="ctr"/>
-              <a:lstStyle/>
-              <a:p>
-                <a:endParaRPr lang="de-DE" sz="1100"/>
-              </a:p>
-            </p:txBody>
-          </p:sp>
-          <p:sp>
-            <p:nvSpPr>
-              <p:cNvPr id="236" name="Oval 62"/>
-              <p:cNvSpPr>
-                <a:spLocks noChangeArrowheads="1"/>
-              </p:cNvSpPr>
-              <p:nvPr/>
-            </p:nvSpPr>
-            <p:spPr bwMode="auto">
-              <a:xfrm>
-                <a:off x="1652" y="3493"/>
-                <a:ext cx="307" cy="125"/>
-              </a:xfrm>
-              <a:prstGeom prst="ellipse">
-                <a:avLst/>
-              </a:prstGeom>
+              <a:miter lim="800000"/>
+              <a:headEnd/>
+              <a:tailEnd/>
+            </a:ln>
+            <a:effectLst/>
+          </p:spPr>
+          <p:txBody>
+            <a:bodyPr wrap="none" anchor="ctr"/>
+            <a:lstStyle/>
+            <a:p>
+              <a:endParaRPr lang="de-DE" sz="1100"/>
+            </a:p>
+          </p:txBody>
+        </p:sp>
+        <p:sp>
+          <p:nvSpPr>
+            <p:cNvPr id="236" name="Oval 62"/>
+            <p:cNvSpPr>
+              <a:spLocks noChangeArrowheads="1"/>
+            </p:cNvSpPr>
+            <p:nvPr/>
+          </p:nvSpPr>
+          <p:spPr bwMode="auto">
+            <a:xfrm>
+              <a:off x="1284789" y="5335177"/>
+              <a:ext cx="349676" cy="150406"/>
+            </a:xfrm>
+            <a:prstGeom prst="ellipse">
+              <a:avLst/>
+            </a:prstGeom>
+            <a:solidFill>
+              <a:srgbClr val="FFFFFF"/>
+            </a:solidFill>
+            <a:ln w="12700">
               <a:solidFill>
-                <a:srgbClr val="FFFFFF"/>
+                <a:srgbClr val="FF33CC"/>
               </a:solidFill>
-              <a:ln w="12600">
-                <a:solidFill>
-                  <a:srgbClr val="FF33CC"/>
-                </a:solidFill>
-                <a:miter lim="800000"/>
-                <a:headEnd/>
-                <a:tailEnd/>
-              </a:ln>
-              <a:effectLst/>
-            </p:spPr>
-            <p:txBody>
-              <a:bodyPr wrap="none" anchor="ctr"/>
-              <a:lstStyle/>
-              <a:p>
-                <a:endParaRPr lang="de-DE" sz="1100"/>
-              </a:p>
-            </p:txBody>
-          </p:sp>
-        </p:grpSp>
-        <p:grpSp>
-          <p:nvGrpSpPr>
-            <p:cNvPr id="224" name="Group 63"/>
-            <p:cNvGrpSpPr>
-              <a:grpSpLocks/>
-            </p:cNvGrpSpPr>
+              <a:miter lim="800000"/>
+              <a:headEnd/>
+              <a:tailEnd/>
+            </a:ln>
+            <a:effectLst/>
+          </p:spPr>
+          <p:txBody>
+            <a:bodyPr wrap="none" anchor="ctr"/>
+            <a:lstStyle/>
+            <a:p>
+              <a:endParaRPr lang="de-DE" sz="1100"/>
+            </a:p>
+          </p:txBody>
+        </p:sp>
+        <p:sp>
+          <p:nvSpPr>
+            <p:cNvPr id="225" name="Oval 64"/>
+            <p:cNvSpPr>
+              <a:spLocks noChangeArrowheads="1"/>
+            </p:cNvSpPr>
             <p:nvPr/>
-          </p:nvGrpSpPr>
-          <p:grpSpPr bwMode="auto">
+          </p:nvSpPr>
+          <p:spPr bwMode="auto">
             <a:xfrm>
-              <a:off x="1654" y="3350"/>
-              <a:ext cx="308" cy="244"/>
-              <a:chOff x="1654" y="3350"/>
-              <a:chExt cx="308" cy="244"/>
+              <a:off x="1284789" y="5306299"/>
+              <a:ext cx="349676" cy="150406"/>
             </a:xfrm>
-          </p:grpSpPr>
-          <p:sp>
-            <p:nvSpPr>
-              <p:cNvPr id="225" name="Oval 64"/>
-              <p:cNvSpPr>
-                <a:spLocks noChangeArrowheads="1"/>
-              </p:cNvSpPr>
-              <p:nvPr/>
-            </p:nvSpPr>
-            <p:spPr bwMode="auto">
-              <a:xfrm>
-                <a:off x="1654" y="3469"/>
-                <a:ext cx="307" cy="125"/>
-              </a:xfrm>
-              <a:prstGeom prst="ellipse">
-                <a:avLst/>
-              </a:prstGeom>
+            <a:prstGeom prst="ellipse">
+              <a:avLst/>
+            </a:prstGeom>
+            <a:solidFill>
+              <a:srgbClr val="FFFFFF"/>
+            </a:solidFill>
+            <a:ln w="12700">
               <a:solidFill>
-                <a:srgbClr val="FFFFFF"/>
+                <a:srgbClr val="FF33CC"/>
               </a:solidFill>
-              <a:ln w="12600">
-                <a:solidFill>
-                  <a:srgbClr val="FF33CC"/>
-                </a:solidFill>
-                <a:miter lim="800000"/>
-                <a:headEnd/>
-                <a:tailEnd/>
-              </a:ln>
-              <a:effectLst/>
-            </p:spPr>
-            <p:txBody>
-              <a:bodyPr wrap="none" anchor="ctr"/>
-              <a:lstStyle/>
-              <a:p>
-                <a:endParaRPr lang="de-DE" sz="1100"/>
-              </a:p>
-            </p:txBody>
-          </p:sp>
-          <p:sp>
-            <p:nvSpPr>
-              <p:cNvPr id="226" name="Oval 65"/>
-              <p:cNvSpPr>
-                <a:spLocks noChangeArrowheads="1"/>
-              </p:cNvSpPr>
-              <p:nvPr/>
-            </p:nvSpPr>
-            <p:spPr bwMode="auto">
-              <a:xfrm>
-                <a:off x="1655" y="3448"/>
-                <a:ext cx="307" cy="125"/>
-              </a:xfrm>
-              <a:prstGeom prst="ellipse">
-                <a:avLst/>
-              </a:prstGeom>
+              <a:miter lim="800000"/>
+              <a:headEnd/>
+              <a:tailEnd/>
+            </a:ln>
+            <a:effectLst/>
+          </p:spPr>
+          <p:txBody>
+            <a:bodyPr wrap="none" anchor="ctr"/>
+            <a:lstStyle/>
+            <a:p>
+              <a:endParaRPr lang="de-DE" sz="1100"/>
+            </a:p>
+          </p:txBody>
+        </p:sp>
+        <p:sp>
+          <p:nvSpPr>
+            <p:cNvPr id="226" name="Oval 65"/>
+            <p:cNvSpPr>
+              <a:spLocks noChangeArrowheads="1"/>
+            </p:cNvSpPr>
+            <p:nvPr/>
+          </p:nvSpPr>
+          <p:spPr bwMode="auto">
+            <a:xfrm>
+              <a:off x="1284789" y="5281031"/>
+              <a:ext cx="349676" cy="150406"/>
+            </a:xfrm>
+            <a:prstGeom prst="ellipse">
+              <a:avLst/>
+            </a:prstGeom>
+            <a:solidFill>
+              <a:srgbClr val="FFFFFF"/>
+            </a:solidFill>
+            <a:ln w="12700">
               <a:solidFill>
-                <a:srgbClr val="FFFFFF"/>
+                <a:srgbClr val="FF33CC"/>
               </a:solidFill>
-              <a:ln w="12600">
-                <a:solidFill>
-                  <a:srgbClr val="FF33CC"/>
-                </a:solidFill>
-                <a:miter lim="800000"/>
-                <a:headEnd/>
-                <a:tailEnd/>
-              </a:ln>
-              <a:effectLst/>
-            </p:spPr>
-            <p:txBody>
-              <a:bodyPr wrap="none" anchor="ctr"/>
-              <a:lstStyle/>
-              <a:p>
-                <a:endParaRPr lang="de-DE" sz="1100"/>
-              </a:p>
-            </p:txBody>
-          </p:sp>
-          <p:sp>
-            <p:nvSpPr>
-              <p:cNvPr id="227" name="Oval 66"/>
-              <p:cNvSpPr>
-                <a:spLocks noChangeArrowheads="1"/>
-              </p:cNvSpPr>
-              <p:nvPr/>
-            </p:nvSpPr>
-            <p:spPr bwMode="auto">
-              <a:xfrm>
-                <a:off x="1655" y="3426"/>
-                <a:ext cx="307" cy="125"/>
-              </a:xfrm>
-              <a:prstGeom prst="ellipse">
-                <a:avLst/>
-              </a:prstGeom>
+              <a:miter lim="800000"/>
+              <a:headEnd/>
+              <a:tailEnd/>
+            </a:ln>
+            <a:effectLst/>
+          </p:spPr>
+          <p:txBody>
+            <a:bodyPr wrap="none" anchor="ctr"/>
+            <a:lstStyle/>
+            <a:p>
+              <a:endParaRPr lang="de-DE" sz="1100"/>
+            </a:p>
+          </p:txBody>
+        </p:sp>
+        <p:sp>
+          <p:nvSpPr>
+            <p:cNvPr id="227" name="Oval 66"/>
+            <p:cNvSpPr>
+              <a:spLocks noChangeArrowheads="1"/>
+            </p:cNvSpPr>
+            <p:nvPr/>
+          </p:nvSpPr>
+          <p:spPr bwMode="auto">
+            <a:xfrm>
+              <a:off x="1284789" y="5254559"/>
+              <a:ext cx="349676" cy="150406"/>
+            </a:xfrm>
+            <a:prstGeom prst="ellipse">
+              <a:avLst/>
+            </a:prstGeom>
+            <a:solidFill>
+              <a:srgbClr val="FFFFFF"/>
+            </a:solidFill>
+            <a:ln w="12700">
               <a:solidFill>
-                <a:srgbClr val="FFFFFF"/>
+                <a:srgbClr val="FF33CC"/>
               </a:solidFill>
-              <a:ln w="12600">
-                <a:solidFill>
-                  <a:srgbClr val="FF33CC"/>
-                </a:solidFill>
-                <a:miter lim="800000"/>
-                <a:headEnd/>
-                <a:tailEnd/>
-              </a:ln>
-              <a:effectLst/>
-            </p:spPr>
-            <p:txBody>
-              <a:bodyPr wrap="none" anchor="ctr"/>
-              <a:lstStyle/>
-              <a:p>
-                <a:endParaRPr lang="de-DE" sz="1100"/>
-              </a:p>
-            </p:txBody>
-          </p:sp>
-          <p:sp>
-            <p:nvSpPr>
-              <p:cNvPr id="228" name="Oval 67"/>
-              <p:cNvSpPr>
-                <a:spLocks noChangeArrowheads="1"/>
-              </p:cNvSpPr>
-              <p:nvPr/>
-            </p:nvSpPr>
-            <p:spPr bwMode="auto">
-              <a:xfrm>
-                <a:off x="1655" y="3401"/>
-                <a:ext cx="307" cy="125"/>
-              </a:xfrm>
-              <a:prstGeom prst="ellipse">
-                <a:avLst/>
-              </a:prstGeom>
+              <a:miter lim="800000"/>
+              <a:headEnd/>
+              <a:tailEnd/>
+            </a:ln>
+            <a:effectLst/>
+          </p:spPr>
+          <p:txBody>
+            <a:bodyPr wrap="none" anchor="ctr"/>
+            <a:lstStyle/>
+            <a:p>
+              <a:endParaRPr lang="de-DE" sz="1100"/>
+            </a:p>
+          </p:txBody>
+        </p:sp>
+        <p:sp>
+          <p:nvSpPr>
+            <p:cNvPr id="228" name="Oval 67"/>
+            <p:cNvSpPr>
+              <a:spLocks noChangeArrowheads="1"/>
+            </p:cNvSpPr>
+            <p:nvPr/>
+          </p:nvSpPr>
+          <p:spPr bwMode="auto">
+            <a:xfrm>
+              <a:off x="1284789" y="5224478"/>
+              <a:ext cx="349676" cy="150406"/>
+            </a:xfrm>
+            <a:prstGeom prst="ellipse">
+              <a:avLst/>
+            </a:prstGeom>
+            <a:solidFill>
+              <a:srgbClr val="FFFFFF"/>
+            </a:solidFill>
+            <a:ln w="12700">
               <a:solidFill>
-                <a:srgbClr val="FFFFFF"/>
+                <a:srgbClr val="FF33CC"/>
               </a:solidFill>
-              <a:ln w="12600">
-                <a:solidFill>
-                  <a:srgbClr val="FF33CC"/>
-                </a:solidFill>
-                <a:miter lim="800000"/>
-                <a:headEnd/>
-                <a:tailEnd/>
-              </a:ln>
-              <a:effectLst/>
-            </p:spPr>
-            <p:txBody>
-              <a:bodyPr wrap="none" anchor="ctr"/>
-              <a:lstStyle/>
-              <a:p>
-                <a:endParaRPr lang="de-DE" sz="1100"/>
-              </a:p>
-            </p:txBody>
-          </p:sp>
-          <p:sp>
-            <p:nvSpPr>
-              <p:cNvPr id="229" name="Oval 68"/>
-              <p:cNvSpPr>
-                <a:spLocks noChangeArrowheads="1"/>
-              </p:cNvSpPr>
-              <p:nvPr/>
-            </p:nvSpPr>
-            <p:spPr bwMode="auto">
-              <a:xfrm>
-                <a:off x="1655" y="3375"/>
-                <a:ext cx="307" cy="125"/>
-              </a:xfrm>
-              <a:prstGeom prst="ellipse">
-                <a:avLst/>
-              </a:prstGeom>
+              <a:miter lim="800000"/>
+              <a:headEnd/>
+              <a:tailEnd/>
+            </a:ln>
+            <a:effectLst/>
+          </p:spPr>
+          <p:txBody>
+            <a:bodyPr wrap="none" anchor="ctr"/>
+            <a:lstStyle/>
+            <a:p>
+              <a:endParaRPr lang="de-DE" sz="1100"/>
+            </a:p>
+          </p:txBody>
+        </p:sp>
+        <p:sp>
+          <p:nvSpPr>
+            <p:cNvPr id="229" name="Oval 68"/>
+            <p:cNvSpPr>
+              <a:spLocks noChangeArrowheads="1"/>
+            </p:cNvSpPr>
+            <p:nvPr/>
+          </p:nvSpPr>
+          <p:spPr bwMode="auto">
+            <a:xfrm>
+              <a:off x="1284789" y="5193193"/>
+              <a:ext cx="349676" cy="150406"/>
+            </a:xfrm>
+            <a:prstGeom prst="ellipse">
+              <a:avLst/>
+            </a:prstGeom>
+            <a:solidFill>
+              <a:srgbClr val="FFFFFF"/>
+            </a:solidFill>
+            <a:ln w="12700">
               <a:solidFill>
-                <a:srgbClr val="FFFFFF"/>
+                <a:srgbClr val="FF33CC"/>
               </a:solidFill>
-              <a:ln w="12600">
-                <a:solidFill>
-                  <a:srgbClr val="FF33CC"/>
-                </a:solidFill>
-                <a:miter lim="800000"/>
-                <a:headEnd/>
-                <a:tailEnd/>
-              </a:ln>
-              <a:effectLst/>
-            </p:spPr>
-            <p:txBody>
-              <a:bodyPr wrap="none" anchor="ctr"/>
-              <a:lstStyle/>
-              <a:p>
-                <a:endParaRPr lang="de-DE" sz="1100"/>
-              </a:p>
-            </p:txBody>
-          </p:sp>
-          <p:sp>
-            <p:nvSpPr>
-              <p:cNvPr id="230" name="Oval 69"/>
-              <p:cNvSpPr>
-                <a:spLocks noChangeArrowheads="1"/>
-              </p:cNvSpPr>
-              <p:nvPr/>
-            </p:nvSpPr>
-            <p:spPr bwMode="auto">
-              <a:xfrm>
-                <a:off x="1655" y="3350"/>
-                <a:ext cx="307" cy="125"/>
-              </a:xfrm>
-              <a:prstGeom prst="ellipse">
-                <a:avLst/>
-              </a:prstGeom>
+              <a:miter lim="800000"/>
+              <a:headEnd/>
+              <a:tailEnd/>
+            </a:ln>
+            <a:effectLst/>
+          </p:spPr>
+          <p:txBody>
+            <a:bodyPr wrap="none" anchor="ctr"/>
+            <a:lstStyle/>
+            <a:p>
+              <a:endParaRPr lang="de-DE" sz="1100"/>
+            </a:p>
+          </p:txBody>
+        </p:sp>
+        <p:sp>
+          <p:nvSpPr>
+            <p:cNvPr id="230" name="Oval 69"/>
+            <p:cNvSpPr>
+              <a:spLocks noChangeArrowheads="1"/>
+            </p:cNvSpPr>
+            <p:nvPr/>
+          </p:nvSpPr>
+          <p:spPr bwMode="auto">
+            <a:xfrm>
+              <a:off x="1284789" y="5163112"/>
+              <a:ext cx="349676" cy="150406"/>
+            </a:xfrm>
+            <a:prstGeom prst="ellipse">
+              <a:avLst/>
+            </a:prstGeom>
+            <a:solidFill>
+              <a:srgbClr val="FFFFFF"/>
+            </a:solidFill>
+            <a:ln w="12700">
               <a:solidFill>
-                <a:srgbClr val="FFFFFF"/>
+                <a:srgbClr val="FF33CC"/>
               </a:solidFill>
-              <a:ln w="12600">
-                <a:solidFill>
-                  <a:srgbClr val="FF33CC"/>
-                </a:solidFill>
-                <a:miter lim="800000"/>
-                <a:headEnd/>
-                <a:tailEnd/>
-              </a:ln>
-              <a:effectLst/>
-            </p:spPr>
-            <p:txBody>
-              <a:bodyPr wrap="none" anchor="ctr"/>
-              <a:lstStyle/>
-              <a:p>
-                <a:endParaRPr lang="de-DE" sz="1100"/>
-              </a:p>
-            </p:txBody>
-          </p:sp>
-        </p:grpSp>
+              <a:miter lim="800000"/>
+              <a:headEnd/>
+              <a:tailEnd/>
+            </a:ln>
+            <a:effectLst/>
+          </p:spPr>
+          <p:txBody>
+            <a:bodyPr wrap="none" anchor="ctr"/>
+            <a:lstStyle/>
+            <a:p>
+              <a:endParaRPr lang="de-DE" sz="1100"/>
+            </a:p>
+          </p:txBody>
+        </p:sp>
       </p:grpSp>
       <p:sp>
         <p:nvSpPr>
@@ -4471,7 +4459,7 @@
           <a:solidFill>
             <a:srgbClr val="FFFFFF"/>
           </a:solidFill>
-          <a:ln w="38160">
+          <a:ln w="12700">
             <a:solidFill>
               <a:srgbClr val="FF33CC"/>
             </a:solidFill>
@@ -4506,7 +4494,7 @@
             <a:avLst/>
           </a:prstGeom>
           <a:noFill/>
-          <a:ln w="9525">
+          <a:ln w="12700">
             <a:noFill/>
             <a:round/>
             <a:headEnd/>
@@ -4594,7 +4582,7 @@
           <a:solidFill>
             <a:srgbClr val="FFFFFF"/>
           </a:solidFill>
-          <a:ln w="28440">
+          <a:ln w="12700">
             <a:solidFill>
               <a:srgbClr val="000000"/>
             </a:solidFill>
@@ -4647,11 +4635,6 @@
               </a:rPr>
               <a:t>ADC</a:t>
             </a:r>
-            <a:endParaRPr lang="fr-FR" sz="1100" dirty="0" smtClean="0">
-              <a:solidFill>
-                <a:srgbClr val="000000"/>
-              </a:solidFill>
-            </a:endParaRPr>
           </a:p>
           <a:p>
             <a:pPr algn="ctr" defTabSz="449263">
@@ -4797,8 +4780,8 @@
         </p:nvGrpSpPr>
         <p:grpSpPr bwMode="auto">
           <a:xfrm>
-            <a:off x="1438179" y="1195530"/>
-            <a:ext cx="107706" cy="4067447"/>
+            <a:off x="1448227" y="1195530"/>
+            <a:ext cx="45719" cy="4067447"/>
             <a:chOff x="1001" y="1121"/>
             <a:chExt cx="52" cy="2312"/>
           </a:xfrm>
@@ -4915,7 +4898,7 @@
                     </a:pathLst>
                   </a:custGeom>
                   <a:noFill/>
-                  <a:ln w="28575" cap="flat" cmpd="sng">
+                  <a:ln w="12700" cap="flat" cmpd="sng">
                     <a:solidFill>
                       <a:srgbClr val="FF33CC"/>
                     </a:solidFill>
@@ -4998,7 +4981,7 @@
                     </a:pathLst>
                   </a:custGeom>
                   <a:noFill/>
-                  <a:ln w="28575" cap="flat" cmpd="sng">
+                  <a:ln w="12700" cap="flat" cmpd="sng">
                     <a:solidFill>
                       <a:srgbClr val="FF33CC"/>
                     </a:solidFill>
@@ -5098,7 +5081,7 @@
                     </a:pathLst>
                   </a:custGeom>
                   <a:noFill/>
-                  <a:ln w="28575" cap="flat" cmpd="sng">
+                  <a:ln w="12700" cap="flat" cmpd="sng">
                     <a:solidFill>
                       <a:srgbClr val="FF33CC"/>
                     </a:solidFill>
@@ -5181,7 +5164,7 @@
                     </a:pathLst>
                   </a:custGeom>
                   <a:noFill/>
-                  <a:ln w="28575" cap="flat" cmpd="sng">
+                  <a:ln w="12700" cap="flat" cmpd="sng">
                     <a:solidFill>
                       <a:srgbClr val="FF33CC"/>
                     </a:solidFill>
@@ -5298,7 +5281,7 @@
                     </a:pathLst>
                   </a:custGeom>
                   <a:noFill/>
-                  <a:ln w="28575" cap="flat" cmpd="sng">
+                  <a:ln w="12700" cap="flat" cmpd="sng">
                     <a:solidFill>
                       <a:srgbClr val="FF33CC"/>
                     </a:solidFill>
@@ -5381,7 +5364,7 @@
                     </a:pathLst>
                   </a:custGeom>
                   <a:noFill/>
-                  <a:ln w="28575" cap="flat" cmpd="sng">
+                  <a:ln w="12700" cap="flat" cmpd="sng">
                     <a:solidFill>
                       <a:srgbClr val="FF33CC"/>
                     </a:solidFill>
@@ -5481,7 +5464,7 @@
                     </a:pathLst>
                   </a:custGeom>
                   <a:noFill/>
-                  <a:ln w="28575" cap="flat" cmpd="sng">
+                  <a:ln w="12700" cap="flat" cmpd="sng">
                     <a:solidFill>
                       <a:srgbClr val="FF33CC"/>
                     </a:solidFill>
@@ -5564,7 +5547,7 @@
                     </a:pathLst>
                   </a:custGeom>
                   <a:noFill/>
-                  <a:ln w="28575" cap="flat" cmpd="sng">
+                  <a:ln w="12700" cap="flat" cmpd="sng">
                     <a:solidFill>
                       <a:srgbClr val="FF33CC"/>
                     </a:solidFill>
@@ -5714,7 +5697,7 @@
                       </a:pathLst>
                     </a:custGeom>
                     <a:noFill/>
-                    <a:ln w="28575" cap="flat" cmpd="sng">
+                    <a:ln w="12700" cap="flat" cmpd="sng">
                       <a:solidFill>
                         <a:srgbClr val="FF33CC"/>
                       </a:solidFill>
@@ -5797,7 +5780,7 @@
                       </a:pathLst>
                     </a:custGeom>
                     <a:noFill/>
-                    <a:ln w="28575" cap="flat" cmpd="sng">
+                    <a:ln w="12700" cap="flat" cmpd="sng">
                       <a:solidFill>
                         <a:srgbClr val="FF33CC"/>
                       </a:solidFill>
@@ -5897,7 +5880,7 @@
                       </a:pathLst>
                     </a:custGeom>
                     <a:noFill/>
-                    <a:ln w="28575" cap="flat" cmpd="sng">
+                    <a:ln w="12700" cap="flat" cmpd="sng">
                       <a:solidFill>
                         <a:srgbClr val="FF33CC"/>
                       </a:solidFill>
@@ -5980,7 +5963,7 @@
                       </a:pathLst>
                     </a:custGeom>
                     <a:noFill/>
-                    <a:ln w="28575" cap="flat" cmpd="sng">
+                    <a:ln w="12700" cap="flat" cmpd="sng">
                       <a:solidFill>
                         <a:srgbClr val="FF33CC"/>
                       </a:solidFill>
@@ -6097,7 +6080,7 @@
                       </a:pathLst>
                     </a:custGeom>
                     <a:noFill/>
-                    <a:ln w="28575" cap="flat" cmpd="sng">
+                    <a:ln w="12700" cap="flat" cmpd="sng">
                       <a:solidFill>
                         <a:srgbClr val="FF33CC"/>
                       </a:solidFill>
@@ -6180,7 +6163,7 @@
                       </a:pathLst>
                     </a:custGeom>
                     <a:noFill/>
-                    <a:ln w="28575" cap="flat" cmpd="sng">
+                    <a:ln w="12700" cap="flat" cmpd="sng">
                       <a:solidFill>
                         <a:srgbClr val="FF33CC"/>
                       </a:solidFill>
@@ -6280,7 +6263,7 @@
                       </a:pathLst>
                     </a:custGeom>
                     <a:noFill/>
-                    <a:ln w="28575" cap="flat" cmpd="sng">
+                    <a:ln w="12700" cap="flat" cmpd="sng">
                       <a:solidFill>
                         <a:srgbClr val="FF33CC"/>
                       </a:solidFill>
@@ -6363,7 +6346,7 @@
                       </a:pathLst>
                     </a:custGeom>
                     <a:noFill/>
-                    <a:ln w="28575" cap="flat" cmpd="sng">
+                    <a:ln w="12700" cap="flat" cmpd="sng">
                       <a:solidFill>
                         <a:srgbClr val="FF33CC"/>
                       </a:solidFill>
@@ -6497,7 +6480,7 @@
                       </a:pathLst>
                     </a:custGeom>
                     <a:noFill/>
-                    <a:ln w="28575" cap="flat" cmpd="sng">
+                    <a:ln w="12700" cap="flat" cmpd="sng">
                       <a:solidFill>
                         <a:srgbClr val="FF33CC"/>
                       </a:solidFill>
@@ -6580,7 +6563,7 @@
                       </a:pathLst>
                     </a:custGeom>
                     <a:noFill/>
-                    <a:ln w="28575" cap="flat" cmpd="sng">
+                    <a:ln w="12700" cap="flat" cmpd="sng">
                       <a:solidFill>
                         <a:srgbClr val="FF33CC"/>
                       </a:solidFill>
@@ -6680,7 +6663,7 @@
                       </a:pathLst>
                     </a:custGeom>
                     <a:noFill/>
-                    <a:ln w="28575" cap="flat" cmpd="sng">
+                    <a:ln w="12700" cap="flat" cmpd="sng">
                       <a:solidFill>
                         <a:srgbClr val="FF33CC"/>
                       </a:solidFill>
@@ -6763,7 +6746,7 @@
                       </a:pathLst>
                     </a:custGeom>
                     <a:noFill/>
-                    <a:ln w="28575" cap="flat" cmpd="sng">
+                    <a:ln w="12700" cap="flat" cmpd="sng">
                       <a:solidFill>
                         <a:srgbClr val="FF33CC"/>
                       </a:solidFill>
@@ -6880,7 +6863,7 @@
                       </a:pathLst>
                     </a:custGeom>
                     <a:noFill/>
-                    <a:ln w="28575" cap="flat" cmpd="sng">
+                    <a:ln w="12700" cap="flat" cmpd="sng">
                       <a:solidFill>
                         <a:srgbClr val="FF33CC"/>
                       </a:solidFill>
@@ -6963,7 +6946,7 @@
                       </a:pathLst>
                     </a:custGeom>
                     <a:noFill/>
-                    <a:ln w="28575" cap="flat" cmpd="sng">
+                    <a:ln w="12700" cap="flat" cmpd="sng">
                       <a:solidFill>
                         <a:srgbClr val="FF33CC"/>
                       </a:solidFill>
@@ -7063,7 +7046,7 @@
                       </a:pathLst>
                     </a:custGeom>
                     <a:noFill/>
-                    <a:ln w="28575" cap="flat" cmpd="sng">
+                    <a:ln w="12700" cap="flat" cmpd="sng">
                       <a:solidFill>
                         <a:srgbClr val="FF33CC"/>
                       </a:solidFill>
@@ -7146,7 +7129,7 @@
                       </a:pathLst>
                     </a:custGeom>
                     <a:noFill/>
-                    <a:ln w="28575" cap="flat" cmpd="sng">
+                    <a:ln w="12700" cap="flat" cmpd="sng">
                       <a:solidFill>
                         <a:srgbClr val="FF33CC"/>
                       </a:solidFill>
@@ -7280,7 +7263,7 @@
                       </a:pathLst>
                     </a:custGeom>
                     <a:noFill/>
-                    <a:ln w="28575" cap="flat" cmpd="sng">
+                    <a:ln w="12700" cap="flat" cmpd="sng">
                       <a:solidFill>
                         <a:srgbClr val="FF33CC"/>
                       </a:solidFill>
@@ -7363,7 +7346,7 @@
                       </a:pathLst>
                     </a:custGeom>
                     <a:noFill/>
-                    <a:ln w="28575" cap="flat" cmpd="sng">
+                    <a:ln w="12700" cap="flat" cmpd="sng">
                       <a:solidFill>
                         <a:srgbClr val="FF33CC"/>
                       </a:solidFill>
@@ -7463,7 +7446,7 @@
                       </a:pathLst>
                     </a:custGeom>
                     <a:noFill/>
-                    <a:ln w="28575" cap="flat" cmpd="sng">
+                    <a:ln w="12700" cap="flat" cmpd="sng">
                       <a:solidFill>
                         <a:srgbClr val="FF33CC"/>
                       </a:solidFill>
@@ -7546,7 +7529,7 @@
                       </a:pathLst>
                     </a:custGeom>
                     <a:noFill/>
-                    <a:ln w="28575" cap="flat" cmpd="sng">
+                    <a:ln w="12700" cap="flat" cmpd="sng">
                       <a:solidFill>
                         <a:srgbClr val="FF33CC"/>
                       </a:solidFill>
@@ -7663,7 +7646,7 @@
                       </a:pathLst>
                     </a:custGeom>
                     <a:noFill/>
-                    <a:ln w="28575" cap="flat" cmpd="sng">
+                    <a:ln w="12700" cap="flat" cmpd="sng">
                       <a:solidFill>
                         <a:srgbClr val="FF33CC"/>
                       </a:solidFill>
@@ -7746,7 +7729,7 @@
                       </a:pathLst>
                     </a:custGeom>
                     <a:noFill/>
-                    <a:ln w="28575" cap="flat" cmpd="sng">
+                    <a:ln w="12700" cap="flat" cmpd="sng">
                       <a:solidFill>
                         <a:srgbClr val="FF33CC"/>
                       </a:solidFill>
@@ -7846,7 +7829,7 @@
                       </a:pathLst>
                     </a:custGeom>
                     <a:noFill/>
-                    <a:ln w="28575" cap="flat" cmpd="sng">
+                    <a:ln w="12700" cap="flat" cmpd="sng">
                       <a:solidFill>
                         <a:srgbClr val="FF33CC"/>
                       </a:solidFill>
@@ -7929,7 +7912,7 @@
                       </a:pathLst>
                     </a:custGeom>
                     <a:noFill/>
-                    <a:ln w="28575" cap="flat" cmpd="sng">
+                    <a:ln w="12700" cap="flat" cmpd="sng">
                       <a:solidFill>
                         <a:srgbClr val="FF33CC"/>
                       </a:solidFill>
@@ -8063,7 +8046,7 @@
                       </a:pathLst>
                     </a:custGeom>
                     <a:noFill/>
-                    <a:ln w="28575" cap="flat" cmpd="sng">
+                    <a:ln w="12700" cap="flat" cmpd="sng">
                       <a:solidFill>
                         <a:srgbClr val="FF33CC"/>
                       </a:solidFill>
@@ -8146,7 +8129,7 @@
                       </a:pathLst>
                     </a:custGeom>
                     <a:noFill/>
-                    <a:ln w="28575" cap="flat" cmpd="sng">
+                    <a:ln w="12700" cap="flat" cmpd="sng">
                       <a:solidFill>
                         <a:srgbClr val="FF33CC"/>
                       </a:solidFill>
@@ -8246,7 +8229,7 @@
                       </a:pathLst>
                     </a:custGeom>
                     <a:noFill/>
-                    <a:ln w="28575" cap="flat" cmpd="sng">
+                    <a:ln w="12700" cap="flat" cmpd="sng">
                       <a:solidFill>
                         <a:srgbClr val="FF33CC"/>
                       </a:solidFill>
@@ -8329,7 +8312,7 @@
                       </a:pathLst>
                     </a:custGeom>
                     <a:noFill/>
-                    <a:ln w="28575" cap="flat" cmpd="sng">
+                    <a:ln w="12700" cap="flat" cmpd="sng">
                       <a:solidFill>
                         <a:srgbClr val="FF33CC"/>
                       </a:solidFill>
@@ -8446,7 +8429,7 @@
                       </a:pathLst>
                     </a:custGeom>
                     <a:noFill/>
-                    <a:ln w="28575" cap="flat" cmpd="sng">
+                    <a:ln w="12700" cap="flat" cmpd="sng">
                       <a:solidFill>
                         <a:srgbClr val="FF33CC"/>
                       </a:solidFill>
@@ -8529,7 +8512,7 @@
                       </a:pathLst>
                     </a:custGeom>
                     <a:noFill/>
-                    <a:ln w="28575" cap="flat" cmpd="sng">
+                    <a:ln w="12700" cap="flat" cmpd="sng">
                       <a:solidFill>
                         <a:srgbClr val="FF33CC"/>
                       </a:solidFill>
@@ -8629,7 +8612,7 @@
                       </a:pathLst>
                     </a:custGeom>
                     <a:noFill/>
-                    <a:ln w="28575" cap="flat" cmpd="sng">
+                    <a:ln w="12700" cap="flat" cmpd="sng">
                       <a:solidFill>
                         <a:srgbClr val="FF33CC"/>
                       </a:solidFill>
@@ -8712,7 +8695,7 @@
                       </a:pathLst>
                     </a:custGeom>
                     <a:noFill/>
-                    <a:ln w="28575" cap="flat" cmpd="sng">
+                    <a:ln w="12700" cap="flat" cmpd="sng">
                       <a:solidFill>
                         <a:srgbClr val="FF33CC"/>
                       </a:solidFill>
@@ -8846,7 +8829,7 @@
                       </a:pathLst>
                     </a:custGeom>
                     <a:noFill/>
-                    <a:ln w="28575" cap="flat" cmpd="sng">
+                    <a:ln w="12700" cap="flat" cmpd="sng">
                       <a:solidFill>
                         <a:srgbClr val="FF33CC"/>
                       </a:solidFill>
@@ -8929,7 +8912,7 @@
                       </a:pathLst>
                     </a:custGeom>
                     <a:noFill/>
-                    <a:ln w="28575" cap="flat" cmpd="sng">
+                    <a:ln w="12700" cap="flat" cmpd="sng">
                       <a:solidFill>
                         <a:srgbClr val="FF33CC"/>
                       </a:solidFill>
@@ -9029,7 +9012,7 @@
                       </a:pathLst>
                     </a:custGeom>
                     <a:noFill/>
-                    <a:ln w="28575" cap="flat" cmpd="sng">
+                    <a:ln w="12700" cap="flat" cmpd="sng">
                       <a:solidFill>
                         <a:srgbClr val="FF33CC"/>
                       </a:solidFill>
@@ -9112,7 +9095,7 @@
                       </a:pathLst>
                     </a:custGeom>
                     <a:noFill/>
-                    <a:ln w="28575" cap="flat" cmpd="sng">
+                    <a:ln w="12700" cap="flat" cmpd="sng">
                       <a:solidFill>
                         <a:srgbClr val="FF33CC"/>
                       </a:solidFill>
@@ -9229,7 +9212,7 @@
                       </a:pathLst>
                     </a:custGeom>
                     <a:noFill/>
-                    <a:ln w="28575" cap="flat" cmpd="sng">
+                    <a:ln w="12700" cap="flat" cmpd="sng">
                       <a:solidFill>
                         <a:srgbClr val="FF33CC"/>
                       </a:solidFill>
@@ -9312,7 +9295,7 @@
                       </a:pathLst>
                     </a:custGeom>
                     <a:noFill/>
-                    <a:ln w="28575" cap="flat" cmpd="sng">
+                    <a:ln w="12700" cap="flat" cmpd="sng">
                       <a:solidFill>
                         <a:srgbClr val="FF33CC"/>
                       </a:solidFill>
@@ -9412,7 +9395,7 @@
                       </a:pathLst>
                     </a:custGeom>
                     <a:noFill/>
-                    <a:ln w="28575" cap="flat" cmpd="sng">
+                    <a:ln w="12700" cap="flat" cmpd="sng">
                       <a:solidFill>
                         <a:srgbClr val="FF33CC"/>
                       </a:solidFill>
@@ -9495,7 +9478,7 @@
                       </a:pathLst>
                     </a:custGeom>
                     <a:noFill/>
-                    <a:ln w="28575" cap="flat" cmpd="sng">
+                    <a:ln w="12700" cap="flat" cmpd="sng">
                       <a:solidFill>
                         <a:srgbClr val="FF33CC"/>
                       </a:solidFill>
@@ -9615,7 +9598,7 @@
                 </a:pathLst>
               </a:custGeom>
               <a:noFill/>
-              <a:ln w="28575" cap="flat" cmpd="sng">
+              <a:ln w="12700" cap="flat" cmpd="sng">
                 <a:solidFill>
                   <a:srgbClr val="FF33CC"/>
                 </a:solidFill>
@@ -9698,7 +9681,7 @@
                 </a:pathLst>
               </a:custGeom>
               <a:noFill/>
-              <a:ln w="28575" cap="flat" cmpd="sng">
+              <a:ln w="12700" cap="flat" cmpd="sng">
                 <a:solidFill>
                   <a:srgbClr val="FF33CC"/>
                 </a:solidFill>
@@ -9798,7 +9781,7 @@
                 </a:pathLst>
               </a:custGeom>
               <a:noFill/>
-              <a:ln w="28575" cap="flat" cmpd="sng">
+              <a:ln w="12700" cap="flat" cmpd="sng">
                 <a:solidFill>
                   <a:srgbClr val="FF33CC"/>
                 </a:solidFill>
@@ -9881,7 +9864,7 @@
                 </a:pathLst>
               </a:custGeom>
               <a:noFill/>
-              <a:ln w="28575" cap="flat" cmpd="sng">
+              <a:ln w="12700" cap="flat" cmpd="sng">
                 <a:solidFill>
                   <a:srgbClr val="FF33CC"/>
                 </a:solidFill>
@@ -9946,7 +9929,7 @@
             </a:pathLst>
           </a:custGeom>
           <a:noFill/>
-          <a:ln w="28440">
+          <a:ln w="12700">
             <a:solidFill>
               <a:srgbClr val="008000"/>
             </a:solidFill>
@@ -10008,7 +9991,7 @@
             </a:pathLst>
           </a:custGeom>
           <a:noFill/>
-          <a:ln w="38160">
+          <a:ln w="12700">
             <a:solidFill>
               <a:srgbClr val="FF0000"/>
             </a:solidFill>
@@ -10043,7 +10026,7 @@
             <a:avLst/>
           </a:prstGeom>
           <a:noFill/>
-          <a:ln w="38160">
+          <a:ln w="12700">
             <a:solidFill>
               <a:srgbClr val="008000"/>
             </a:solidFill>
@@ -10096,7 +10079,7 @@
             <a:solidFill>
               <a:srgbClr val="FFFFFF"/>
             </a:solidFill>
-            <a:ln w="38160">
+            <a:ln w="12700">
               <a:solidFill>
                 <a:srgbClr val="000000"/>
               </a:solidFill>
@@ -10170,7 +10153,7 @@
                 </a:pathLst>
               </a:custGeom>
               <a:noFill/>
-              <a:ln w="38160">
+              <a:ln w="12700">
                 <a:solidFill>
                   <a:srgbClr val="000000"/>
                 </a:solidFill>
@@ -10228,7 +10211,7 @@
                 </a:pathLst>
               </a:custGeom>
               <a:noFill/>
-              <a:ln w="38160">
+              <a:ln w="12700">
                 <a:solidFill>
                   <a:srgbClr val="000000"/>
                 </a:solidFill>
@@ -10286,7 +10269,7 @@
                 </a:pathLst>
               </a:custGeom>
               <a:noFill/>
-              <a:ln w="38160">
+              <a:ln w="12700">
                 <a:solidFill>
                   <a:srgbClr val="000000"/>
                 </a:solidFill>
@@ -10325,7 +10308,7 @@
           <a:solidFill>
             <a:srgbClr val="FFFFFF"/>
           </a:solidFill>
-          <a:ln w="38160">
+          <a:ln w="12700">
             <a:solidFill>
               <a:srgbClr val="008000"/>
             </a:solidFill>
@@ -10362,7 +10345,7 @@
           <a:solidFill>
             <a:srgbClr val="FFFFFF"/>
           </a:solidFill>
-          <a:ln w="38160">
+          <a:ln w="12700">
             <a:solidFill>
               <a:srgbClr val="008000"/>
             </a:solidFill>
@@ -10430,7 +10413,7 @@
             </a:pathLst>
           </a:custGeom>
           <a:noFill/>
-          <a:ln w="19080">
+          <a:ln w="12700">
             <a:solidFill>
               <a:srgbClr val="008000"/>
             </a:solidFill>
@@ -10467,7 +10450,7 @@
           <a:solidFill>
             <a:srgbClr val="FFFFFF"/>
           </a:solidFill>
-          <a:ln w="38160">
+          <a:ln w="12700">
             <a:solidFill>
               <a:srgbClr val="008000"/>
             </a:solidFill>
@@ -10529,7 +10512,7 @@
             </a:pathLst>
           </a:custGeom>
           <a:noFill/>
-          <a:ln w="19080">
+          <a:ln w="12700">
             <a:solidFill>
               <a:srgbClr val="008000"/>
             </a:solidFill>
@@ -10564,7 +10547,7 @@
             <a:avLst/>
           </a:prstGeom>
           <a:noFill/>
-          <a:ln w="9525">
+          <a:ln w="12700">
             <a:noFill/>
             <a:round/>
             <a:headEnd/>
@@ -10650,7 +10633,7 @@
             <a:avLst/>
           </a:prstGeom>
           <a:noFill/>
-          <a:ln w="9525">
+          <a:ln w="12700">
             <a:noFill/>
             <a:round/>
             <a:headEnd/>
@@ -10766,7 +10749,7 @@
           <a:solidFill>
             <a:srgbClr val="FFFFFF"/>
           </a:solidFill>
-          <a:ln w="38160">
+          <a:ln w="12700">
             <a:solidFill>
               <a:srgbClr val="008000"/>
             </a:solidFill>
@@ -10803,7 +10786,7 @@
           <a:solidFill>
             <a:srgbClr val="FFFFFF"/>
           </a:solidFill>
-          <a:ln w="38160">
+          <a:ln w="12700">
             <a:solidFill>
               <a:srgbClr val="008000"/>
             </a:solidFill>
@@ -10838,7 +10821,7 @@
             <a:avLst/>
           </a:prstGeom>
           <a:noFill/>
-          <a:ln w="9525">
+          <a:ln w="12700">
             <a:noFill/>
             <a:round/>
             <a:headEnd/>
@@ -10932,7 +10915,7 @@
             <a:avLst/>
           </a:prstGeom>
           <a:noFill/>
-          <a:ln w="9525">
+          <a:ln w="12700">
             <a:noFill/>
             <a:round/>
             <a:headEnd/>
@@ -11005,7 +10988,7 @@
             <a:avLst/>
           </a:prstGeom>
           <a:noFill/>
-          <a:ln w="9525">
+          <a:ln w="12700">
             <a:noFill/>
             <a:round/>
             <a:headEnd/>
@@ -11142,7 +11125,7 @@
             <a:solidFill>
               <a:srgbClr val="FFFFFF"/>
             </a:solidFill>
-            <a:ln w="38160">
+            <a:ln w="12700">
               <a:solidFill>
                 <a:srgbClr val="FF0000"/>
               </a:solidFill>
@@ -11216,7 +11199,7 @@
                 </a:pathLst>
               </a:custGeom>
               <a:noFill/>
-              <a:ln w="38160">
+              <a:ln w="12700">
                 <a:solidFill>
                   <a:srgbClr val="FF0000"/>
                 </a:solidFill>
@@ -11274,7 +11257,7 @@
                 </a:pathLst>
               </a:custGeom>
               <a:noFill/>
-              <a:ln w="38160">
+              <a:ln w="12700">
                 <a:solidFill>
                   <a:srgbClr val="FF0000"/>
                 </a:solidFill>
@@ -11332,7 +11315,7 @@
                 </a:pathLst>
               </a:custGeom>
               <a:noFill/>
-              <a:ln w="38160">
+              <a:ln w="12700">
                 <a:solidFill>
                   <a:srgbClr val="FF0000"/>
                 </a:solidFill>
@@ -11371,7 +11354,7 @@
           <a:solidFill>
             <a:srgbClr val="FFFFFF"/>
           </a:solidFill>
-          <a:ln w="38160">
+          <a:ln w="12700">
             <a:solidFill>
               <a:srgbClr val="FF0000"/>
             </a:solidFill>
@@ -11406,7 +11389,7 @@
             <a:avLst/>
           </a:prstGeom>
           <a:noFill/>
-          <a:ln w="9525">
+          <a:ln w="12700">
             <a:noFill/>
             <a:round/>
             <a:headEnd/>
@@ -11506,7 +11489,7 @@
             <a:solidFill>
               <a:srgbClr val="FFFFFF"/>
             </a:solidFill>
-            <a:ln w="38160">
+            <a:ln w="12700">
               <a:solidFill>
                 <a:srgbClr val="FF0000"/>
               </a:solidFill>
@@ -11580,7 +11563,7 @@
                 </a:pathLst>
               </a:custGeom>
               <a:noFill/>
-              <a:ln w="38160">
+              <a:ln w="12700">
                 <a:solidFill>
                   <a:srgbClr val="FF0000"/>
                 </a:solidFill>
@@ -11638,7 +11621,7 @@
                 </a:pathLst>
               </a:custGeom>
               <a:noFill/>
-              <a:ln w="38160">
+              <a:ln w="12700">
                 <a:solidFill>
                   <a:srgbClr val="FF0000"/>
                 </a:solidFill>
@@ -11696,7 +11679,7 @@
                 </a:pathLst>
               </a:custGeom>
               <a:noFill/>
-              <a:ln w="38160">
+              <a:ln w="12700">
                 <a:solidFill>
                   <a:srgbClr val="FF0000"/>
                 </a:solidFill>
@@ -11735,7 +11718,7 @@
           <a:solidFill>
             <a:srgbClr val="FFFFFF"/>
           </a:solidFill>
-          <a:ln w="38160">
+          <a:ln w="12700">
             <a:solidFill>
               <a:srgbClr val="FF0000"/>
             </a:solidFill>
@@ -11770,7 +11753,7 @@
             <a:avLst/>
           </a:prstGeom>
           <a:noFill/>
-          <a:ln w="9525">
+          <a:ln w="12700">
             <a:noFill/>
             <a:round/>
             <a:headEnd/>
@@ -11854,7 +11837,7 @@
           <a:solidFill>
             <a:srgbClr val="FFFFFF"/>
           </a:solidFill>
-          <a:ln w="38160">
+          <a:ln w="12700">
             <a:solidFill>
               <a:srgbClr val="FF0000"/>
             </a:solidFill>
@@ -11922,7 +11905,7 @@
             </a:pathLst>
           </a:custGeom>
           <a:noFill/>
-          <a:ln w="19080">
+          <a:ln w="12700">
             <a:solidFill>
               <a:srgbClr val="FF0000"/>
             </a:solidFill>
@@ -11957,7 +11940,7 @@
             <a:avLst/>
           </a:prstGeom>
           <a:noFill/>
-          <a:ln w="9525">
+          <a:ln w="12700">
             <a:noFill/>
             <a:round/>
             <a:headEnd/>
@@ -12107,7 +12090,7 @@
           <a:solidFill>
             <a:srgbClr val="FFFFFF"/>
           </a:solidFill>
-          <a:ln w="38160">
+          <a:ln w="12700">
             <a:solidFill>
               <a:srgbClr val="FF0000"/>
             </a:solidFill>
@@ -12142,7 +12125,7 @@
             <a:avLst/>
           </a:prstGeom>
           <a:noFill/>
-          <a:ln w="9525">
+          <a:ln w="12700">
             <a:noFill/>
             <a:round/>
             <a:headEnd/>
@@ -12215,7 +12198,7 @@
             <a:avLst/>
           </a:prstGeom>
           <a:noFill/>
-          <a:ln w="9525">
+          <a:ln w="12700">
             <a:noFill/>
             <a:round/>
             <a:headEnd/>
@@ -12340,7 +12323,7 @@
           <a:solidFill>
             <a:srgbClr val="FFFFFF"/>
           </a:solidFill>
-          <a:ln w="38160">
+          <a:ln w="12700">
             <a:solidFill>
               <a:srgbClr val="FF0000"/>
             </a:solidFill>
@@ -12375,7 +12358,7 @@
             <a:avLst/>
           </a:prstGeom>
           <a:noFill/>
-          <a:ln w="9525">
+          <a:ln w="12700">
             <a:noFill/>
             <a:round/>
             <a:headEnd/>
@@ -12466,7 +12449,7 @@
             <a:solidFill>
               <a:srgbClr val="FFFFFF"/>
             </a:solidFill>
-            <a:ln w="38160">
+            <a:ln w="12700">
               <a:solidFill>
                 <a:srgbClr val="CC0099"/>
               </a:solidFill>
@@ -12542,7 +12525,7 @@
             <a:solidFill>
               <a:srgbClr val="FFFFFF"/>
             </a:solidFill>
-            <a:ln w="38160">
+            <a:ln w="12700">
               <a:solidFill>
                 <a:srgbClr val="CC0099"/>
               </a:solidFill>
@@ -12578,7 +12561,7 @@
             <a:avLst/>
           </a:prstGeom>
           <a:noFill/>
-          <a:ln w="28440">
+          <a:ln w="12700">
             <a:solidFill>
               <a:srgbClr val="000000"/>
             </a:solidFill>
@@ -12613,7 +12596,7 @@
             <a:avLst/>
           </a:prstGeom>
           <a:noFill/>
-          <a:ln w="28440">
+          <a:ln w="12700">
             <a:solidFill>
               <a:srgbClr val="000000"/>
             </a:solidFill>
@@ -12648,7 +12631,7 @@
             <a:avLst/>
           </a:prstGeom>
           <a:noFill/>
-          <a:ln w="28440">
+          <a:ln w="12700">
             <a:solidFill>
               <a:srgbClr val="000000"/>
             </a:solidFill>
@@ -12685,7 +12668,7 @@
           <a:solidFill>
             <a:srgbClr val="FFFFFF"/>
           </a:solidFill>
-          <a:ln w="38160">
+          <a:ln w="12700">
             <a:solidFill>
               <a:srgbClr val="008000"/>
             </a:solidFill>
@@ -12720,7 +12703,7 @@
             <a:avLst/>
           </a:prstGeom>
           <a:noFill/>
-          <a:ln w="28440">
+          <a:ln w="12700">
             <a:solidFill>
               <a:srgbClr val="008000"/>
             </a:solidFill>
@@ -12755,7 +12738,7 @@
             <a:avLst/>
           </a:prstGeom>
           <a:noFill/>
-          <a:ln w="9525">
+          <a:ln w="12700">
             <a:noFill/>
             <a:round/>
             <a:headEnd/>
@@ -12846,7 +12829,7 @@
             <a:solidFill>
               <a:srgbClr val="FFFFFF"/>
             </a:solidFill>
-            <a:ln w="38160">
+            <a:ln w="12700">
               <a:solidFill>
                 <a:srgbClr val="008000"/>
               </a:solidFill>
@@ -12922,7 +12905,7 @@
             <a:solidFill>
               <a:srgbClr val="FFFFFF"/>
             </a:solidFill>
-            <a:ln w="38160">
+            <a:ln w="12700">
               <a:solidFill>
                 <a:srgbClr val="008000"/>
               </a:solidFill>
@@ -13114,7 +13097,7 @@
             <a:avLst/>
           </a:prstGeom>
           <a:noFill/>
-          <a:ln w="9360">
+          <a:ln w="12700">
             <a:solidFill>
               <a:srgbClr val="CC0099"/>
             </a:solidFill>
@@ -13194,7 +13177,7 @@
             </a:pathLst>
           </a:custGeom>
           <a:noFill/>
-          <a:ln w="9360">
+          <a:ln w="12700">
             <a:solidFill>
               <a:srgbClr val="CC0099"/>
             </a:solidFill>
@@ -13229,7 +13212,7 @@
             <a:avLst/>
           </a:prstGeom>
           <a:noFill/>
-          <a:ln w="9360">
+          <a:ln w="12700">
             <a:solidFill>
               <a:srgbClr val="009900"/>
             </a:solidFill>
@@ -13264,7 +13247,7 @@
             <a:avLst/>
           </a:prstGeom>
           <a:noFill/>
-          <a:ln w="9360">
+          <a:ln w="12700">
             <a:solidFill>
               <a:srgbClr val="CC0099"/>
             </a:solidFill>
@@ -13299,7 +13282,7 @@
             <a:avLst/>
           </a:prstGeom>
           <a:noFill/>
-          <a:ln w="9360">
+          <a:ln w="12700">
             <a:solidFill>
               <a:srgbClr val="009900"/>
             </a:solidFill>
@@ -13334,7 +13317,7 @@
             <a:avLst/>
           </a:prstGeom>
           <a:noFill/>
-          <a:ln w="9360">
+          <a:ln w="12700">
             <a:solidFill>
               <a:srgbClr val="CC0099"/>
             </a:solidFill>
@@ -13371,7 +13354,7 @@
           <a:solidFill>
             <a:srgbClr val="FFFFFF"/>
           </a:solidFill>
-          <a:ln w="28440">
+          <a:ln w="12700">
             <a:solidFill>
               <a:srgbClr val="000000"/>
             </a:solidFill>
@@ -13406,7 +13389,7 @@
             <a:avLst/>
           </a:prstGeom>
           <a:noFill/>
-          <a:ln w="9525">
+          <a:ln w="12700">
             <a:noFill/>
             <a:round/>
             <a:headEnd/>
@@ -13479,7 +13462,7 @@
             <a:avLst/>
           </a:prstGeom>
           <a:noFill/>
-          <a:ln w="9525">
+          <a:ln w="12700">
             <a:noFill/>
             <a:round/>
             <a:headEnd/>
@@ -13566,7 +13549,7 @@
               <a:avLst/>
             </a:prstGeom>
             <a:noFill/>
-            <a:ln w="38100">
+            <a:ln w="12700">
               <a:solidFill>
                 <a:schemeClr val="tx1"/>
               </a:solidFill>
@@ -13600,7 +13583,7 @@
             <a:prstGeom prst="line">
               <a:avLst/>
             </a:prstGeom>
-            <a:ln w="38100">
+            <a:ln w="12700">
               <a:solidFill>
                 <a:schemeClr val="tx1"/>
               </a:solidFill>
@@ -13635,7 +13618,7 @@
             <a:prstGeom prst="line">
               <a:avLst/>
             </a:prstGeom>
-            <a:ln w="38100">
+            <a:ln w="12700">
               <a:solidFill>
                 <a:schemeClr val="tx1"/>
               </a:solidFill>
@@ -13672,7 +13655,7 @@
             <a:avLst/>
           </a:prstGeom>
           <a:noFill/>
-          <a:ln>
+          <a:ln w="12700">
             <a:solidFill>
               <a:schemeClr val="tx1"/>
             </a:solidFill>
@@ -13745,7 +13728,7 @@
           <a:prstGeom prst="line">
             <a:avLst/>
           </a:prstGeom>
-          <a:ln w="28575">
+          <a:ln w="12700">
             <a:solidFill>
               <a:srgbClr val="7030A0"/>
             </a:solidFill>
@@ -13795,8 +13778,10 @@
             </a:gsLst>
             <a:lin ang="5400000" scaled="1"/>
           </a:gradFill>
-          <a:ln w="9525">
-            <a:noFill/>
+          <a:ln w="12700">
+            <a:solidFill>
+              <a:schemeClr val="tx1"/>
+            </a:solidFill>
             <a:round/>
             <a:headEnd/>
             <a:tailEnd/>
@@ -13828,7 +13813,7 @@
             <a:avLst/>
           </a:prstGeom>
           <a:noFill/>
-          <a:ln w="9525">
+          <a:ln w="12700">
             <a:noFill/>
             <a:round/>
             <a:headEnd/>
@@ -13903,7 +13888,7 @@
           <a:solidFill>
             <a:srgbClr val="FFFFFF"/>
           </a:solidFill>
-          <a:ln w="38160">
+          <a:ln w="12700">
             <a:solidFill>
               <a:srgbClr val="7030A0"/>
             </a:solidFill>
@@ -13972,7 +13957,7 @@
             </a:pathLst>
           </a:custGeom>
           <a:noFill/>
-          <a:ln w="19080">
+          <a:ln w="12700">
             <a:solidFill>
               <a:srgbClr val="7030A0"/>
             </a:solidFill>
@@ -14009,7 +13994,7 @@
           <a:solidFill>
             <a:srgbClr val="FFFFFF"/>
           </a:solidFill>
-          <a:ln w="38160">
+          <a:ln w="12700">
             <a:solidFill>
               <a:srgbClr val="7030A0"/>
             </a:solidFill>
@@ -14078,7 +14063,7 @@
             </a:pathLst>
           </a:custGeom>
           <a:noFill/>
-          <a:ln w="19080">
+          <a:ln w="12700">
             <a:solidFill>
               <a:srgbClr val="7030A0"/>
             </a:solidFill>
@@ -14110,7 +14095,7 @@
           <a:prstGeom prst="line">
             <a:avLst/>
           </a:prstGeom>
-          <a:ln w="28575">
+          <a:ln w="12700">
             <a:solidFill>
               <a:srgbClr val="7030A0"/>
             </a:solidFill>
@@ -14150,7 +14135,7 @@
           <a:solidFill>
             <a:srgbClr val="FFFFFF"/>
           </a:solidFill>
-          <a:ln w="38160">
+          <a:ln w="12700">
             <a:solidFill>
               <a:srgbClr val="7030A0"/>
             </a:solidFill>
@@ -14185,7 +14170,7 @@
           <a:prstGeom prst="line">
             <a:avLst/>
           </a:prstGeom>
-          <a:ln w="28575">
+          <a:ln w="12700">
             <a:solidFill>
               <a:srgbClr val="7030A0"/>
             </a:solidFill>
@@ -14293,7 +14278,7 @@
           <a:prstGeom prst="line">
             <a:avLst/>
           </a:prstGeom>
-          <a:ln w="28575">
+          <a:ln w="12700">
             <a:solidFill>
               <a:srgbClr val="7030A0"/>
             </a:solidFill>
@@ -14376,7 +14361,7 @@
             </a:pathLst>
           </a:custGeom>
           <a:noFill/>
-          <a:ln w="9360">
+          <a:ln w="12700">
             <a:solidFill>
               <a:srgbClr val="7030A0"/>
             </a:solidFill>
@@ -14482,14 +14467,14 @@
         </p:nvSpPr>
         <p:spPr bwMode="auto">
           <a:xfrm rot="16200000">
-            <a:off x="2524521" y="4423922"/>
+            <a:off x="1704871" y="4484210"/>
             <a:ext cx="694719" cy="433068"/>
           </a:xfrm>
           <a:prstGeom prst="rect">
             <a:avLst/>
           </a:prstGeom>
           <a:noFill/>
-          <a:ln w="9525">
+          <a:ln w="12700">
             <a:noFill/>
             <a:round/>
             <a:headEnd/>
@@ -14610,7 +14595,7 @@
           <a:solidFill>
             <a:srgbClr val="FFFFFF"/>
           </a:solidFill>
-          <a:ln w="28440">
+          <a:ln w="12700">
             <a:solidFill>
               <a:srgbClr val="000000"/>
             </a:solidFill>
@@ -14647,7 +14632,7 @@
           <a:solidFill>
             <a:srgbClr val="FFFFFF"/>
           </a:solidFill>
-          <a:ln w="28440">
+          <a:ln w="12700">
             <a:solidFill>
               <a:srgbClr val="000000"/>
             </a:solidFill>

</xml_diff>

<commit_message>
Worked on the theory, processor design and measurement setup chapters.
</commit_message>
<xml_diff>
--- a/material/figures/2-qubit-processor/measurement setup.pptx
+++ b/material/figures/2-qubit-processor/measurement setup.pptx
@@ -289,7 +289,7 @@
             <a:fld id="{B9E39FB9-1184-4BFA-89AE-DC8B5833E156}" type="datetimeFigureOut">
               <a:rPr lang="de-DE" smtClean="0"/>
               <a:pPr/>
-              <a:t>11.06.2012</a:t>
+              <a:t>23.08.2012</a:t>
             </a:fld>
             <a:endParaRPr lang="de-DE"/>
           </a:p>
@@ -456,7 +456,7 @@
             <a:fld id="{B9E39FB9-1184-4BFA-89AE-DC8B5833E156}" type="datetimeFigureOut">
               <a:rPr lang="de-DE" smtClean="0"/>
               <a:pPr/>
-              <a:t>11.06.2012</a:t>
+              <a:t>23.08.2012</a:t>
             </a:fld>
             <a:endParaRPr lang="de-DE"/>
           </a:p>
@@ -633,7 +633,7 @@
             <a:fld id="{B9E39FB9-1184-4BFA-89AE-DC8B5833E156}" type="datetimeFigureOut">
               <a:rPr lang="de-DE" smtClean="0"/>
               <a:pPr/>
-              <a:t>11.06.2012</a:t>
+              <a:t>23.08.2012</a:t>
             </a:fld>
             <a:endParaRPr lang="de-DE"/>
           </a:p>
@@ -800,7 +800,7 @@
             <a:fld id="{B9E39FB9-1184-4BFA-89AE-DC8B5833E156}" type="datetimeFigureOut">
               <a:rPr lang="de-DE" smtClean="0"/>
               <a:pPr/>
-              <a:t>11.06.2012</a:t>
+              <a:t>23.08.2012</a:t>
             </a:fld>
             <a:endParaRPr lang="de-DE"/>
           </a:p>
@@ -1043,7 +1043,7 @@
             <a:fld id="{B9E39FB9-1184-4BFA-89AE-DC8B5833E156}" type="datetimeFigureOut">
               <a:rPr lang="de-DE" smtClean="0"/>
               <a:pPr/>
-              <a:t>11.06.2012</a:t>
+              <a:t>23.08.2012</a:t>
             </a:fld>
             <a:endParaRPr lang="de-DE"/>
           </a:p>
@@ -1328,7 +1328,7 @@
             <a:fld id="{B9E39FB9-1184-4BFA-89AE-DC8B5833E156}" type="datetimeFigureOut">
               <a:rPr lang="de-DE" smtClean="0"/>
               <a:pPr/>
-              <a:t>11.06.2012</a:t>
+              <a:t>23.08.2012</a:t>
             </a:fld>
             <a:endParaRPr lang="de-DE"/>
           </a:p>
@@ -1747,7 +1747,7 @@
             <a:fld id="{B9E39FB9-1184-4BFA-89AE-DC8B5833E156}" type="datetimeFigureOut">
               <a:rPr lang="de-DE" smtClean="0"/>
               <a:pPr/>
-              <a:t>11.06.2012</a:t>
+              <a:t>23.08.2012</a:t>
             </a:fld>
             <a:endParaRPr lang="de-DE"/>
           </a:p>
@@ -1862,7 +1862,7 @@
             <a:fld id="{B9E39FB9-1184-4BFA-89AE-DC8B5833E156}" type="datetimeFigureOut">
               <a:rPr lang="de-DE" smtClean="0"/>
               <a:pPr/>
-              <a:t>11.06.2012</a:t>
+              <a:t>23.08.2012</a:t>
             </a:fld>
             <a:endParaRPr lang="de-DE"/>
           </a:p>
@@ -1954,7 +1954,7 @@
             <a:fld id="{B9E39FB9-1184-4BFA-89AE-DC8B5833E156}" type="datetimeFigureOut">
               <a:rPr lang="de-DE" smtClean="0"/>
               <a:pPr/>
-              <a:t>11.06.2012</a:t>
+              <a:t>23.08.2012</a:t>
             </a:fld>
             <a:endParaRPr lang="de-DE"/>
           </a:p>
@@ -2228,7 +2228,7 @@
             <a:fld id="{B9E39FB9-1184-4BFA-89AE-DC8B5833E156}" type="datetimeFigureOut">
               <a:rPr lang="de-DE" smtClean="0"/>
               <a:pPr/>
-              <a:t>11.06.2012</a:t>
+              <a:t>23.08.2012</a:t>
             </a:fld>
             <a:endParaRPr lang="de-DE"/>
           </a:p>
@@ -2478,7 +2478,7 @@
             <a:fld id="{B9E39FB9-1184-4BFA-89AE-DC8B5833E156}" type="datetimeFigureOut">
               <a:rPr lang="de-DE" smtClean="0"/>
               <a:pPr/>
-              <a:t>11.06.2012</a:t>
+              <a:t>23.08.2012</a:t>
             </a:fld>
             <a:endParaRPr lang="de-DE"/>
           </a:p>
@@ -2688,7 +2688,7 @@
             <a:fld id="{B9E39FB9-1184-4BFA-89AE-DC8B5833E156}" type="datetimeFigureOut">
               <a:rPr lang="de-DE" smtClean="0"/>
               <a:pPr/>
-              <a:t>11.06.2012</a:t>
+              <a:t>23.08.2012</a:t>
             </a:fld>
             <a:endParaRPr lang="de-DE"/>
           </a:p>
@@ -3162,7 +3162,10 @@
           <a:lstStyle/>
           <a:p>
             <a:pPr algn="ctr"/>
-            <a:endParaRPr lang="de-DE"/>
+            <a:endParaRPr lang="de-DE">
+              <a:latin typeface="Arial" pitchFamily="34" charset="0"/>
+              <a:cs typeface="Arial" pitchFamily="34" charset="0"/>
+            </a:endParaRPr>
           </a:p>
         </p:txBody>
       </p:sp>
@@ -3269,7 +3272,10 @@
           <a:lstStyle/>
           <a:p>
             <a:pPr algn="ctr"/>
-            <a:endParaRPr lang="de-DE"/>
+            <a:endParaRPr lang="de-DE">
+              <a:latin typeface="Arial" pitchFamily="34" charset="0"/>
+              <a:cs typeface="Arial" pitchFamily="34" charset="0"/>
+            </a:endParaRPr>
           </a:p>
         </p:txBody>
       </p:sp>
@@ -3304,7 +3310,10 @@
           <a:bodyPr/>
           <a:lstStyle/>
           <a:p>
-            <a:endParaRPr lang="de-DE" sz="1100"/>
+            <a:endParaRPr lang="de-DE" sz="1100">
+              <a:latin typeface="Arial" pitchFamily="34" charset="0"/>
+              <a:cs typeface="Arial" pitchFamily="34" charset="0"/>
+            </a:endParaRPr>
           </a:p>
         </p:txBody>
       </p:sp>
@@ -3339,7 +3348,10 @@
           <a:bodyPr/>
           <a:lstStyle/>
           <a:p>
-            <a:endParaRPr lang="de-DE" sz="1100"/>
+            <a:endParaRPr lang="de-DE" sz="1100">
+              <a:latin typeface="Arial" pitchFamily="34" charset="0"/>
+              <a:cs typeface="Arial" pitchFamily="34" charset="0"/>
+            </a:endParaRPr>
           </a:p>
         </p:txBody>
       </p:sp>
@@ -3419,7 +3431,10 @@
           <a:bodyPr wrap="none" anchor="ctr"/>
           <a:lstStyle/>
           <a:p>
-            <a:endParaRPr lang="de-DE" sz="1100"/>
+            <a:endParaRPr lang="de-DE" sz="1100">
+              <a:latin typeface="Arial" pitchFamily="34" charset="0"/>
+              <a:cs typeface="Arial" pitchFamily="34" charset="0"/>
+            </a:endParaRPr>
           </a:p>
         </p:txBody>
       </p:sp>
@@ -3499,7 +3514,10 @@
           <a:bodyPr wrap="none" anchor="ctr"/>
           <a:lstStyle/>
           <a:p>
-            <a:endParaRPr lang="de-DE" sz="1100"/>
+            <a:endParaRPr lang="de-DE" sz="1100">
+              <a:latin typeface="Arial" pitchFamily="34" charset="0"/>
+              <a:cs typeface="Arial" pitchFamily="34" charset="0"/>
+            </a:endParaRPr>
           </a:p>
         </p:txBody>
       </p:sp>
@@ -3519,7 +3537,9 @@
           </a:prstGeom>
           <a:ln w="12700">
             <a:solidFill>
-              <a:srgbClr val="FF0000"/>
+              <a:schemeClr val="bg1">
+                <a:lumMod val="85000"/>
+              </a:schemeClr>
             </a:solidFill>
             <a:prstDash val="sysDash"/>
           </a:ln>
@@ -3555,7 +3575,9 @@
           </a:prstGeom>
           <a:ln w="12700">
             <a:solidFill>
-              <a:srgbClr val="7030A0"/>
+              <a:schemeClr val="bg1">
+                <a:lumMod val="85000"/>
+              </a:schemeClr>
             </a:solidFill>
             <a:prstDash val="sysDash"/>
           </a:ln>
@@ -3591,8 +3613,8 @@
           </a:prstGeom>
           <a:ln w="12700">
             <a:solidFill>
-              <a:schemeClr val="accent4">
-                <a:lumMod val="75000"/>
+              <a:schemeClr val="bg1">
+                <a:lumMod val="85000"/>
               </a:schemeClr>
             </a:solidFill>
             <a:prstDash val="sysDash"/>
@@ -3629,7 +3651,9 @@
           </a:prstGeom>
           <a:ln w="12700">
             <a:solidFill>
-              <a:srgbClr val="0070C0"/>
+              <a:schemeClr val="bg1">
+                <a:lumMod val="85000"/>
+              </a:schemeClr>
             </a:solidFill>
             <a:prstDash val="sysDash"/>
           </a:ln>
@@ -3699,8 +3723,8 @@
         </p:nvSpPr>
         <p:spPr bwMode="auto">
           <a:xfrm>
-            <a:off x="5770926" y="4106092"/>
-            <a:ext cx="511976" cy="263791"/>
+            <a:off x="5751392" y="4173321"/>
+            <a:ext cx="566479" cy="263791"/>
           </a:xfrm>
           <a:prstGeom prst="rect">
             <a:avLst/>
@@ -3756,6 +3780,8 @@
                 <a:solidFill>
                   <a:srgbClr val="000000"/>
                 </a:solidFill>
+                <a:latin typeface="Arial" pitchFamily="34" charset="0"/>
+                <a:cs typeface="Arial" pitchFamily="34" charset="0"/>
               </a:rPr>
               <a:t>18mK</a:t>
             </a:r>
@@ -3772,8 +3798,8 @@
         </p:nvSpPr>
         <p:spPr bwMode="auto">
           <a:xfrm>
-            <a:off x="5791650" y="2337081"/>
-            <a:ext cx="327632" cy="263791"/>
+            <a:off x="5751392" y="2337081"/>
+            <a:ext cx="362898" cy="263791"/>
           </a:xfrm>
           <a:prstGeom prst="rect">
             <a:avLst/>
@@ -3829,6 +3855,8 @@
                 <a:solidFill>
                   <a:srgbClr val="000000"/>
                 </a:solidFill>
+                <a:latin typeface="Arial" pitchFamily="34" charset="0"/>
+                <a:cs typeface="Arial" pitchFamily="34" charset="0"/>
               </a:rPr>
               <a:t>4K</a:t>
             </a:r>
@@ -3845,8 +3873,8 @@
         </p:nvSpPr>
         <p:spPr bwMode="auto">
           <a:xfrm>
-            <a:off x="5783472" y="1844824"/>
-            <a:ext cx="471902" cy="263791"/>
+            <a:off x="5751392" y="1844824"/>
+            <a:ext cx="519992" cy="263791"/>
           </a:xfrm>
           <a:prstGeom prst="rect">
             <a:avLst/>
@@ -3902,6 +3930,8 @@
                 <a:solidFill>
                   <a:srgbClr val="000000"/>
                 </a:solidFill>
+                <a:latin typeface="Arial" pitchFamily="34" charset="0"/>
+                <a:cs typeface="Arial" pitchFamily="34" charset="0"/>
               </a:rPr>
               <a:t>300K</a:t>
             </a:r>
@@ -3918,8 +3948,8 @@
         </p:nvSpPr>
         <p:spPr bwMode="auto">
           <a:xfrm>
-            <a:off x="5751392" y="3492728"/>
-            <a:ext cx="584112" cy="263791"/>
+            <a:off x="5751392" y="3645024"/>
+            <a:ext cx="645026" cy="263791"/>
           </a:xfrm>
           <a:prstGeom prst="rect">
             <a:avLst/>
@@ -3975,6 +4005,8 @@
                 <a:solidFill>
                   <a:srgbClr val="000000"/>
                 </a:solidFill>
+                <a:latin typeface="Arial" pitchFamily="34" charset="0"/>
+                <a:cs typeface="Arial" pitchFamily="34" charset="0"/>
               </a:rPr>
               <a:t>600mK</a:t>
             </a:r>
@@ -4028,7 +4060,10 @@
             <a:bodyPr wrap="none" anchor="ctr"/>
             <a:lstStyle/>
             <a:p>
-              <a:endParaRPr lang="de-DE" sz="1100"/>
+              <a:endParaRPr lang="de-DE" sz="1100">
+                <a:latin typeface="Arial" pitchFamily="34" charset="0"/>
+                <a:cs typeface="Arial" pitchFamily="34" charset="0"/>
+              </a:endParaRPr>
             </a:p>
           </p:txBody>
         </p:sp>
@@ -4065,7 +4100,10 @@
             <a:bodyPr wrap="none" anchor="ctr"/>
             <a:lstStyle/>
             <a:p>
-              <a:endParaRPr lang="de-DE" sz="1100"/>
+              <a:endParaRPr lang="de-DE" sz="1100">
+                <a:latin typeface="Arial" pitchFamily="34" charset="0"/>
+                <a:cs typeface="Arial" pitchFamily="34" charset="0"/>
+              </a:endParaRPr>
             </a:p>
           </p:txBody>
         </p:sp>
@@ -4102,7 +4140,10 @@
             <a:bodyPr wrap="none" anchor="ctr"/>
             <a:lstStyle/>
             <a:p>
-              <a:endParaRPr lang="de-DE" sz="1100"/>
+              <a:endParaRPr lang="de-DE" sz="1100">
+                <a:latin typeface="Arial" pitchFamily="34" charset="0"/>
+                <a:cs typeface="Arial" pitchFamily="34" charset="0"/>
+              </a:endParaRPr>
             </a:p>
           </p:txBody>
         </p:sp>
@@ -4139,7 +4180,10 @@
             <a:bodyPr wrap="none" anchor="ctr"/>
             <a:lstStyle/>
             <a:p>
-              <a:endParaRPr lang="de-DE" sz="1100"/>
+              <a:endParaRPr lang="de-DE" sz="1100">
+                <a:latin typeface="Arial" pitchFamily="34" charset="0"/>
+                <a:cs typeface="Arial" pitchFamily="34" charset="0"/>
+              </a:endParaRPr>
             </a:p>
           </p:txBody>
         </p:sp>
@@ -4176,7 +4220,10 @@
             <a:bodyPr wrap="none" anchor="ctr"/>
             <a:lstStyle/>
             <a:p>
-              <a:endParaRPr lang="de-DE" sz="1100"/>
+              <a:endParaRPr lang="de-DE" sz="1100">
+                <a:latin typeface="Arial" pitchFamily="34" charset="0"/>
+                <a:cs typeface="Arial" pitchFamily="34" charset="0"/>
+              </a:endParaRPr>
             </a:p>
           </p:txBody>
         </p:sp>
@@ -4213,7 +4260,10 @@
             <a:bodyPr wrap="none" anchor="ctr"/>
             <a:lstStyle/>
             <a:p>
-              <a:endParaRPr lang="de-DE" sz="1100"/>
+              <a:endParaRPr lang="de-DE" sz="1100">
+                <a:latin typeface="Arial" pitchFamily="34" charset="0"/>
+                <a:cs typeface="Arial" pitchFamily="34" charset="0"/>
+              </a:endParaRPr>
             </a:p>
           </p:txBody>
         </p:sp>
@@ -4250,7 +4300,10 @@
             <a:bodyPr wrap="none" anchor="ctr"/>
             <a:lstStyle/>
             <a:p>
-              <a:endParaRPr lang="de-DE" sz="1100"/>
+              <a:endParaRPr lang="de-DE" sz="1100">
+                <a:latin typeface="Arial" pitchFamily="34" charset="0"/>
+                <a:cs typeface="Arial" pitchFamily="34" charset="0"/>
+              </a:endParaRPr>
             </a:p>
           </p:txBody>
         </p:sp>
@@ -4287,7 +4340,10 @@
             <a:bodyPr wrap="none" anchor="ctr"/>
             <a:lstStyle/>
             <a:p>
-              <a:endParaRPr lang="de-DE" sz="1100"/>
+              <a:endParaRPr lang="de-DE" sz="1100">
+                <a:latin typeface="Arial" pitchFamily="34" charset="0"/>
+                <a:cs typeface="Arial" pitchFamily="34" charset="0"/>
+              </a:endParaRPr>
             </a:p>
           </p:txBody>
         </p:sp>
@@ -4324,7 +4380,10 @@
             <a:bodyPr wrap="none" anchor="ctr"/>
             <a:lstStyle/>
             <a:p>
-              <a:endParaRPr lang="de-DE" sz="1100"/>
+              <a:endParaRPr lang="de-DE" sz="1100">
+                <a:latin typeface="Arial" pitchFamily="34" charset="0"/>
+                <a:cs typeface="Arial" pitchFamily="34" charset="0"/>
+              </a:endParaRPr>
             </a:p>
           </p:txBody>
         </p:sp>
@@ -4361,7 +4420,10 @@
             <a:bodyPr wrap="none" anchor="ctr"/>
             <a:lstStyle/>
             <a:p>
-              <a:endParaRPr lang="de-DE" sz="1100"/>
+              <a:endParaRPr lang="de-DE" sz="1100">
+                <a:latin typeface="Arial" pitchFamily="34" charset="0"/>
+                <a:cs typeface="Arial" pitchFamily="34" charset="0"/>
+              </a:endParaRPr>
             </a:p>
           </p:txBody>
         </p:sp>
@@ -4398,7 +4460,10 @@
             <a:bodyPr wrap="none" anchor="ctr"/>
             <a:lstStyle/>
             <a:p>
-              <a:endParaRPr lang="de-DE" sz="1100"/>
+              <a:endParaRPr lang="de-DE" sz="1100">
+                <a:latin typeface="Arial" pitchFamily="34" charset="0"/>
+                <a:cs typeface="Arial" pitchFamily="34" charset="0"/>
+              </a:endParaRPr>
             </a:p>
           </p:txBody>
         </p:sp>
@@ -4435,7 +4500,10 @@
             <a:bodyPr wrap="none" anchor="ctr"/>
             <a:lstStyle/>
             <a:p>
-              <a:endParaRPr lang="de-DE" sz="1100"/>
+              <a:endParaRPr lang="de-DE" sz="1100">
+                <a:latin typeface="Arial" pitchFamily="34" charset="0"/>
+                <a:cs typeface="Arial" pitchFamily="34" charset="0"/>
+              </a:endParaRPr>
             </a:p>
           </p:txBody>
         </p:sp>
@@ -4473,7 +4541,10 @@
           <a:bodyPr wrap="none" anchor="ctr"/>
           <a:lstStyle/>
           <a:p>
-            <a:endParaRPr lang="de-DE" sz="1100"/>
+            <a:endParaRPr lang="de-DE" sz="1100">
+              <a:latin typeface="Arial" pitchFamily="34" charset="0"/>
+              <a:cs typeface="Arial" pitchFamily="34" charset="0"/>
+            </a:endParaRPr>
           </a:p>
         </p:txBody>
       </p:sp>
@@ -4544,6 +4615,8 @@
                 <a:solidFill>
                   <a:srgbClr val="FF00FF"/>
                 </a:solidFill>
+                <a:latin typeface="Arial" pitchFamily="34" charset="0"/>
+                <a:cs typeface="Arial" pitchFamily="34" charset="0"/>
               </a:rPr>
               <a:t>V</a:t>
             </a:r>
@@ -4552,6 +4625,8 @@
                 <a:solidFill>
                   <a:srgbClr val="FF00FF"/>
                 </a:solidFill>
+                <a:latin typeface="Arial" pitchFamily="34" charset="0"/>
+                <a:cs typeface="Arial" pitchFamily="34" charset="0"/>
               </a:rPr>
               <a:t>c</a:t>
             </a:r>
@@ -4559,6 +4634,8 @@
               <a:solidFill>
                 <a:srgbClr val="FF00FF"/>
               </a:solidFill>
+              <a:latin typeface="Arial" pitchFamily="34" charset="0"/>
+              <a:cs typeface="Arial" pitchFamily="34" charset="0"/>
             </a:endParaRPr>
           </a:p>
         </p:txBody>
@@ -4632,6 +4709,8 @@
                 <a:solidFill>
                   <a:srgbClr val="000000"/>
                 </a:solidFill>
+                <a:latin typeface="Arial" pitchFamily="34" charset="0"/>
+                <a:cs typeface="Arial" pitchFamily="34" charset="0"/>
               </a:rPr>
               <a:t>ADC</a:t>
             </a:r>
@@ -4673,6 +4752,8 @@
                 <a:solidFill>
                   <a:srgbClr val="000000"/>
                 </a:solidFill>
+                <a:latin typeface="Arial" pitchFamily="34" charset="0"/>
+                <a:cs typeface="Arial" pitchFamily="34" charset="0"/>
               </a:rPr>
               <a:t>c</a:t>
             </a:r>
@@ -4681,6 +4762,8 @@
                 <a:solidFill>
                   <a:srgbClr val="000000"/>
                 </a:solidFill>
+                <a:latin typeface="Arial" pitchFamily="34" charset="0"/>
+                <a:cs typeface="Arial" pitchFamily="34" charset="0"/>
               </a:rPr>
               <a:t>ard</a:t>
             </a:r>
@@ -4688,6 +4771,8 @@
               <a:solidFill>
                 <a:srgbClr val="000000"/>
               </a:solidFill>
+              <a:latin typeface="Arial" pitchFamily="34" charset="0"/>
+              <a:cs typeface="Arial" pitchFamily="34" charset="0"/>
             </a:endParaRPr>
           </a:p>
         </p:txBody>
@@ -4702,8 +4787,8 @@
         </p:nvSpPr>
         <p:spPr bwMode="auto">
           <a:xfrm>
-            <a:off x="786835" y="764704"/>
-            <a:ext cx="386942" cy="263791"/>
+            <a:off x="782827" y="764704"/>
+            <a:ext cx="394958" cy="263791"/>
           </a:xfrm>
           <a:prstGeom prst="rect">
             <a:avLst/>
@@ -4755,17 +4840,21 @@
               </a:tabLst>
             </a:pPr>
             <a:r>
-              <a:rPr lang="es-ES_tradnl" sz="1100" b="1" dirty="0" smtClean="0">
+              <a:rPr lang="es-ES_tradnl" sz="1100" dirty="0" smtClean="0">
                 <a:solidFill>
                   <a:srgbClr val="FF33CC"/>
                 </a:solidFill>
+                <a:latin typeface="Arial" pitchFamily="34" charset="0"/>
+                <a:cs typeface="Arial" pitchFamily="34" charset="0"/>
               </a:rPr>
               <a:t>coil</a:t>
             </a:r>
-            <a:endParaRPr lang="es-ES_tradnl" sz="1100" b="1" dirty="0">
+            <a:endParaRPr lang="es-ES_tradnl" sz="1100" dirty="0">
               <a:solidFill>
                 <a:srgbClr val="FF33CC"/>
               </a:solidFill>
+              <a:latin typeface="Arial" pitchFamily="34" charset="0"/>
+              <a:cs typeface="Arial" pitchFamily="34" charset="0"/>
             </a:endParaRPr>
           </a:p>
         </p:txBody>
@@ -4913,7 +5002,10 @@
                   <a:bodyPr/>
                   <a:lstStyle/>
                   <a:p>
-                    <a:endParaRPr lang="de-DE" sz="1100"/>
+                    <a:endParaRPr lang="de-DE" sz="1100">
+                      <a:latin typeface="Arial" pitchFamily="34" charset="0"/>
+                      <a:cs typeface="Arial" pitchFamily="34" charset="0"/>
+                    </a:endParaRPr>
                   </a:p>
                 </p:txBody>
               </p:sp>
@@ -4996,7 +5088,10 @@
                   <a:bodyPr/>
                   <a:lstStyle/>
                   <a:p>
-                    <a:endParaRPr lang="de-DE" sz="1100"/>
+                    <a:endParaRPr lang="de-DE" sz="1100">
+                      <a:latin typeface="Arial" pitchFamily="34" charset="0"/>
+                      <a:cs typeface="Arial" pitchFamily="34" charset="0"/>
+                    </a:endParaRPr>
                   </a:p>
                 </p:txBody>
               </p:sp>
@@ -5096,7 +5191,10 @@
                   <a:bodyPr/>
                   <a:lstStyle/>
                   <a:p>
-                    <a:endParaRPr lang="de-DE" sz="1100"/>
+                    <a:endParaRPr lang="de-DE" sz="1100">
+                      <a:latin typeface="Arial" pitchFamily="34" charset="0"/>
+                      <a:cs typeface="Arial" pitchFamily="34" charset="0"/>
+                    </a:endParaRPr>
                   </a:p>
                 </p:txBody>
               </p:sp>
@@ -5179,7 +5277,10 @@
                   <a:bodyPr/>
                   <a:lstStyle/>
                   <a:p>
-                    <a:endParaRPr lang="de-DE" sz="1100"/>
+                    <a:endParaRPr lang="de-DE" sz="1100">
+                      <a:latin typeface="Arial" pitchFamily="34" charset="0"/>
+                      <a:cs typeface="Arial" pitchFamily="34" charset="0"/>
+                    </a:endParaRPr>
                   </a:p>
                 </p:txBody>
               </p:sp>
@@ -5296,7 +5397,10 @@
                   <a:bodyPr/>
                   <a:lstStyle/>
                   <a:p>
-                    <a:endParaRPr lang="de-DE" sz="1100"/>
+                    <a:endParaRPr lang="de-DE" sz="1100">
+                      <a:latin typeface="Arial" pitchFamily="34" charset="0"/>
+                      <a:cs typeface="Arial" pitchFamily="34" charset="0"/>
+                    </a:endParaRPr>
                   </a:p>
                 </p:txBody>
               </p:sp>
@@ -5379,7 +5483,10 @@
                   <a:bodyPr/>
                   <a:lstStyle/>
                   <a:p>
-                    <a:endParaRPr lang="de-DE" sz="1100"/>
+                    <a:endParaRPr lang="de-DE" sz="1100">
+                      <a:latin typeface="Arial" pitchFamily="34" charset="0"/>
+                      <a:cs typeface="Arial" pitchFamily="34" charset="0"/>
+                    </a:endParaRPr>
                   </a:p>
                 </p:txBody>
               </p:sp>
@@ -5479,7 +5586,10 @@
                   <a:bodyPr/>
                   <a:lstStyle/>
                   <a:p>
-                    <a:endParaRPr lang="de-DE" sz="1100"/>
+                    <a:endParaRPr lang="de-DE" sz="1100">
+                      <a:latin typeface="Arial" pitchFamily="34" charset="0"/>
+                      <a:cs typeface="Arial" pitchFamily="34" charset="0"/>
+                    </a:endParaRPr>
                   </a:p>
                 </p:txBody>
               </p:sp>
@@ -5562,7 +5672,10 @@
                   <a:bodyPr/>
                   <a:lstStyle/>
                   <a:p>
-                    <a:endParaRPr lang="de-DE" sz="1100"/>
+                    <a:endParaRPr lang="de-DE" sz="1100">
+                      <a:latin typeface="Arial" pitchFamily="34" charset="0"/>
+                      <a:cs typeface="Arial" pitchFamily="34" charset="0"/>
+                    </a:endParaRPr>
                   </a:p>
                 </p:txBody>
               </p:sp>
@@ -5712,7 +5825,10 @@
                     <a:bodyPr/>
                     <a:lstStyle/>
                     <a:p>
-                      <a:endParaRPr lang="de-DE" sz="1100"/>
+                      <a:endParaRPr lang="de-DE" sz="1100">
+                        <a:latin typeface="Arial" pitchFamily="34" charset="0"/>
+                        <a:cs typeface="Arial" pitchFamily="34" charset="0"/>
+                      </a:endParaRPr>
                     </a:p>
                   </p:txBody>
                 </p:sp>
@@ -5795,7 +5911,10 @@
                     <a:bodyPr/>
                     <a:lstStyle/>
                     <a:p>
-                      <a:endParaRPr lang="de-DE" sz="1100"/>
+                      <a:endParaRPr lang="de-DE" sz="1100">
+                        <a:latin typeface="Arial" pitchFamily="34" charset="0"/>
+                        <a:cs typeface="Arial" pitchFamily="34" charset="0"/>
+                      </a:endParaRPr>
                     </a:p>
                   </p:txBody>
                 </p:sp>
@@ -5895,7 +6014,10 @@
                     <a:bodyPr/>
                     <a:lstStyle/>
                     <a:p>
-                      <a:endParaRPr lang="de-DE" sz="1100"/>
+                      <a:endParaRPr lang="de-DE" sz="1100">
+                        <a:latin typeface="Arial" pitchFamily="34" charset="0"/>
+                        <a:cs typeface="Arial" pitchFamily="34" charset="0"/>
+                      </a:endParaRPr>
                     </a:p>
                   </p:txBody>
                 </p:sp>
@@ -5978,7 +6100,10 @@
                     <a:bodyPr/>
                     <a:lstStyle/>
                     <a:p>
-                      <a:endParaRPr lang="de-DE" sz="1100"/>
+                      <a:endParaRPr lang="de-DE" sz="1100">
+                        <a:latin typeface="Arial" pitchFamily="34" charset="0"/>
+                        <a:cs typeface="Arial" pitchFamily="34" charset="0"/>
+                      </a:endParaRPr>
                     </a:p>
                   </p:txBody>
                 </p:sp>
@@ -6095,7 +6220,10 @@
                     <a:bodyPr/>
                     <a:lstStyle/>
                     <a:p>
-                      <a:endParaRPr lang="de-DE" sz="1100"/>
+                      <a:endParaRPr lang="de-DE" sz="1100">
+                        <a:latin typeface="Arial" pitchFamily="34" charset="0"/>
+                        <a:cs typeface="Arial" pitchFamily="34" charset="0"/>
+                      </a:endParaRPr>
                     </a:p>
                   </p:txBody>
                 </p:sp>
@@ -6178,7 +6306,10 @@
                     <a:bodyPr/>
                     <a:lstStyle/>
                     <a:p>
-                      <a:endParaRPr lang="de-DE" sz="1100"/>
+                      <a:endParaRPr lang="de-DE" sz="1100">
+                        <a:latin typeface="Arial" pitchFamily="34" charset="0"/>
+                        <a:cs typeface="Arial" pitchFamily="34" charset="0"/>
+                      </a:endParaRPr>
                     </a:p>
                   </p:txBody>
                 </p:sp>
@@ -6278,7 +6409,10 @@
                     <a:bodyPr/>
                     <a:lstStyle/>
                     <a:p>
-                      <a:endParaRPr lang="de-DE" sz="1100"/>
+                      <a:endParaRPr lang="de-DE" sz="1100">
+                        <a:latin typeface="Arial" pitchFamily="34" charset="0"/>
+                        <a:cs typeface="Arial" pitchFamily="34" charset="0"/>
+                      </a:endParaRPr>
                     </a:p>
                   </p:txBody>
                 </p:sp>
@@ -6361,7 +6495,10 @@
                     <a:bodyPr/>
                     <a:lstStyle/>
                     <a:p>
-                      <a:endParaRPr lang="de-DE" sz="1100"/>
+                      <a:endParaRPr lang="de-DE" sz="1100">
+                        <a:latin typeface="Arial" pitchFamily="34" charset="0"/>
+                        <a:cs typeface="Arial" pitchFamily="34" charset="0"/>
+                      </a:endParaRPr>
                     </a:p>
                   </p:txBody>
                 </p:sp>
@@ -6495,7 +6632,10 @@
                     <a:bodyPr/>
                     <a:lstStyle/>
                     <a:p>
-                      <a:endParaRPr lang="de-DE" sz="1100"/>
+                      <a:endParaRPr lang="de-DE" sz="1100">
+                        <a:latin typeface="Arial" pitchFamily="34" charset="0"/>
+                        <a:cs typeface="Arial" pitchFamily="34" charset="0"/>
+                      </a:endParaRPr>
                     </a:p>
                   </p:txBody>
                 </p:sp>
@@ -6578,7 +6718,10 @@
                     <a:bodyPr/>
                     <a:lstStyle/>
                     <a:p>
-                      <a:endParaRPr lang="de-DE" sz="1100"/>
+                      <a:endParaRPr lang="de-DE" sz="1100">
+                        <a:latin typeface="Arial" pitchFamily="34" charset="0"/>
+                        <a:cs typeface="Arial" pitchFamily="34" charset="0"/>
+                      </a:endParaRPr>
                     </a:p>
                   </p:txBody>
                 </p:sp>
@@ -6678,7 +6821,10 @@
                     <a:bodyPr/>
                     <a:lstStyle/>
                     <a:p>
-                      <a:endParaRPr lang="de-DE" sz="1100"/>
+                      <a:endParaRPr lang="de-DE" sz="1100">
+                        <a:latin typeface="Arial" pitchFamily="34" charset="0"/>
+                        <a:cs typeface="Arial" pitchFamily="34" charset="0"/>
+                      </a:endParaRPr>
                     </a:p>
                   </p:txBody>
                 </p:sp>
@@ -6761,7 +6907,10 @@
                     <a:bodyPr/>
                     <a:lstStyle/>
                     <a:p>
-                      <a:endParaRPr lang="de-DE" sz="1100"/>
+                      <a:endParaRPr lang="de-DE" sz="1100">
+                        <a:latin typeface="Arial" pitchFamily="34" charset="0"/>
+                        <a:cs typeface="Arial" pitchFamily="34" charset="0"/>
+                      </a:endParaRPr>
                     </a:p>
                   </p:txBody>
                 </p:sp>
@@ -6878,7 +7027,10 @@
                     <a:bodyPr/>
                     <a:lstStyle/>
                     <a:p>
-                      <a:endParaRPr lang="de-DE" sz="1100"/>
+                      <a:endParaRPr lang="de-DE" sz="1100">
+                        <a:latin typeface="Arial" pitchFamily="34" charset="0"/>
+                        <a:cs typeface="Arial" pitchFamily="34" charset="0"/>
+                      </a:endParaRPr>
                     </a:p>
                   </p:txBody>
                 </p:sp>
@@ -6961,7 +7113,10 @@
                     <a:bodyPr/>
                     <a:lstStyle/>
                     <a:p>
-                      <a:endParaRPr lang="de-DE" sz="1100"/>
+                      <a:endParaRPr lang="de-DE" sz="1100">
+                        <a:latin typeface="Arial" pitchFamily="34" charset="0"/>
+                        <a:cs typeface="Arial" pitchFamily="34" charset="0"/>
+                      </a:endParaRPr>
                     </a:p>
                   </p:txBody>
                 </p:sp>
@@ -7061,7 +7216,10 @@
                     <a:bodyPr/>
                     <a:lstStyle/>
                     <a:p>
-                      <a:endParaRPr lang="de-DE" sz="1100"/>
+                      <a:endParaRPr lang="de-DE" sz="1100">
+                        <a:latin typeface="Arial" pitchFamily="34" charset="0"/>
+                        <a:cs typeface="Arial" pitchFamily="34" charset="0"/>
+                      </a:endParaRPr>
                     </a:p>
                   </p:txBody>
                 </p:sp>
@@ -7144,7 +7302,10 @@
                     <a:bodyPr/>
                     <a:lstStyle/>
                     <a:p>
-                      <a:endParaRPr lang="de-DE" sz="1100"/>
+                      <a:endParaRPr lang="de-DE" sz="1100">
+                        <a:latin typeface="Arial" pitchFamily="34" charset="0"/>
+                        <a:cs typeface="Arial" pitchFamily="34" charset="0"/>
+                      </a:endParaRPr>
                     </a:p>
                   </p:txBody>
                 </p:sp>
@@ -7278,7 +7439,10 @@
                     <a:bodyPr/>
                     <a:lstStyle/>
                     <a:p>
-                      <a:endParaRPr lang="de-DE" sz="1100"/>
+                      <a:endParaRPr lang="de-DE" sz="1100">
+                        <a:latin typeface="Arial" pitchFamily="34" charset="0"/>
+                        <a:cs typeface="Arial" pitchFamily="34" charset="0"/>
+                      </a:endParaRPr>
                     </a:p>
                   </p:txBody>
                 </p:sp>
@@ -7361,7 +7525,10 @@
                     <a:bodyPr/>
                     <a:lstStyle/>
                     <a:p>
-                      <a:endParaRPr lang="de-DE" sz="1100"/>
+                      <a:endParaRPr lang="de-DE" sz="1100">
+                        <a:latin typeface="Arial" pitchFamily="34" charset="0"/>
+                        <a:cs typeface="Arial" pitchFamily="34" charset="0"/>
+                      </a:endParaRPr>
                     </a:p>
                   </p:txBody>
                 </p:sp>
@@ -7461,7 +7628,10 @@
                     <a:bodyPr/>
                     <a:lstStyle/>
                     <a:p>
-                      <a:endParaRPr lang="de-DE" sz="1100"/>
+                      <a:endParaRPr lang="de-DE" sz="1100">
+                        <a:latin typeface="Arial" pitchFamily="34" charset="0"/>
+                        <a:cs typeface="Arial" pitchFamily="34" charset="0"/>
+                      </a:endParaRPr>
                     </a:p>
                   </p:txBody>
                 </p:sp>
@@ -7544,7 +7714,10 @@
                     <a:bodyPr/>
                     <a:lstStyle/>
                     <a:p>
-                      <a:endParaRPr lang="de-DE" sz="1100"/>
+                      <a:endParaRPr lang="de-DE" sz="1100">
+                        <a:latin typeface="Arial" pitchFamily="34" charset="0"/>
+                        <a:cs typeface="Arial" pitchFamily="34" charset="0"/>
+                      </a:endParaRPr>
                     </a:p>
                   </p:txBody>
                 </p:sp>
@@ -7661,7 +7834,10 @@
                     <a:bodyPr/>
                     <a:lstStyle/>
                     <a:p>
-                      <a:endParaRPr lang="de-DE" sz="1100"/>
+                      <a:endParaRPr lang="de-DE" sz="1100">
+                        <a:latin typeface="Arial" pitchFamily="34" charset="0"/>
+                        <a:cs typeface="Arial" pitchFamily="34" charset="0"/>
+                      </a:endParaRPr>
                     </a:p>
                   </p:txBody>
                 </p:sp>
@@ -7744,7 +7920,10 @@
                     <a:bodyPr/>
                     <a:lstStyle/>
                     <a:p>
-                      <a:endParaRPr lang="de-DE" sz="1100"/>
+                      <a:endParaRPr lang="de-DE" sz="1100">
+                        <a:latin typeface="Arial" pitchFamily="34" charset="0"/>
+                        <a:cs typeface="Arial" pitchFamily="34" charset="0"/>
+                      </a:endParaRPr>
                     </a:p>
                   </p:txBody>
                 </p:sp>
@@ -7844,7 +8023,10 @@
                     <a:bodyPr/>
                     <a:lstStyle/>
                     <a:p>
-                      <a:endParaRPr lang="de-DE" sz="1100"/>
+                      <a:endParaRPr lang="de-DE" sz="1100">
+                        <a:latin typeface="Arial" pitchFamily="34" charset="0"/>
+                        <a:cs typeface="Arial" pitchFamily="34" charset="0"/>
+                      </a:endParaRPr>
                     </a:p>
                   </p:txBody>
                 </p:sp>
@@ -7927,7 +8109,10 @@
                     <a:bodyPr/>
                     <a:lstStyle/>
                     <a:p>
-                      <a:endParaRPr lang="de-DE" sz="1100"/>
+                      <a:endParaRPr lang="de-DE" sz="1100">
+                        <a:latin typeface="Arial" pitchFamily="34" charset="0"/>
+                        <a:cs typeface="Arial" pitchFamily="34" charset="0"/>
+                      </a:endParaRPr>
                     </a:p>
                   </p:txBody>
                 </p:sp>
@@ -8061,7 +8246,10 @@
                     <a:bodyPr/>
                     <a:lstStyle/>
                     <a:p>
-                      <a:endParaRPr lang="de-DE" sz="1100"/>
+                      <a:endParaRPr lang="de-DE" sz="1100">
+                        <a:latin typeface="Arial" pitchFamily="34" charset="0"/>
+                        <a:cs typeface="Arial" pitchFamily="34" charset="0"/>
+                      </a:endParaRPr>
                     </a:p>
                   </p:txBody>
                 </p:sp>
@@ -8144,7 +8332,10 @@
                     <a:bodyPr/>
                     <a:lstStyle/>
                     <a:p>
-                      <a:endParaRPr lang="de-DE" sz="1100"/>
+                      <a:endParaRPr lang="de-DE" sz="1100">
+                        <a:latin typeface="Arial" pitchFamily="34" charset="0"/>
+                        <a:cs typeface="Arial" pitchFamily="34" charset="0"/>
+                      </a:endParaRPr>
                     </a:p>
                   </p:txBody>
                 </p:sp>
@@ -8244,7 +8435,10 @@
                     <a:bodyPr/>
                     <a:lstStyle/>
                     <a:p>
-                      <a:endParaRPr lang="de-DE" sz="1100"/>
+                      <a:endParaRPr lang="de-DE" sz="1100">
+                        <a:latin typeface="Arial" pitchFamily="34" charset="0"/>
+                        <a:cs typeface="Arial" pitchFamily="34" charset="0"/>
+                      </a:endParaRPr>
                     </a:p>
                   </p:txBody>
                 </p:sp>
@@ -8327,7 +8521,10 @@
                     <a:bodyPr/>
                     <a:lstStyle/>
                     <a:p>
-                      <a:endParaRPr lang="de-DE" sz="1100"/>
+                      <a:endParaRPr lang="de-DE" sz="1100">
+                        <a:latin typeface="Arial" pitchFamily="34" charset="0"/>
+                        <a:cs typeface="Arial" pitchFamily="34" charset="0"/>
+                      </a:endParaRPr>
                     </a:p>
                   </p:txBody>
                 </p:sp>
@@ -8444,7 +8641,10 @@
                     <a:bodyPr/>
                     <a:lstStyle/>
                     <a:p>
-                      <a:endParaRPr lang="de-DE" sz="1100"/>
+                      <a:endParaRPr lang="de-DE" sz="1100">
+                        <a:latin typeface="Arial" pitchFamily="34" charset="0"/>
+                        <a:cs typeface="Arial" pitchFamily="34" charset="0"/>
+                      </a:endParaRPr>
                     </a:p>
                   </p:txBody>
                 </p:sp>
@@ -8527,7 +8727,10 @@
                     <a:bodyPr/>
                     <a:lstStyle/>
                     <a:p>
-                      <a:endParaRPr lang="de-DE" sz="1100"/>
+                      <a:endParaRPr lang="de-DE" sz="1100">
+                        <a:latin typeface="Arial" pitchFamily="34" charset="0"/>
+                        <a:cs typeface="Arial" pitchFamily="34" charset="0"/>
+                      </a:endParaRPr>
                     </a:p>
                   </p:txBody>
                 </p:sp>
@@ -8627,7 +8830,10 @@
                     <a:bodyPr/>
                     <a:lstStyle/>
                     <a:p>
-                      <a:endParaRPr lang="de-DE" sz="1100"/>
+                      <a:endParaRPr lang="de-DE" sz="1100">
+                        <a:latin typeface="Arial" pitchFamily="34" charset="0"/>
+                        <a:cs typeface="Arial" pitchFamily="34" charset="0"/>
+                      </a:endParaRPr>
                     </a:p>
                   </p:txBody>
                 </p:sp>
@@ -8710,7 +8916,10 @@
                     <a:bodyPr/>
                     <a:lstStyle/>
                     <a:p>
-                      <a:endParaRPr lang="de-DE" sz="1100"/>
+                      <a:endParaRPr lang="de-DE" sz="1100">
+                        <a:latin typeface="Arial" pitchFamily="34" charset="0"/>
+                        <a:cs typeface="Arial" pitchFamily="34" charset="0"/>
+                      </a:endParaRPr>
                     </a:p>
                   </p:txBody>
                 </p:sp>
@@ -8844,7 +9053,10 @@
                     <a:bodyPr/>
                     <a:lstStyle/>
                     <a:p>
-                      <a:endParaRPr lang="de-DE" sz="1100"/>
+                      <a:endParaRPr lang="de-DE" sz="1100">
+                        <a:latin typeface="Arial" pitchFamily="34" charset="0"/>
+                        <a:cs typeface="Arial" pitchFamily="34" charset="0"/>
+                      </a:endParaRPr>
                     </a:p>
                   </p:txBody>
                 </p:sp>
@@ -8927,7 +9139,10 @@
                     <a:bodyPr/>
                     <a:lstStyle/>
                     <a:p>
-                      <a:endParaRPr lang="de-DE" sz="1100"/>
+                      <a:endParaRPr lang="de-DE" sz="1100">
+                        <a:latin typeface="Arial" pitchFamily="34" charset="0"/>
+                        <a:cs typeface="Arial" pitchFamily="34" charset="0"/>
+                      </a:endParaRPr>
                     </a:p>
                   </p:txBody>
                 </p:sp>
@@ -9027,7 +9242,10 @@
                     <a:bodyPr/>
                     <a:lstStyle/>
                     <a:p>
-                      <a:endParaRPr lang="de-DE" sz="1100"/>
+                      <a:endParaRPr lang="de-DE" sz="1100">
+                        <a:latin typeface="Arial" pitchFamily="34" charset="0"/>
+                        <a:cs typeface="Arial" pitchFamily="34" charset="0"/>
+                      </a:endParaRPr>
                     </a:p>
                   </p:txBody>
                 </p:sp>
@@ -9110,7 +9328,10 @@
                     <a:bodyPr/>
                     <a:lstStyle/>
                     <a:p>
-                      <a:endParaRPr lang="de-DE" sz="1100"/>
+                      <a:endParaRPr lang="de-DE" sz="1100">
+                        <a:latin typeface="Arial" pitchFamily="34" charset="0"/>
+                        <a:cs typeface="Arial" pitchFamily="34" charset="0"/>
+                      </a:endParaRPr>
                     </a:p>
                   </p:txBody>
                 </p:sp>
@@ -9227,7 +9448,10 @@
                     <a:bodyPr/>
                     <a:lstStyle/>
                     <a:p>
-                      <a:endParaRPr lang="de-DE" sz="1100"/>
+                      <a:endParaRPr lang="de-DE" sz="1100">
+                        <a:latin typeface="Arial" pitchFamily="34" charset="0"/>
+                        <a:cs typeface="Arial" pitchFamily="34" charset="0"/>
+                      </a:endParaRPr>
                     </a:p>
                   </p:txBody>
                 </p:sp>
@@ -9310,7 +9534,10 @@
                     <a:bodyPr/>
                     <a:lstStyle/>
                     <a:p>
-                      <a:endParaRPr lang="de-DE" sz="1100"/>
+                      <a:endParaRPr lang="de-DE" sz="1100">
+                        <a:latin typeface="Arial" pitchFamily="34" charset="0"/>
+                        <a:cs typeface="Arial" pitchFamily="34" charset="0"/>
+                      </a:endParaRPr>
                     </a:p>
                   </p:txBody>
                 </p:sp>
@@ -9410,7 +9637,10 @@
                     <a:bodyPr/>
                     <a:lstStyle/>
                     <a:p>
-                      <a:endParaRPr lang="de-DE" sz="1100"/>
+                      <a:endParaRPr lang="de-DE" sz="1100">
+                        <a:latin typeface="Arial" pitchFamily="34" charset="0"/>
+                        <a:cs typeface="Arial" pitchFamily="34" charset="0"/>
+                      </a:endParaRPr>
                     </a:p>
                   </p:txBody>
                 </p:sp>
@@ -9493,7 +9723,10 @@
                     <a:bodyPr/>
                     <a:lstStyle/>
                     <a:p>
-                      <a:endParaRPr lang="de-DE" sz="1100"/>
+                      <a:endParaRPr lang="de-DE" sz="1100">
+                        <a:latin typeface="Arial" pitchFamily="34" charset="0"/>
+                        <a:cs typeface="Arial" pitchFamily="34" charset="0"/>
+                      </a:endParaRPr>
                     </a:p>
                   </p:txBody>
                 </p:sp>
@@ -9613,7 +9846,10 @@
               <a:bodyPr/>
               <a:lstStyle/>
               <a:p>
-                <a:endParaRPr lang="de-DE" sz="1100"/>
+                <a:endParaRPr lang="de-DE" sz="1100">
+                  <a:latin typeface="Arial" pitchFamily="34" charset="0"/>
+                  <a:cs typeface="Arial" pitchFamily="34" charset="0"/>
+                </a:endParaRPr>
               </a:p>
             </p:txBody>
           </p:sp>
@@ -9696,7 +9932,10 @@
               <a:bodyPr/>
               <a:lstStyle/>
               <a:p>
-                <a:endParaRPr lang="de-DE" sz="1100"/>
+                <a:endParaRPr lang="de-DE" sz="1100">
+                  <a:latin typeface="Arial" pitchFamily="34" charset="0"/>
+                  <a:cs typeface="Arial" pitchFamily="34" charset="0"/>
+                </a:endParaRPr>
               </a:p>
             </p:txBody>
           </p:sp>
@@ -9796,7 +10035,10 @@
               <a:bodyPr/>
               <a:lstStyle/>
               <a:p>
-                <a:endParaRPr lang="de-DE" sz="1100"/>
+                <a:endParaRPr lang="de-DE" sz="1100">
+                  <a:latin typeface="Arial" pitchFamily="34" charset="0"/>
+                  <a:cs typeface="Arial" pitchFamily="34" charset="0"/>
+                </a:endParaRPr>
               </a:p>
             </p:txBody>
           </p:sp>
@@ -9879,7 +10121,10 @@
               <a:bodyPr/>
               <a:lstStyle/>
               <a:p>
-                <a:endParaRPr lang="de-DE" sz="1100"/>
+                <a:endParaRPr lang="de-DE" sz="1100">
+                  <a:latin typeface="Arial" pitchFamily="34" charset="0"/>
+                  <a:cs typeface="Arial" pitchFamily="34" charset="0"/>
+                </a:endParaRPr>
               </a:p>
             </p:txBody>
           </p:sp>
@@ -9943,7 +10188,10 @@
           <a:bodyPr wrap="none" anchor="ctr"/>
           <a:lstStyle/>
           <a:p>
-            <a:endParaRPr lang="de-DE" sz="1100"/>
+            <a:endParaRPr lang="de-DE" sz="1100">
+              <a:latin typeface="Arial" pitchFamily="34" charset="0"/>
+              <a:cs typeface="Arial" pitchFamily="34" charset="0"/>
+            </a:endParaRPr>
           </a:p>
         </p:txBody>
       </p:sp>
@@ -9993,7 +10241,7 @@
           <a:noFill/>
           <a:ln w="12700">
             <a:solidFill>
-              <a:srgbClr val="FF0000"/>
+              <a:srgbClr val="0000CC"/>
             </a:solidFill>
             <a:round/>
             <a:headEnd/>
@@ -10005,7 +10253,10 @@
           <a:bodyPr wrap="none" anchor="ctr"/>
           <a:lstStyle/>
           <a:p>
-            <a:endParaRPr lang="de-DE" sz="1100"/>
+            <a:endParaRPr lang="de-DE" sz="1100">
+              <a:latin typeface="Arial" pitchFamily="34" charset="0"/>
+              <a:cs typeface="Arial" pitchFamily="34" charset="0"/>
+            </a:endParaRPr>
           </a:p>
         </p:txBody>
       </p:sp>
@@ -10040,7 +10291,10 @@
           <a:bodyPr/>
           <a:lstStyle/>
           <a:p>
-            <a:endParaRPr lang="de-DE" sz="1100"/>
+            <a:endParaRPr lang="de-DE" sz="1100">
+              <a:latin typeface="Arial" pitchFamily="34" charset="0"/>
+              <a:cs typeface="Arial" pitchFamily="34" charset="0"/>
+            </a:endParaRPr>
           </a:p>
         </p:txBody>
       </p:sp>
@@ -10093,7 +10347,10 @@
             <a:bodyPr wrap="none" anchor="ctr"/>
             <a:lstStyle/>
             <a:p>
-              <a:endParaRPr lang="de-DE" sz="1100"/>
+              <a:endParaRPr lang="de-DE" sz="1100">
+                <a:latin typeface="Arial" pitchFamily="34" charset="0"/>
+                <a:cs typeface="Arial" pitchFamily="34" charset="0"/>
+              </a:endParaRPr>
             </a:p>
           </p:txBody>
         </p:sp>
@@ -10167,7 +10424,10 @@
               <a:bodyPr wrap="none" anchor="ctr"/>
               <a:lstStyle/>
               <a:p>
-                <a:endParaRPr lang="de-DE" sz="1100"/>
+                <a:endParaRPr lang="de-DE" sz="1100">
+                  <a:latin typeface="Arial" pitchFamily="34" charset="0"/>
+                  <a:cs typeface="Arial" pitchFamily="34" charset="0"/>
+                </a:endParaRPr>
               </a:p>
             </p:txBody>
           </p:sp>
@@ -10225,7 +10485,10 @@
               <a:bodyPr wrap="none" anchor="ctr"/>
               <a:lstStyle/>
               <a:p>
-                <a:endParaRPr lang="de-DE" sz="1100"/>
+                <a:endParaRPr lang="de-DE" sz="1100">
+                  <a:latin typeface="Arial" pitchFamily="34" charset="0"/>
+                  <a:cs typeface="Arial" pitchFamily="34" charset="0"/>
+                </a:endParaRPr>
               </a:p>
             </p:txBody>
           </p:sp>
@@ -10283,7 +10546,10 @@
               <a:bodyPr wrap="none" anchor="ctr"/>
               <a:lstStyle/>
               <a:p>
-                <a:endParaRPr lang="de-DE" sz="1100"/>
+                <a:endParaRPr lang="de-DE" sz="1100">
+                  <a:latin typeface="Arial" pitchFamily="34" charset="0"/>
+                  <a:cs typeface="Arial" pitchFamily="34" charset="0"/>
+                </a:endParaRPr>
               </a:p>
             </p:txBody>
           </p:sp>
@@ -10322,7 +10588,10 @@
           <a:bodyPr wrap="none" anchor="ctr"/>
           <a:lstStyle/>
           <a:p>
-            <a:endParaRPr lang="de-DE" sz="1100"/>
+            <a:endParaRPr lang="de-DE" sz="1100">
+              <a:latin typeface="Arial" pitchFamily="34" charset="0"/>
+              <a:cs typeface="Arial" pitchFamily="34" charset="0"/>
+            </a:endParaRPr>
           </a:p>
         </p:txBody>
       </p:sp>
@@ -10359,7 +10628,10 @@
           <a:bodyPr wrap="none" anchor="ctr"/>
           <a:lstStyle/>
           <a:p>
-            <a:endParaRPr lang="de-DE" sz="1100"/>
+            <a:endParaRPr lang="de-DE" sz="1100">
+              <a:latin typeface="Arial" pitchFamily="34" charset="0"/>
+              <a:cs typeface="Arial" pitchFamily="34" charset="0"/>
+            </a:endParaRPr>
           </a:p>
         </p:txBody>
       </p:sp>
@@ -10427,7 +10699,10 @@
           <a:bodyPr wrap="none" anchor="ctr"/>
           <a:lstStyle/>
           <a:p>
-            <a:endParaRPr lang="de-DE" sz="1100"/>
+            <a:endParaRPr lang="de-DE" sz="1100">
+              <a:latin typeface="Arial" pitchFamily="34" charset="0"/>
+              <a:cs typeface="Arial" pitchFamily="34" charset="0"/>
+            </a:endParaRPr>
           </a:p>
         </p:txBody>
       </p:sp>
@@ -10464,7 +10739,10 @@
           <a:bodyPr wrap="none" anchor="ctr"/>
           <a:lstStyle/>
           <a:p>
-            <a:endParaRPr lang="de-DE" sz="1100"/>
+            <a:endParaRPr lang="de-DE" sz="1100">
+              <a:latin typeface="Arial" pitchFamily="34" charset="0"/>
+              <a:cs typeface="Arial" pitchFamily="34" charset="0"/>
+            </a:endParaRPr>
           </a:p>
         </p:txBody>
       </p:sp>
@@ -10526,7 +10804,10 @@
           <a:bodyPr wrap="none" anchor="ctr"/>
           <a:lstStyle/>
           <a:p>
-            <a:endParaRPr lang="de-DE" sz="1100"/>
+            <a:endParaRPr lang="de-DE" sz="1100">
+              <a:latin typeface="Arial" pitchFamily="34" charset="0"/>
+              <a:cs typeface="Arial" pitchFamily="34" charset="0"/>
+            </a:endParaRPr>
           </a:p>
         </p:txBody>
       </p:sp>
@@ -10541,7 +10822,7 @@
         <p:spPr bwMode="auto">
           <a:xfrm flipH="1">
             <a:off x="4196904" y="4383906"/>
-            <a:ext cx="476710" cy="263791"/>
+            <a:ext cx="528006" cy="263791"/>
           </a:xfrm>
           <a:prstGeom prst="rect">
             <a:avLst/>
@@ -10597,6 +10878,8 @@
                 <a:solidFill>
                   <a:srgbClr val="008000"/>
                 </a:solidFill>
+                <a:latin typeface="Arial" pitchFamily="34" charset="0"/>
+                <a:cs typeface="Arial" pitchFamily="34" charset="0"/>
               </a:rPr>
               <a:t>2</a:t>
             </a:r>
@@ -10605,6 +10888,8 @@
                 <a:solidFill>
                   <a:srgbClr val="008000"/>
                 </a:solidFill>
+                <a:latin typeface="Arial" pitchFamily="34" charset="0"/>
+                <a:cs typeface="Arial" pitchFamily="34" charset="0"/>
               </a:rPr>
               <a:t>0dB</a:t>
             </a:r>
@@ -10612,6 +10897,8 @@
               <a:solidFill>
                 <a:srgbClr val="008000"/>
               </a:solidFill>
+              <a:latin typeface="Arial" pitchFamily="34" charset="0"/>
+              <a:cs typeface="Arial" pitchFamily="34" charset="0"/>
             </a:endParaRPr>
           </a:p>
         </p:txBody>
@@ -10626,8 +10913,8 @@
         </p:nvSpPr>
         <p:spPr bwMode="auto">
           <a:xfrm flipH="1">
-            <a:off x="4127149" y="3815541"/>
-            <a:ext cx="548845" cy="433068"/>
+            <a:off x="4111119" y="3815541"/>
+            <a:ext cx="580906" cy="433068"/>
           </a:xfrm>
           <a:prstGeom prst="rect">
             <a:avLst/>
@@ -10683,6 +10970,8 @@
                 <a:solidFill>
                   <a:srgbClr val="008000"/>
                 </a:solidFill>
+                <a:latin typeface="Arial" pitchFamily="34" charset="0"/>
+                <a:cs typeface="Arial" pitchFamily="34" charset="0"/>
               </a:rPr>
               <a:t>1.4-20</a:t>
             </a:r>
@@ -10724,6 +11013,8 @@
                 <a:solidFill>
                   <a:srgbClr val="008000"/>
                 </a:solidFill>
+                <a:latin typeface="Arial" pitchFamily="34" charset="0"/>
+                <a:cs typeface="Arial" pitchFamily="34" charset="0"/>
               </a:rPr>
               <a:t>GHz</a:t>
             </a:r>
@@ -10763,7 +11054,10 @@
           <a:bodyPr wrap="none" anchor="ctr"/>
           <a:lstStyle/>
           <a:p>
-            <a:endParaRPr lang="de-DE" sz="1100"/>
+            <a:endParaRPr lang="de-DE" sz="1100">
+              <a:latin typeface="Arial" pitchFamily="34" charset="0"/>
+              <a:cs typeface="Arial" pitchFamily="34" charset="0"/>
+            </a:endParaRPr>
           </a:p>
         </p:txBody>
       </p:sp>
@@ -10800,7 +11094,10 @@
           <a:bodyPr wrap="none" anchor="ctr"/>
           <a:lstStyle/>
           <a:p>
-            <a:endParaRPr lang="de-DE" sz="1100"/>
+            <a:endParaRPr lang="de-DE" sz="1100">
+              <a:latin typeface="Arial" pitchFamily="34" charset="0"/>
+              <a:cs typeface="Arial" pitchFamily="34" charset="0"/>
+            </a:endParaRPr>
           </a:p>
         </p:txBody>
       </p:sp>
@@ -10815,7 +11112,7 @@
         <p:spPr bwMode="auto">
           <a:xfrm flipH="1">
             <a:off x="4333775" y="3378992"/>
-            <a:ext cx="476710" cy="263791"/>
+            <a:ext cx="528006" cy="263791"/>
           </a:xfrm>
           <a:prstGeom prst="rect">
             <a:avLst/>
@@ -10871,6 +11168,8 @@
                 <a:solidFill>
                   <a:srgbClr val="008000"/>
                 </a:solidFill>
+                <a:latin typeface="Arial" pitchFamily="34" charset="0"/>
+                <a:cs typeface="Arial" pitchFamily="34" charset="0"/>
               </a:rPr>
               <a:t>2</a:t>
             </a:r>
@@ -10879,6 +11178,8 @@
                 <a:solidFill>
                   <a:srgbClr val="008000"/>
                 </a:solidFill>
+                <a:latin typeface="Arial" pitchFamily="34" charset="0"/>
+                <a:cs typeface="Arial" pitchFamily="34" charset="0"/>
               </a:rPr>
               <a:t>3</a:t>
             </a:r>
@@ -10887,6 +11188,8 @@
                 <a:solidFill>
                   <a:srgbClr val="008000"/>
                 </a:solidFill>
+                <a:latin typeface="Arial" pitchFamily="34" charset="0"/>
+                <a:cs typeface="Arial" pitchFamily="34" charset="0"/>
               </a:rPr>
               <a:t>dB</a:t>
             </a:r>
@@ -10894,6 +11197,8 @@
               <a:solidFill>
                 <a:srgbClr val="008000"/>
               </a:solidFill>
+              <a:latin typeface="Arial" pitchFamily="34" charset="0"/>
+              <a:cs typeface="Arial" pitchFamily="34" charset="0"/>
             </a:endParaRPr>
           </a:p>
         </p:txBody>
@@ -10909,7 +11214,7 @@
         <p:spPr bwMode="auto">
           <a:xfrm flipH="1">
             <a:off x="4331659" y="2145858"/>
-            <a:ext cx="476710" cy="263791"/>
+            <a:ext cx="528006" cy="263791"/>
           </a:xfrm>
           <a:prstGeom prst="rect">
             <a:avLst/>
@@ -10965,6 +11270,8 @@
                 <a:solidFill>
                   <a:srgbClr val="008000"/>
                 </a:solidFill>
+                <a:latin typeface="Arial" pitchFamily="34" charset="0"/>
+                <a:cs typeface="Arial" pitchFamily="34" charset="0"/>
               </a:rPr>
               <a:t>20dB</a:t>
             </a:r>
@@ -10981,8 +11288,8 @@
         </p:nvSpPr>
         <p:spPr bwMode="auto">
           <a:xfrm flipH="1">
-            <a:off x="4167059" y="2757282"/>
-            <a:ext cx="566479" cy="433068"/>
+            <a:off x="4135801" y="2757282"/>
+            <a:ext cx="628996" cy="433068"/>
           </a:xfrm>
           <a:prstGeom prst="rect">
             <a:avLst/>
@@ -11038,6 +11345,8 @@
                 <a:solidFill>
                   <a:srgbClr val="008000"/>
                 </a:solidFill>
+                <a:latin typeface="Arial" pitchFamily="34" charset="0"/>
+                <a:cs typeface="Arial" pitchFamily="34" charset="0"/>
               </a:rPr>
               <a:t>DC-7.2</a:t>
             </a:r>
@@ -11045,6 +11354,8 @@
               <a:solidFill>
                 <a:srgbClr val="008000"/>
               </a:solidFill>
+              <a:latin typeface="Arial" pitchFamily="34" charset="0"/>
+              <a:cs typeface="Arial" pitchFamily="34" charset="0"/>
             </a:endParaRPr>
           </a:p>
           <a:p>
@@ -11084,6 +11395,8 @@
                 <a:solidFill>
                   <a:srgbClr val="008000"/>
                 </a:solidFill>
+                <a:latin typeface="Arial" pitchFamily="34" charset="0"/>
+                <a:cs typeface="Arial" pitchFamily="34" charset="0"/>
               </a:rPr>
               <a:t>GHz</a:t>
             </a:r>
@@ -11127,7 +11440,7 @@
             </a:solidFill>
             <a:ln w="12700">
               <a:solidFill>
-                <a:srgbClr val="FF0000"/>
+                <a:srgbClr val="0000CC"/>
               </a:solidFill>
               <a:miter lim="800000"/>
               <a:headEnd/>
@@ -11139,7 +11452,10 @@
             <a:bodyPr wrap="none" anchor="ctr"/>
             <a:lstStyle/>
             <a:p>
-              <a:endParaRPr lang="de-DE" sz="1100"/>
+              <a:endParaRPr lang="de-DE" sz="1100">
+                <a:latin typeface="Arial" pitchFamily="34" charset="0"/>
+                <a:cs typeface="Arial" pitchFamily="34" charset="0"/>
+              </a:endParaRPr>
             </a:p>
           </p:txBody>
         </p:sp>
@@ -11201,7 +11517,7 @@
               <a:noFill/>
               <a:ln w="12700">
                 <a:solidFill>
-                  <a:srgbClr val="FF0000"/>
+                  <a:srgbClr val="0000CC"/>
                 </a:solidFill>
                 <a:round/>
                 <a:headEnd/>
@@ -11213,7 +11529,10 @@
               <a:bodyPr wrap="none" anchor="ctr"/>
               <a:lstStyle/>
               <a:p>
-                <a:endParaRPr lang="de-DE" sz="1100"/>
+                <a:endParaRPr lang="de-DE" sz="1100">
+                  <a:latin typeface="Arial" pitchFamily="34" charset="0"/>
+                  <a:cs typeface="Arial" pitchFamily="34" charset="0"/>
+                </a:endParaRPr>
               </a:p>
             </p:txBody>
           </p:sp>
@@ -11259,7 +11578,7 @@
               <a:noFill/>
               <a:ln w="12700">
                 <a:solidFill>
-                  <a:srgbClr val="FF0000"/>
+                  <a:srgbClr val="0000CC"/>
                 </a:solidFill>
                 <a:round/>
                 <a:headEnd/>
@@ -11271,7 +11590,10 @@
               <a:bodyPr wrap="none" anchor="ctr"/>
               <a:lstStyle/>
               <a:p>
-                <a:endParaRPr lang="de-DE" sz="1100"/>
+                <a:endParaRPr lang="de-DE" sz="1100">
+                  <a:latin typeface="Arial" pitchFamily="34" charset="0"/>
+                  <a:cs typeface="Arial" pitchFamily="34" charset="0"/>
+                </a:endParaRPr>
               </a:p>
             </p:txBody>
           </p:sp>
@@ -11317,7 +11639,7 @@
               <a:noFill/>
               <a:ln w="12700">
                 <a:solidFill>
-                  <a:srgbClr val="FF0000"/>
+                  <a:srgbClr val="0000CC"/>
                 </a:solidFill>
                 <a:round/>
                 <a:headEnd/>
@@ -11329,7 +11651,10 @@
               <a:bodyPr wrap="none" anchor="ctr"/>
               <a:lstStyle/>
               <a:p>
-                <a:endParaRPr lang="de-DE" sz="1100"/>
+                <a:endParaRPr lang="de-DE" sz="1100">
+                  <a:latin typeface="Arial" pitchFamily="34" charset="0"/>
+                  <a:cs typeface="Arial" pitchFamily="34" charset="0"/>
+                </a:endParaRPr>
               </a:p>
             </p:txBody>
           </p:sp>
@@ -11356,7 +11681,7 @@
           </a:solidFill>
           <a:ln w="12700">
             <a:solidFill>
-              <a:srgbClr val="FF0000"/>
+              <a:srgbClr val="0000CC"/>
             </a:solidFill>
             <a:miter lim="800000"/>
             <a:headEnd/>
@@ -11368,7 +11693,10 @@
           <a:bodyPr wrap="none" anchor="ctr"/>
           <a:lstStyle/>
           <a:p>
-            <a:endParaRPr lang="de-DE" sz="1100"/>
+            <a:endParaRPr lang="de-DE" sz="1100">
+              <a:latin typeface="Arial" pitchFamily="34" charset="0"/>
+              <a:cs typeface="Arial" pitchFamily="34" charset="0"/>
+            </a:endParaRPr>
           </a:p>
         </p:txBody>
       </p:sp>
@@ -11383,7 +11711,7 @@
         <p:spPr bwMode="auto">
           <a:xfrm flipH="1">
             <a:off x="2952118" y="4410789"/>
-            <a:ext cx="435032" cy="263791"/>
+            <a:ext cx="444650" cy="263791"/>
           </a:xfrm>
           <a:prstGeom prst="rect">
             <a:avLst/>
@@ -11435,22 +11763,32 @@
               </a:tabLst>
             </a:pPr>
             <a:r>
-              <a:rPr lang="es-ES_tradnl" sz="1100" dirty="0">
+              <a:rPr lang="es-ES_tradnl" sz="1100" dirty="0" smtClean="0">
                 <a:solidFill>
-                  <a:srgbClr val="FF0000"/>
+                  <a:srgbClr val="0000CC"/>
                 </a:solidFill>
+                <a:latin typeface="Arial" pitchFamily="34" charset="0"/>
+                <a:cs typeface="Arial" pitchFamily="34" charset="0"/>
               </a:rPr>
               <a:t>50</a:t>
             </a:r>
             <a:r>
-              <a:rPr lang="es-ES_tradnl" sz="1100" dirty="0">
+              <a:rPr lang="el-GR" sz="1100" dirty="0" smtClean="0">
                 <a:solidFill>
-                  <a:srgbClr val="FF0000"/>
+                  <a:srgbClr val="0000CC"/>
                 </a:solidFill>
-                <a:latin typeface="Symbol" pitchFamily="18" charset="2"/>
+                <a:latin typeface="Arial" pitchFamily="34" charset="0"/>
+                <a:cs typeface="Arial" pitchFamily="34" charset="0"/>
               </a:rPr>
-              <a:t></a:t>
+              <a:t>Ω</a:t>
             </a:r>
+            <a:endParaRPr lang="es-ES_tradnl" sz="1100" dirty="0">
+              <a:solidFill>
+                <a:srgbClr val="0000CC"/>
+              </a:solidFill>
+              <a:latin typeface="Arial" pitchFamily="34" charset="0"/>
+              <a:cs typeface="Arial" pitchFamily="34" charset="0"/>
+            </a:endParaRPr>
           </a:p>
         </p:txBody>
       </p:sp>
@@ -11491,7 +11829,7 @@
             </a:solidFill>
             <a:ln w="12700">
               <a:solidFill>
-                <a:srgbClr val="FF0000"/>
+                <a:srgbClr val="0000CC"/>
               </a:solidFill>
               <a:miter lim="800000"/>
               <a:headEnd/>
@@ -11503,7 +11841,10 @@
             <a:bodyPr wrap="none" anchor="ctr"/>
             <a:lstStyle/>
             <a:p>
-              <a:endParaRPr lang="de-DE" sz="1100"/>
+              <a:endParaRPr lang="de-DE" sz="1100">
+                <a:latin typeface="Arial" pitchFamily="34" charset="0"/>
+                <a:cs typeface="Arial" pitchFamily="34" charset="0"/>
+              </a:endParaRPr>
             </a:p>
           </p:txBody>
         </p:sp>
@@ -11565,7 +11906,7 @@
               <a:noFill/>
               <a:ln w="12700">
                 <a:solidFill>
-                  <a:srgbClr val="FF0000"/>
+                  <a:srgbClr val="0000CC"/>
                 </a:solidFill>
                 <a:round/>
                 <a:headEnd/>
@@ -11577,7 +11918,10 @@
               <a:bodyPr wrap="none" anchor="ctr"/>
               <a:lstStyle/>
               <a:p>
-                <a:endParaRPr lang="de-DE" sz="1100"/>
+                <a:endParaRPr lang="de-DE" sz="1100">
+                  <a:latin typeface="Arial" pitchFamily="34" charset="0"/>
+                  <a:cs typeface="Arial" pitchFamily="34" charset="0"/>
+                </a:endParaRPr>
               </a:p>
             </p:txBody>
           </p:sp>
@@ -11623,7 +11967,7 @@
               <a:noFill/>
               <a:ln w="12700">
                 <a:solidFill>
-                  <a:srgbClr val="FF0000"/>
+                  <a:srgbClr val="0000CC"/>
                 </a:solidFill>
                 <a:round/>
                 <a:headEnd/>
@@ -11635,7 +11979,10 @@
               <a:bodyPr wrap="none" anchor="ctr"/>
               <a:lstStyle/>
               <a:p>
-                <a:endParaRPr lang="de-DE" sz="1100"/>
+                <a:endParaRPr lang="de-DE" sz="1100">
+                  <a:latin typeface="Arial" pitchFamily="34" charset="0"/>
+                  <a:cs typeface="Arial" pitchFamily="34" charset="0"/>
+                </a:endParaRPr>
               </a:p>
             </p:txBody>
           </p:sp>
@@ -11681,7 +12028,7 @@
               <a:noFill/>
               <a:ln w="12700">
                 <a:solidFill>
-                  <a:srgbClr val="FF0000"/>
+                  <a:srgbClr val="0000CC"/>
                 </a:solidFill>
                 <a:round/>
                 <a:headEnd/>
@@ -11693,7 +12040,10 @@
               <a:bodyPr wrap="none" anchor="ctr"/>
               <a:lstStyle/>
               <a:p>
-                <a:endParaRPr lang="de-DE" sz="1100"/>
+                <a:endParaRPr lang="de-DE" sz="1100">
+                  <a:latin typeface="Arial" pitchFamily="34" charset="0"/>
+                  <a:cs typeface="Arial" pitchFamily="34" charset="0"/>
+                </a:endParaRPr>
               </a:p>
             </p:txBody>
           </p:sp>
@@ -11720,7 +12070,7 @@
           </a:solidFill>
           <a:ln w="12700">
             <a:solidFill>
-              <a:srgbClr val="FF0000"/>
+              <a:srgbClr val="0000CC"/>
             </a:solidFill>
             <a:miter lim="800000"/>
             <a:headEnd/>
@@ -11732,7 +12082,10 @@
           <a:bodyPr wrap="none" anchor="ctr"/>
           <a:lstStyle/>
           <a:p>
-            <a:endParaRPr lang="de-DE" sz="1100"/>
+            <a:endParaRPr lang="de-DE" sz="1100">
+              <a:latin typeface="Arial" pitchFamily="34" charset="0"/>
+              <a:cs typeface="Arial" pitchFamily="34" charset="0"/>
+            </a:endParaRPr>
           </a:p>
         </p:txBody>
       </p:sp>
@@ -11747,7 +12100,7 @@
         <p:spPr bwMode="auto">
           <a:xfrm flipH="1">
             <a:off x="2961691" y="4787761"/>
-            <a:ext cx="435032" cy="263791"/>
+            <a:ext cx="444650" cy="263791"/>
           </a:xfrm>
           <a:prstGeom prst="rect">
             <a:avLst/>
@@ -11799,22 +12152,32 @@
               </a:tabLst>
             </a:pPr>
             <a:r>
-              <a:rPr lang="es-ES_tradnl" sz="1100" dirty="0">
+              <a:rPr lang="es-ES_tradnl" sz="1100" dirty="0" smtClean="0">
                 <a:solidFill>
-                  <a:srgbClr val="FF0000"/>
+                  <a:srgbClr val="0000CC"/>
                 </a:solidFill>
+                <a:latin typeface="Arial" pitchFamily="34" charset="0"/>
+                <a:cs typeface="Arial" pitchFamily="34" charset="0"/>
               </a:rPr>
               <a:t>50</a:t>
             </a:r>
             <a:r>
-              <a:rPr lang="es-ES_tradnl" sz="1100" dirty="0">
+              <a:rPr lang="el-GR" sz="1100" dirty="0" smtClean="0">
                 <a:solidFill>
-                  <a:srgbClr val="FF0000"/>
+                  <a:srgbClr val="0000CC"/>
                 </a:solidFill>
-                <a:latin typeface="Symbol" pitchFamily="18" charset="2"/>
+                <a:latin typeface="Arial" pitchFamily="34" charset="0"/>
+                <a:cs typeface="Arial" pitchFamily="34" charset="0"/>
               </a:rPr>
-              <a:t></a:t>
+              <a:t>Ω</a:t>
             </a:r>
+            <a:endParaRPr lang="es-ES_tradnl" sz="1100" dirty="0">
+              <a:solidFill>
+                <a:srgbClr val="0000CC"/>
+              </a:solidFill>
+              <a:latin typeface="Arial" pitchFamily="34" charset="0"/>
+              <a:cs typeface="Arial" pitchFamily="34" charset="0"/>
+            </a:endParaRPr>
           </a:p>
         </p:txBody>
       </p:sp>
@@ -11839,7 +12202,7 @@
           </a:solidFill>
           <a:ln w="12700">
             <a:solidFill>
-              <a:srgbClr val="FF0000"/>
+              <a:srgbClr val="0000CC"/>
             </a:solidFill>
             <a:miter lim="800000"/>
             <a:headEnd/>
@@ -11851,7 +12214,10 @@
           <a:bodyPr wrap="none" anchor="ctr"/>
           <a:lstStyle/>
           <a:p>
-            <a:endParaRPr lang="de-DE" sz="1100"/>
+            <a:endParaRPr lang="de-DE" sz="1100">
+              <a:latin typeface="Arial" pitchFamily="34" charset="0"/>
+              <a:cs typeface="Arial" pitchFamily="34" charset="0"/>
+            </a:endParaRPr>
           </a:p>
         </p:txBody>
       </p:sp>
@@ -11907,7 +12273,7 @@
           <a:noFill/>
           <a:ln w="12700">
             <a:solidFill>
-              <a:srgbClr val="FF0000"/>
+              <a:srgbClr val="0000CC"/>
             </a:solidFill>
             <a:round/>
             <a:headEnd/>
@@ -11919,7 +12285,10 @@
           <a:bodyPr wrap="none" anchor="ctr"/>
           <a:lstStyle/>
           <a:p>
-            <a:endParaRPr lang="de-DE" sz="1100"/>
+            <a:endParaRPr lang="de-DE" sz="1100">
+              <a:latin typeface="Arial" pitchFamily="34" charset="0"/>
+              <a:cs typeface="Arial" pitchFamily="34" charset="0"/>
+            </a:endParaRPr>
           </a:p>
         </p:txBody>
       </p:sp>
@@ -11933,8 +12302,8 @@
         </p:nvSpPr>
         <p:spPr bwMode="auto">
           <a:xfrm flipH="1">
-            <a:off x="3059906" y="3844880"/>
-            <a:ext cx="415796" cy="433068"/>
+            <a:off x="3035861" y="3844880"/>
+            <a:ext cx="463886" cy="433068"/>
           </a:xfrm>
           <a:prstGeom prst="rect">
             <a:avLst/>
@@ -11988,8 +12357,10 @@
             <a:r>
               <a:rPr lang="es-ES_tradnl" sz="1100" dirty="0">
                 <a:solidFill>
-                  <a:srgbClr val="FF0000"/>
+                  <a:srgbClr val="0000CC"/>
                 </a:solidFill>
+                <a:latin typeface="Arial" pitchFamily="34" charset="0"/>
+                <a:cs typeface="Arial" pitchFamily="34" charset="0"/>
               </a:rPr>
               <a:t>4-8</a:t>
             </a:r>
@@ -12029,8 +12400,10 @@
             <a:r>
               <a:rPr lang="es-ES_tradnl" sz="1100" dirty="0">
                 <a:solidFill>
-                  <a:srgbClr val="FF0000"/>
+                  <a:srgbClr val="0000CC"/>
                 </a:solidFill>
+                <a:latin typeface="Arial" pitchFamily="34" charset="0"/>
+                <a:cs typeface="Arial" pitchFamily="34" charset="0"/>
               </a:rPr>
               <a:t>GHz</a:t>
             </a:r>
@@ -12092,7 +12465,7 @@
           </a:solidFill>
           <a:ln w="12700">
             <a:solidFill>
-              <a:srgbClr val="FF0000"/>
+              <a:srgbClr val="0000CC"/>
             </a:solidFill>
             <a:round/>
             <a:headEnd/>
@@ -12104,7 +12477,10 @@
           <a:bodyPr wrap="none" anchor="ctr"/>
           <a:lstStyle/>
           <a:p>
-            <a:endParaRPr lang="de-DE" sz="1100"/>
+            <a:endParaRPr lang="de-DE" sz="1100">
+              <a:latin typeface="Arial" pitchFamily="34" charset="0"/>
+              <a:cs typeface="Arial" pitchFamily="34" charset="0"/>
+            </a:endParaRPr>
           </a:p>
         </p:txBody>
       </p:sp>
@@ -12119,7 +12495,7 @@
         <p:spPr bwMode="auto">
           <a:xfrm flipH="1">
             <a:off x="3775922" y="2020259"/>
-            <a:ext cx="637011" cy="263791"/>
+            <a:ext cx="718764" cy="263791"/>
           </a:xfrm>
           <a:prstGeom prst="rect">
             <a:avLst/>
@@ -12173,8 +12549,10 @@
             <a:r>
               <a:rPr lang="es-ES_tradnl" sz="1100" dirty="0">
                 <a:solidFill>
-                  <a:srgbClr val="FF0000"/>
+                  <a:srgbClr val="0000CC"/>
                 </a:solidFill>
+                <a:latin typeface="Arial" pitchFamily="34" charset="0"/>
+                <a:cs typeface="Arial" pitchFamily="34" charset="0"/>
               </a:rPr>
               <a:t>G=40dB</a:t>
             </a:r>
@@ -12192,7 +12570,7 @@
         <p:spPr bwMode="auto">
           <a:xfrm flipH="1">
             <a:off x="3770227" y="2193527"/>
-            <a:ext cx="645026" cy="263791"/>
+            <a:ext cx="715558" cy="263791"/>
           </a:xfrm>
           <a:prstGeom prst="rect">
             <a:avLst/>
@@ -12244,26 +12622,32 @@
               </a:tabLst>
             </a:pPr>
             <a:r>
-              <a:rPr lang="es-ES_tradnl" sz="1100" b="1" dirty="0">
+              <a:rPr lang="es-ES_tradnl" sz="1100" dirty="0">
                 <a:solidFill>
-                  <a:srgbClr val="FF0000"/>
+                  <a:srgbClr val="0000CC"/>
                 </a:solidFill>
+                <a:latin typeface="Arial" pitchFamily="34" charset="0"/>
+                <a:cs typeface="Arial" pitchFamily="34" charset="0"/>
               </a:rPr>
               <a:t>T</a:t>
             </a:r>
             <a:r>
-              <a:rPr lang="es-ES_tradnl" sz="1100" b="1" baseline="-25000" dirty="0">
+              <a:rPr lang="es-ES_tradnl" sz="1100" baseline="-25000" dirty="0">
                 <a:solidFill>
-                  <a:srgbClr val="FF0000"/>
+                  <a:srgbClr val="0000CC"/>
                 </a:solidFill>
+                <a:latin typeface="Arial" pitchFamily="34" charset="0"/>
+                <a:cs typeface="Arial" pitchFamily="34" charset="0"/>
               </a:rPr>
               <a:t>N</a:t>
             </a:r>
             <a:r>
-              <a:rPr lang="es-ES_tradnl" sz="1100" b="1" dirty="0">
+              <a:rPr lang="es-ES_tradnl" sz="1100" dirty="0">
                 <a:solidFill>
-                  <a:srgbClr val="FF0000"/>
+                  <a:srgbClr val="0000CC"/>
                 </a:solidFill>
+                <a:latin typeface="Arial" pitchFamily="34" charset="0"/>
+                <a:cs typeface="Arial" pitchFamily="34" charset="0"/>
               </a:rPr>
               <a:t>=2.5K</a:t>
             </a:r>
@@ -12325,7 +12709,7 @@
           </a:solidFill>
           <a:ln w="12700">
             <a:solidFill>
-              <a:srgbClr val="FF0000"/>
+              <a:srgbClr val="0000CC"/>
             </a:solidFill>
             <a:round/>
             <a:headEnd/>
@@ -12337,7 +12721,10 @@
           <a:bodyPr wrap="none" anchor="ctr"/>
           <a:lstStyle/>
           <a:p>
-            <a:endParaRPr lang="de-DE" sz="1100"/>
+            <a:endParaRPr lang="de-DE" sz="1100">
+              <a:latin typeface="Arial" pitchFamily="34" charset="0"/>
+              <a:cs typeface="Arial" pitchFamily="34" charset="0"/>
+            </a:endParaRPr>
           </a:p>
         </p:txBody>
       </p:sp>
@@ -12352,7 +12739,7 @@
         <p:spPr bwMode="auto">
           <a:xfrm flipH="1">
             <a:off x="3770227" y="1589433"/>
-            <a:ext cx="637011" cy="263791"/>
+            <a:ext cx="718764" cy="263791"/>
           </a:xfrm>
           <a:prstGeom prst="rect">
             <a:avLst/>
@@ -12406,8 +12793,10 @@
             <a:r>
               <a:rPr lang="es-ES_tradnl" sz="1100" dirty="0">
                 <a:solidFill>
-                  <a:srgbClr val="FF0000"/>
+                  <a:srgbClr val="0000CC"/>
                 </a:solidFill>
+                <a:latin typeface="Arial" pitchFamily="34" charset="0"/>
+                <a:cs typeface="Arial" pitchFamily="34" charset="0"/>
               </a:rPr>
               <a:t>G=56dB</a:t>
             </a:r>
@@ -12451,7 +12840,7 @@
             </a:solidFill>
             <a:ln w="12700">
               <a:solidFill>
-                <a:srgbClr val="CC0099"/>
+                <a:srgbClr val="0000CC"/>
               </a:solidFill>
               <a:miter lim="800000"/>
               <a:headEnd/>
@@ -12463,7 +12852,13 @@
             <a:bodyPr wrap="none" anchor="ctr"/>
             <a:lstStyle/>
             <a:p>
-              <a:endParaRPr lang="de-DE" sz="1100"/>
+              <a:endParaRPr lang="de-DE" sz="1100">
+                <a:solidFill>
+                  <a:srgbClr val="0000CC"/>
+                </a:solidFill>
+                <a:latin typeface="Arial" pitchFamily="34" charset="0"/>
+                <a:cs typeface="Arial" pitchFamily="34" charset="0"/>
+              </a:endParaRPr>
             </a:p>
           </p:txBody>
         </p:sp>
@@ -12527,7 +12922,7 @@
             </a:solidFill>
             <a:ln w="12700">
               <a:solidFill>
-                <a:srgbClr val="CC0099"/>
+                <a:srgbClr val="0000CC"/>
               </a:solidFill>
               <a:round/>
               <a:headEnd/>
@@ -12539,7 +12934,13 @@
             <a:bodyPr wrap="none" anchor="ctr"/>
             <a:lstStyle/>
             <a:p>
-              <a:endParaRPr lang="de-DE" sz="1100"/>
+              <a:endParaRPr lang="de-DE" sz="1100">
+                <a:solidFill>
+                  <a:srgbClr val="0000CC"/>
+                </a:solidFill>
+                <a:latin typeface="Arial" pitchFamily="34" charset="0"/>
+                <a:cs typeface="Arial" pitchFamily="34" charset="0"/>
+              </a:endParaRPr>
             </a:p>
           </p:txBody>
         </p:sp>
@@ -12575,7 +12976,10 @@
           <a:bodyPr/>
           <a:lstStyle/>
           <a:p>
-            <a:endParaRPr lang="de-DE" sz="1100"/>
+            <a:endParaRPr lang="de-DE" sz="1100">
+              <a:latin typeface="Arial" pitchFamily="34" charset="0"/>
+              <a:cs typeface="Arial" pitchFamily="34" charset="0"/>
+            </a:endParaRPr>
           </a:p>
         </p:txBody>
       </p:sp>
@@ -12610,7 +13014,10 @@
           <a:bodyPr/>
           <a:lstStyle/>
           <a:p>
-            <a:endParaRPr lang="de-DE" sz="1100"/>
+            <a:endParaRPr lang="de-DE" sz="1100">
+              <a:latin typeface="Arial" pitchFamily="34" charset="0"/>
+              <a:cs typeface="Arial" pitchFamily="34" charset="0"/>
+            </a:endParaRPr>
           </a:p>
         </p:txBody>
       </p:sp>
@@ -12645,7 +13052,10 @@
           <a:bodyPr/>
           <a:lstStyle/>
           <a:p>
-            <a:endParaRPr lang="de-DE" sz="1100"/>
+            <a:endParaRPr lang="de-DE" sz="1100">
+              <a:latin typeface="Arial" pitchFamily="34" charset="0"/>
+              <a:cs typeface="Arial" pitchFamily="34" charset="0"/>
+            </a:endParaRPr>
           </a:p>
         </p:txBody>
       </p:sp>
@@ -12682,7 +13092,10 @@
           <a:bodyPr wrap="none" anchor="ctr"/>
           <a:lstStyle/>
           <a:p>
-            <a:endParaRPr lang="de-DE" sz="1100"/>
+            <a:endParaRPr lang="de-DE" sz="1100">
+              <a:latin typeface="Arial" pitchFamily="34" charset="0"/>
+              <a:cs typeface="Arial" pitchFamily="34" charset="0"/>
+            </a:endParaRPr>
           </a:p>
         </p:txBody>
       </p:sp>
@@ -12717,7 +13130,10 @@
           <a:bodyPr/>
           <a:lstStyle/>
           <a:p>
-            <a:endParaRPr lang="de-DE" sz="1100"/>
+            <a:endParaRPr lang="de-DE" sz="1100">
+              <a:latin typeface="Arial" pitchFamily="34" charset="0"/>
+              <a:cs typeface="Arial" pitchFamily="34" charset="0"/>
+            </a:endParaRPr>
           </a:p>
         </p:txBody>
       </p:sp>
@@ -12732,7 +13148,7 @@
         <p:spPr bwMode="auto">
           <a:xfrm flipH="1">
             <a:off x="4483147" y="1727126"/>
-            <a:ext cx="332440" cy="263791"/>
+            <a:ext cx="354882" cy="263791"/>
           </a:xfrm>
           <a:prstGeom prst="rect">
             <a:avLst/>
@@ -12788,6 +13204,8 @@
                 <a:solidFill>
                   <a:srgbClr val="008000"/>
                 </a:solidFill>
+                <a:latin typeface="Arial" pitchFamily="34" charset="0"/>
+                <a:cs typeface="Arial" pitchFamily="34" charset="0"/>
               </a:rPr>
               <a:t>dB</a:t>
             </a:r>
@@ -12843,7 +13261,10 @@
             <a:bodyPr wrap="none" anchor="ctr"/>
             <a:lstStyle/>
             <a:p>
-              <a:endParaRPr lang="de-DE" sz="1100"/>
+              <a:endParaRPr lang="de-DE" sz="1100">
+                <a:latin typeface="Arial" pitchFamily="34" charset="0"/>
+                <a:cs typeface="Arial" pitchFamily="34" charset="0"/>
+              </a:endParaRPr>
             </a:p>
           </p:txBody>
         </p:sp>
@@ -12919,7 +13340,10 @@
             <a:bodyPr wrap="none" anchor="ctr"/>
             <a:lstStyle/>
             <a:p>
-              <a:endParaRPr lang="de-DE" sz="1100"/>
+              <a:endParaRPr lang="de-DE" sz="1100">
+                <a:latin typeface="Arial" pitchFamily="34" charset="0"/>
+                <a:cs typeface="Arial" pitchFamily="34" charset="0"/>
+              </a:endParaRPr>
             </a:p>
           </p:txBody>
         </p:sp>
@@ -12934,8 +13358,8 @@
         </p:nvSpPr>
         <p:spPr bwMode="auto">
           <a:xfrm flipH="1">
-            <a:off x="3644719" y="356897"/>
-            <a:ext cx="999289" cy="263791"/>
+            <a:off x="3601438" y="356897"/>
+            <a:ext cx="1042570" cy="263791"/>
           </a:xfrm>
           <a:prstGeom prst="rect">
             <a:avLst/>
@@ -12987,17 +13411,21 @@
               </a:tabLst>
             </a:pPr>
             <a:r>
-              <a:rPr lang="fr-FR" sz="1100" b="1" dirty="0" err="1" smtClean="0">
+              <a:rPr lang="fr-FR" sz="1100" dirty="0" err="1" smtClean="0">
                 <a:solidFill>
-                  <a:srgbClr val="CC0099"/>
+                  <a:srgbClr val="0000CC"/>
                 </a:solidFill>
+                <a:latin typeface="Arial" pitchFamily="34" charset="0"/>
+                <a:cs typeface="Arial" pitchFamily="34" charset="0"/>
               </a:rPr>
               <a:t>measurement</a:t>
             </a:r>
-            <a:endParaRPr lang="fr-FR" sz="1100" b="1" dirty="0">
+            <a:endParaRPr lang="fr-FR" sz="1100" dirty="0">
               <a:solidFill>
-                <a:srgbClr val="CC0099"/>
+                <a:srgbClr val="0000CC"/>
               </a:solidFill>
+              <a:latin typeface="Arial" pitchFamily="34" charset="0"/>
+              <a:cs typeface="Arial" pitchFamily="34" charset="0"/>
             </a:endParaRPr>
           </a:p>
         </p:txBody>
@@ -13012,8 +13440,8 @@
         </p:nvSpPr>
         <p:spPr bwMode="auto">
           <a:xfrm flipH="1">
-            <a:off x="5652120" y="1412776"/>
-            <a:ext cx="479916" cy="263791"/>
+            <a:off x="5644105" y="1412776"/>
+            <a:ext cx="487931" cy="263791"/>
           </a:xfrm>
           <a:prstGeom prst="rect">
             <a:avLst/>
@@ -13065,17 +13493,21 @@
               </a:tabLst>
             </a:pPr>
             <a:r>
-              <a:rPr lang="es-ES_tradnl" sz="1100" b="1" dirty="0" smtClean="0">
+              <a:rPr lang="es-ES_tradnl" sz="1100" dirty="0" smtClean="0">
                 <a:solidFill>
                   <a:srgbClr val="008000"/>
                 </a:solidFill>
+                <a:latin typeface="Arial" pitchFamily="34" charset="0"/>
+                <a:cs typeface="Arial" pitchFamily="34" charset="0"/>
               </a:rPr>
               <a:t>drive</a:t>
             </a:r>
-            <a:endParaRPr lang="es-ES_tradnl" sz="1100" b="1" dirty="0">
+            <a:endParaRPr lang="es-ES_tradnl" sz="1100" dirty="0">
               <a:solidFill>
                 <a:srgbClr val="008000"/>
               </a:solidFill>
+              <a:latin typeface="Arial" pitchFamily="34" charset="0"/>
+              <a:cs typeface="Arial" pitchFamily="34" charset="0"/>
             </a:endParaRPr>
           </a:p>
         </p:txBody>
@@ -13099,7 +13531,7 @@
           <a:noFill/>
           <a:ln w="12700">
             <a:solidFill>
-              <a:srgbClr val="CC0099"/>
+              <a:srgbClr val="0000CC"/>
             </a:solidFill>
             <a:miter lim="800000"/>
             <a:headEnd/>
@@ -13111,7 +13543,10 @@
           <a:bodyPr/>
           <a:lstStyle/>
           <a:p>
-            <a:endParaRPr lang="de-DE" sz="1100"/>
+            <a:endParaRPr lang="de-DE" sz="1100">
+              <a:latin typeface="Arial" pitchFamily="34" charset="0"/>
+              <a:cs typeface="Arial" pitchFamily="34" charset="0"/>
+            </a:endParaRPr>
           </a:p>
         </p:txBody>
       </p:sp>
@@ -13179,7 +13614,7 @@
           <a:noFill/>
           <a:ln w="12700">
             <a:solidFill>
-              <a:srgbClr val="CC0099"/>
+              <a:srgbClr val="0000CC"/>
             </a:solidFill>
             <a:round/>
             <a:headEnd/>
@@ -13191,7 +13626,13 @@
           <a:bodyPr wrap="none" anchor="ctr"/>
           <a:lstStyle/>
           <a:p>
-            <a:endParaRPr lang="de-DE" sz="1100"/>
+            <a:endParaRPr lang="de-DE" sz="1100">
+              <a:solidFill>
+                <a:srgbClr val="0000CC"/>
+              </a:solidFill>
+              <a:latin typeface="Arial" pitchFamily="34" charset="0"/>
+              <a:cs typeface="Arial" pitchFamily="34" charset="0"/>
+            </a:endParaRPr>
           </a:p>
         </p:txBody>
       </p:sp>
@@ -13226,7 +13667,10 @@
           <a:bodyPr/>
           <a:lstStyle/>
           <a:p>
-            <a:endParaRPr lang="de-DE" sz="1100"/>
+            <a:endParaRPr lang="de-DE" sz="1100">
+              <a:latin typeface="Arial" pitchFamily="34" charset="0"/>
+              <a:cs typeface="Arial" pitchFamily="34" charset="0"/>
+            </a:endParaRPr>
           </a:p>
         </p:txBody>
       </p:sp>
@@ -13249,7 +13693,7 @@
           <a:noFill/>
           <a:ln w="12700">
             <a:solidFill>
-              <a:srgbClr val="CC0099"/>
+              <a:srgbClr val="0000CC"/>
             </a:solidFill>
             <a:miter lim="800000"/>
             <a:headEnd/>
@@ -13261,7 +13705,10 @@
           <a:bodyPr/>
           <a:lstStyle/>
           <a:p>
-            <a:endParaRPr lang="de-DE" sz="1100"/>
+            <a:endParaRPr lang="de-DE" sz="1100">
+              <a:latin typeface="Arial" pitchFamily="34" charset="0"/>
+              <a:cs typeface="Arial" pitchFamily="34" charset="0"/>
+            </a:endParaRPr>
           </a:p>
         </p:txBody>
       </p:sp>
@@ -13296,7 +13743,10 @@
           <a:bodyPr/>
           <a:lstStyle/>
           <a:p>
-            <a:endParaRPr lang="de-DE" sz="1100"/>
+            <a:endParaRPr lang="de-DE" sz="1100">
+              <a:latin typeface="Arial" pitchFamily="34" charset="0"/>
+              <a:cs typeface="Arial" pitchFamily="34" charset="0"/>
+            </a:endParaRPr>
           </a:p>
         </p:txBody>
       </p:sp>
@@ -13319,7 +13769,7 @@
           <a:noFill/>
           <a:ln w="12700">
             <a:solidFill>
-              <a:srgbClr val="CC0099"/>
+              <a:srgbClr val="0000CC"/>
             </a:solidFill>
             <a:miter lim="800000"/>
             <a:headEnd/>
@@ -13331,7 +13781,10 @@
           <a:bodyPr/>
           <a:lstStyle/>
           <a:p>
-            <a:endParaRPr lang="de-DE" sz="1100"/>
+            <a:endParaRPr lang="de-DE" sz="1100">
+              <a:latin typeface="Arial" pitchFamily="34" charset="0"/>
+              <a:cs typeface="Arial" pitchFamily="34" charset="0"/>
+            </a:endParaRPr>
           </a:p>
         </p:txBody>
       </p:sp>
@@ -13368,7 +13821,10 @@
           <a:bodyPr wrap="none" anchor="ctr"/>
           <a:lstStyle/>
           <a:p>
-            <a:endParaRPr lang="de-DE" sz="1100"/>
+            <a:endParaRPr lang="de-DE" sz="1100">
+              <a:latin typeface="Arial" pitchFamily="34" charset="0"/>
+              <a:cs typeface="Arial" pitchFamily="34" charset="0"/>
+            </a:endParaRPr>
           </a:p>
         </p:txBody>
       </p:sp>
@@ -13383,7 +13839,7 @@
         <p:spPr bwMode="auto">
           <a:xfrm flipH="1">
             <a:off x="3347864" y="850904"/>
-            <a:ext cx="217024" cy="263792"/>
+            <a:ext cx="220230" cy="263791"/>
           </a:xfrm>
           <a:prstGeom prst="rect">
             <a:avLst/>
@@ -13439,6 +13895,8 @@
                 <a:solidFill>
                   <a:srgbClr val="000000"/>
                 </a:solidFill>
+                <a:latin typeface="Arial" pitchFamily="34" charset="0"/>
+                <a:cs typeface="Arial" pitchFamily="34" charset="0"/>
               </a:rPr>
               <a:t>I</a:t>
             </a:r>
@@ -13456,7 +13914,7 @@
         <p:spPr bwMode="auto">
           <a:xfrm flipH="1">
             <a:off x="3347864" y="1282952"/>
-            <a:ext cx="276335" cy="263792"/>
+            <a:ext cx="290762" cy="263791"/>
           </a:xfrm>
           <a:prstGeom prst="rect">
             <a:avLst/>
@@ -13512,6 +13970,8 @@
                 <a:solidFill>
                   <a:srgbClr val="000000"/>
                 </a:solidFill>
+                <a:latin typeface="Arial" pitchFamily="34" charset="0"/>
+                <a:cs typeface="Arial" pitchFamily="34" charset="0"/>
               </a:rPr>
               <a:t>Q</a:t>
             </a:r>
@@ -13563,7 +14023,10 @@
             <a:bodyPr/>
             <a:lstStyle/>
             <a:p>
-              <a:endParaRPr lang="de-DE" sz="1100"/>
+              <a:endParaRPr lang="de-DE" sz="1100">
+                <a:latin typeface="Arial" pitchFamily="34" charset="0"/>
+                <a:cs typeface="Arial" pitchFamily="34" charset="0"/>
+              </a:endParaRPr>
             </a:p>
           </p:txBody>
         </p:sp>
@@ -13683,33 +14146,41 @@
           <a:p>
             <a:pPr algn="ctr"/>
             <a:r>
-              <a:rPr lang="fr-FR" sz="1100" b="1" dirty="0" err="1">
+              <a:rPr lang="fr-FR" sz="1100" dirty="0" err="1">
                 <a:solidFill>
                   <a:schemeClr val="tx1"/>
                 </a:solidFill>
+                <a:latin typeface="Arial" pitchFamily="34" charset="0"/>
+                <a:cs typeface="Arial" pitchFamily="34" charset="0"/>
               </a:rPr>
               <a:t>q</a:t>
             </a:r>
             <a:r>
-              <a:rPr lang="fr-FR" sz="1100" b="1" dirty="0" err="1" smtClean="0">
+              <a:rPr lang="fr-FR" sz="1100" dirty="0" err="1" smtClean="0">
                 <a:solidFill>
                   <a:schemeClr val="tx1"/>
                 </a:solidFill>
+                <a:latin typeface="Arial" pitchFamily="34" charset="0"/>
+                <a:cs typeface="Arial" pitchFamily="34" charset="0"/>
               </a:rPr>
               <a:t>ubit</a:t>
             </a:r>
             <a:r>
-              <a:rPr lang="fr-FR" sz="1100" b="1" dirty="0" smtClean="0">
+              <a:rPr lang="fr-FR" sz="1100" dirty="0" smtClean="0">
                 <a:solidFill>
                   <a:schemeClr val="tx1"/>
                 </a:solidFill>
+                <a:latin typeface="Arial" pitchFamily="34" charset="0"/>
+                <a:cs typeface="Arial" pitchFamily="34" charset="0"/>
               </a:rPr>
               <a:t> chip</a:t>
             </a:r>
-            <a:endParaRPr lang="de-DE" sz="1100" b="1" dirty="0">
+            <a:endParaRPr lang="de-DE" sz="1100" dirty="0">
               <a:solidFill>
                 <a:schemeClr val="tx1"/>
               </a:solidFill>
+              <a:latin typeface="Arial" pitchFamily="34" charset="0"/>
+              <a:cs typeface="Arial" pitchFamily="34" charset="0"/>
             </a:endParaRPr>
           </a:p>
         </p:txBody>
@@ -13722,7 +14193,7 @@
         </p:nvCxnSpPr>
         <p:spPr>
           <a:xfrm rot="5400000" flipH="1" flipV="1">
-            <a:off x="2234820" y="5009590"/>
+            <a:off x="2259886" y="5009590"/>
             <a:ext cx="613364" cy="1364"/>
           </a:xfrm>
           <a:prstGeom prst="line">
@@ -13730,7 +14201,7 @@
           </a:prstGeom>
           <a:ln w="12700">
             <a:solidFill>
-              <a:srgbClr val="7030A0"/>
+              <a:srgbClr val="FF0000"/>
             </a:solidFill>
           </a:ln>
         </p:spPr>
@@ -13759,7 +14230,7 @@
         </p:nvSpPr>
         <p:spPr bwMode="auto">
           <a:xfrm>
-            <a:off x="5630658" y="1941999"/>
+            <a:off x="5630658" y="1844824"/>
             <a:ext cx="110484" cy="2615869"/>
           </a:xfrm>
           <a:prstGeom prst="roundRect">
@@ -13779,9 +14250,7 @@
             <a:lin ang="5400000" scaled="1"/>
           </a:gradFill>
           <a:ln w="12700">
-            <a:solidFill>
-              <a:schemeClr val="tx1"/>
-            </a:solidFill>
+            <a:noFill/>
             <a:round/>
             <a:headEnd/>
             <a:tailEnd/>
@@ -13792,7 +14261,10 @@
           <a:bodyPr wrap="none" anchor="ctr"/>
           <a:lstStyle/>
           <a:p>
-            <a:endParaRPr lang="de-DE" sz="1100"/>
+            <a:endParaRPr lang="de-DE" sz="1100">
+              <a:latin typeface="Arial" pitchFamily="34" charset="0"/>
+              <a:cs typeface="Arial" pitchFamily="34" charset="0"/>
+            </a:endParaRPr>
           </a:p>
         </p:txBody>
       </p:sp>
@@ -13807,7 +14279,7 @@
         <p:spPr bwMode="auto">
           <a:xfrm>
             <a:off x="3706212" y="1146079"/>
-            <a:ext cx="334044" cy="263791"/>
+            <a:ext cx="377324" cy="263791"/>
           </a:xfrm>
           <a:prstGeom prst="rect">
             <a:avLst/>
@@ -13863,6 +14335,8 @@
                 <a:solidFill>
                   <a:srgbClr val="000000"/>
                 </a:solidFill>
+                <a:latin typeface="Arial" pitchFamily="34" charset="0"/>
+                <a:cs typeface="Arial" pitchFamily="34" charset="0"/>
               </a:rPr>
               <a:t>LO</a:t>
             </a:r>
@@ -13890,7 +14364,7 @@
           </a:solidFill>
           <a:ln w="12700">
             <a:solidFill>
-              <a:srgbClr val="7030A0"/>
+              <a:srgbClr val="FF0000"/>
             </a:solidFill>
             <a:miter lim="800000"/>
             <a:headEnd/>
@@ -13902,7 +14376,10 @@
           <a:bodyPr wrap="none" anchor="ctr"/>
           <a:lstStyle/>
           <a:p>
-            <a:endParaRPr lang="de-DE" sz="1100"/>
+            <a:endParaRPr lang="de-DE" sz="1100">
+              <a:latin typeface="Arial" pitchFamily="34" charset="0"/>
+              <a:cs typeface="Arial" pitchFamily="34" charset="0"/>
+            </a:endParaRPr>
           </a:p>
         </p:txBody>
       </p:sp>
@@ -13916,7 +14393,7 @@
         </p:nvSpPr>
         <p:spPr bwMode="auto">
           <a:xfrm>
-            <a:off x="2492064" y="4461993"/>
+            <a:off x="2467719" y="4461993"/>
             <a:ext cx="142377" cy="178081"/>
           </a:xfrm>
           <a:custGeom>
@@ -13959,7 +14436,7 @@
           <a:noFill/>
           <a:ln w="12700">
             <a:solidFill>
-              <a:srgbClr val="7030A0"/>
+              <a:srgbClr val="FF0000"/>
             </a:solidFill>
             <a:round/>
             <a:headEnd/>
@@ -13971,7 +14448,10 @@
           <a:bodyPr wrap="none" anchor="ctr"/>
           <a:lstStyle/>
           <a:p>
-            <a:endParaRPr lang="de-DE" sz="1100"/>
+            <a:endParaRPr lang="de-DE" sz="1100">
+              <a:latin typeface="Arial" pitchFamily="34" charset="0"/>
+              <a:cs typeface="Arial" pitchFamily="34" charset="0"/>
+            </a:endParaRPr>
           </a:p>
         </p:txBody>
       </p:sp>
@@ -13996,7 +14476,7 @@
           </a:solidFill>
           <a:ln w="12700">
             <a:solidFill>
-              <a:srgbClr val="7030A0"/>
+              <a:srgbClr val="FF0000"/>
             </a:solidFill>
             <a:miter lim="800000"/>
             <a:headEnd/>
@@ -14008,7 +14488,10 @@
           <a:bodyPr wrap="none" anchor="ctr"/>
           <a:lstStyle/>
           <a:p>
-            <a:endParaRPr lang="de-DE" sz="1100"/>
+            <a:endParaRPr lang="de-DE" sz="1100">
+              <a:latin typeface="Arial" pitchFamily="34" charset="0"/>
+              <a:cs typeface="Arial" pitchFamily="34" charset="0"/>
+            </a:endParaRPr>
           </a:p>
         </p:txBody>
       </p:sp>
@@ -14022,7 +14505,7 @@
         </p:nvSpPr>
         <p:spPr bwMode="auto">
           <a:xfrm>
-            <a:off x="2483730" y="3438783"/>
+            <a:off x="2459385" y="3438783"/>
             <a:ext cx="142377" cy="178081"/>
           </a:xfrm>
           <a:custGeom>
@@ -14065,7 +14548,7 @@
           <a:noFill/>
           <a:ln w="12700">
             <a:solidFill>
-              <a:srgbClr val="7030A0"/>
+              <a:srgbClr val="FF0000"/>
             </a:solidFill>
             <a:round/>
             <a:headEnd/>
@@ -14077,7 +14560,10 @@
           <a:bodyPr wrap="none" anchor="ctr"/>
           <a:lstStyle/>
           <a:p>
-            <a:endParaRPr lang="de-DE" sz="1100"/>
+            <a:endParaRPr lang="de-DE" sz="1100">
+              <a:latin typeface="Arial" pitchFamily="34" charset="0"/>
+              <a:cs typeface="Arial" pitchFamily="34" charset="0"/>
+            </a:endParaRPr>
           </a:p>
         </p:txBody>
       </p:sp>
@@ -14089,7 +14575,7 @@
         </p:nvCxnSpPr>
         <p:spPr>
           <a:xfrm rot="5400000" flipH="1" flipV="1">
-            <a:off x="2184206" y="4037105"/>
+            <a:off x="2209272" y="4037105"/>
             <a:ext cx="700738" cy="5940"/>
           </a:xfrm>
           <a:prstGeom prst="line">
@@ -14097,7 +14583,7 @@
           </a:prstGeom>
           <a:ln w="12700">
             <a:solidFill>
-              <a:srgbClr val="7030A0"/>
+              <a:srgbClr val="FF0000"/>
             </a:solidFill>
           </a:ln>
         </p:spPr>
@@ -14126,7 +14612,7 @@
         </p:nvSpPr>
         <p:spPr bwMode="auto">
           <a:xfrm>
-            <a:off x="2485226" y="2121981"/>
+            <a:off x="2510292" y="2121981"/>
             <a:ext cx="100233" cy="259902"/>
           </a:xfrm>
           <a:prstGeom prst="rect">
@@ -14137,7 +14623,7 @@
           </a:solidFill>
           <a:ln w="12700">
             <a:solidFill>
-              <a:srgbClr val="7030A0"/>
+              <a:srgbClr val="FF0000"/>
             </a:solidFill>
             <a:miter lim="800000"/>
             <a:headEnd/>
@@ -14149,7 +14635,10 @@
           <a:bodyPr wrap="none" anchor="ctr"/>
           <a:lstStyle/>
           <a:p>
-            <a:endParaRPr lang="de-DE" sz="1100"/>
+            <a:endParaRPr lang="de-DE" sz="1100">
+              <a:latin typeface="Arial" pitchFamily="34" charset="0"/>
+              <a:cs typeface="Arial" pitchFamily="34" charset="0"/>
+            </a:endParaRPr>
           </a:p>
         </p:txBody>
       </p:sp>
@@ -14157,14 +14646,13 @@
         <p:nvCxnSpPr>
           <p:cNvPr id="84" name="Gerade Verbindung 405"/>
           <p:cNvCxnSpPr>
-            <a:stCxn id="80" idx="0"/>
             <a:endCxn id="83" idx="2"/>
           </p:cNvCxnSpPr>
           <p:nvPr/>
         </p:nvCxnSpPr>
         <p:spPr>
           <a:xfrm rot="5400000" flipH="1" flipV="1">
-            <a:off x="2040534" y="2871780"/>
+            <a:off x="2065600" y="2871780"/>
             <a:ext cx="984704" cy="4911"/>
           </a:xfrm>
           <a:prstGeom prst="line">
@@ -14172,7 +14660,7 @@
           </a:prstGeom>
           <a:ln w="12700">
             <a:solidFill>
-              <a:srgbClr val="7030A0"/>
+              <a:srgbClr val="FF0000"/>
             </a:solidFill>
           </a:ln>
         </p:spPr>
@@ -14202,7 +14690,7 @@
         <p:spPr bwMode="auto">
           <a:xfrm>
             <a:off x="2720522" y="2153686"/>
-            <a:ext cx="451062" cy="248402"/>
+            <a:ext cx="494344" cy="248402"/>
           </a:xfrm>
           <a:prstGeom prst="rect">
             <a:avLst/>
@@ -14258,6 +14746,8 @@
                 <a:solidFill>
                   <a:srgbClr val="7030A0"/>
                 </a:solidFill>
+                <a:latin typeface="Arial" pitchFamily="34" charset="0"/>
+                <a:cs typeface="Arial" pitchFamily="34" charset="0"/>
               </a:rPr>
               <a:t>20dB</a:t>
             </a:r>
@@ -14272,7 +14762,7 @@
         </p:nvCxnSpPr>
         <p:spPr>
           <a:xfrm rot="5400000" flipH="1" flipV="1">
-            <a:off x="2367927" y="1939803"/>
+            <a:off x="2383468" y="1939803"/>
             <a:ext cx="377620" cy="0"/>
           </a:xfrm>
           <a:prstGeom prst="line">
@@ -14280,7 +14770,7 @@
           </a:prstGeom>
           <a:ln w="12700">
             <a:solidFill>
-              <a:srgbClr val="7030A0"/>
+              <a:srgbClr val="FF0000"/>
             </a:solidFill>
           </a:ln>
         </p:spPr>
@@ -14309,7 +14799,7 @@
         </p:nvSpPr>
         <p:spPr bwMode="auto">
           <a:xfrm>
-            <a:off x="2477752" y="1592456"/>
+            <a:off x="2483768" y="1582931"/>
             <a:ext cx="176547" cy="104683"/>
           </a:xfrm>
           <a:custGeom>
@@ -14363,7 +14853,7 @@
           <a:noFill/>
           <a:ln w="12700">
             <a:solidFill>
-              <a:srgbClr val="7030A0"/>
+              <a:srgbClr val="FF0000"/>
             </a:solidFill>
             <a:round/>
             <a:headEnd/>
@@ -14375,7 +14865,10 @@
           <a:bodyPr wrap="none" anchor="ctr"/>
           <a:lstStyle/>
           <a:p>
-            <a:endParaRPr lang="de-DE" sz="1100"/>
+            <a:endParaRPr lang="de-DE" sz="1100">
+              <a:latin typeface="Arial" pitchFamily="34" charset="0"/>
+              <a:cs typeface="Arial" pitchFamily="34" charset="0"/>
+            </a:endParaRPr>
           </a:p>
         </p:txBody>
       </p:sp>
@@ -14390,7 +14883,7 @@
         <p:spPr bwMode="auto">
           <a:xfrm>
             <a:off x="2693165" y="3366587"/>
-            <a:ext cx="699528" cy="263791"/>
+            <a:ext cx="776472" cy="263791"/>
           </a:xfrm>
           <a:prstGeom prst="rect">
             <a:avLst/>
@@ -14446,6 +14939,8 @@
                 <a:solidFill>
                   <a:srgbClr val="7030A0"/>
                 </a:solidFill>
+                <a:latin typeface="Arial" pitchFamily="34" charset="0"/>
+                <a:cs typeface="Arial" pitchFamily="34" charset="0"/>
               </a:rPr>
               <a:t>1.35 GHz</a:t>
             </a:r>
@@ -14453,6 +14948,8 @@
               <a:solidFill>
                 <a:srgbClr val="7030A0"/>
               </a:solidFill>
+              <a:latin typeface="Arial" pitchFamily="34" charset="0"/>
+              <a:cs typeface="Arial" pitchFamily="34" charset="0"/>
             </a:endParaRPr>
           </a:p>
         </p:txBody>
@@ -14467,8 +14964,8 @@
         </p:nvSpPr>
         <p:spPr bwMode="auto">
           <a:xfrm rot="16200000">
-            <a:off x="1704871" y="4484210"/>
-            <a:ext cx="694719" cy="433068"/>
+            <a:off x="1667202" y="4484210"/>
+            <a:ext cx="770059" cy="433068"/>
           </a:xfrm>
           <a:prstGeom prst="rect">
             <a:avLst/>
@@ -14522,8 +15019,10 @@
             <a:r>
               <a:rPr lang="es-ES_tradnl" sz="1100" dirty="0" smtClean="0">
                 <a:solidFill>
-                  <a:srgbClr val="7030A0"/>
+                  <a:srgbClr val="FF0000"/>
                 </a:solidFill>
+                <a:latin typeface="Arial" pitchFamily="34" charset="0"/>
+                <a:cs typeface="Arial" pitchFamily="34" charset="0"/>
               </a:rPr>
               <a:t>Eccosorb</a:t>
             </a:r>
@@ -14563,15 +15062,19 @@
             <a:r>
               <a:rPr lang="es-ES_tradnl" sz="1100" dirty="0" smtClean="0">
                 <a:solidFill>
-                  <a:srgbClr val="7030A0"/>
+                  <a:srgbClr val="FF0000"/>
                 </a:solidFill>
+                <a:latin typeface="Arial" pitchFamily="34" charset="0"/>
+                <a:cs typeface="Arial" pitchFamily="34" charset="0"/>
               </a:rPr>
               <a:t>filter</a:t>
             </a:r>
             <a:endParaRPr lang="es-ES_tradnl" sz="1100" dirty="0">
               <a:solidFill>
-                <a:srgbClr val="7030A0"/>
+                <a:srgbClr val="FF0000"/>
               </a:solidFill>
+              <a:latin typeface="Arial" pitchFamily="34" charset="0"/>
+              <a:cs typeface="Arial" pitchFamily="34" charset="0"/>
             </a:endParaRPr>
           </a:p>
         </p:txBody>
@@ -14609,7 +15112,10 @@
           <a:bodyPr wrap="none" anchor="ctr"/>
           <a:lstStyle/>
           <a:p>
-            <a:endParaRPr lang="de-DE" sz="1100"/>
+            <a:endParaRPr lang="de-DE" sz="1100">
+              <a:latin typeface="Arial" pitchFamily="34" charset="0"/>
+              <a:cs typeface="Arial" pitchFamily="34" charset="0"/>
+            </a:endParaRPr>
           </a:p>
         </p:txBody>
       </p:sp>
@@ -14646,7 +15152,10 @@
           <a:bodyPr wrap="none" anchor="ctr"/>
           <a:lstStyle/>
           <a:p>
-            <a:endParaRPr lang="de-DE" sz="1100"/>
+            <a:endParaRPr lang="de-DE" sz="1100">
+              <a:latin typeface="Arial" pitchFamily="34" charset="0"/>
+              <a:cs typeface="Arial" pitchFamily="34" charset="0"/>
+            </a:endParaRPr>
           </a:p>
         </p:txBody>
       </p:sp>
@@ -14661,7 +15170,7 @@
         <p:spPr bwMode="auto">
           <a:xfrm>
             <a:off x="4952808" y="871001"/>
-            <a:ext cx="217024" cy="263791"/>
+            <a:ext cx="220230" cy="263791"/>
           </a:xfrm>
           <a:prstGeom prst="rect">
             <a:avLst/>
@@ -14717,6 +15226,8 @@
                 <a:solidFill>
                   <a:srgbClr val="000000"/>
                 </a:solidFill>
+                <a:latin typeface="Arial" pitchFamily="34" charset="0"/>
+                <a:cs typeface="Arial" pitchFamily="34" charset="0"/>
               </a:rPr>
               <a:t>I</a:t>
             </a:r>
@@ -14724,6 +15235,8 @@
               <a:solidFill>
                 <a:srgbClr val="000000"/>
               </a:solidFill>
+              <a:latin typeface="Arial" pitchFamily="34" charset="0"/>
+              <a:cs typeface="Arial" pitchFamily="34" charset="0"/>
             </a:endParaRPr>
           </a:p>
         </p:txBody>
@@ -14739,7 +15252,7 @@
         <p:spPr bwMode="auto">
           <a:xfrm>
             <a:off x="5333944" y="871001"/>
-            <a:ext cx="276335" cy="263791"/>
+            <a:ext cx="290762" cy="263791"/>
           </a:xfrm>
           <a:prstGeom prst="rect">
             <a:avLst/>
@@ -14795,6 +15308,8 @@
                 <a:solidFill>
                   <a:srgbClr val="000000"/>
                 </a:solidFill>
+                <a:latin typeface="Arial" pitchFamily="34" charset="0"/>
+                <a:cs typeface="Arial" pitchFamily="34" charset="0"/>
               </a:rPr>
               <a:t>Q</a:t>
             </a:r>
@@ -14802,6 +15317,8 @@
               <a:solidFill>
                 <a:srgbClr val="000000"/>
               </a:solidFill>
+              <a:latin typeface="Arial" pitchFamily="34" charset="0"/>
+              <a:cs typeface="Arial" pitchFamily="34" charset="0"/>
             </a:endParaRPr>
           </a:p>
         </p:txBody>

</xml_diff>

<commit_message>
Worked on figures and processor characterization chapter.
</commit_message>
<xml_diff>
--- a/material/figures/2-qubit-processor/measurement setup.pptx
+++ b/material/figures/2-qubit-processor/measurement setup.pptx
@@ -289,7 +289,7 @@
             <a:fld id="{B9E39FB9-1184-4BFA-89AE-DC8B5833E156}" type="datetimeFigureOut">
               <a:rPr lang="de-DE" smtClean="0"/>
               <a:pPr/>
-              <a:t>23.08.2012</a:t>
+              <a:t>25.08.2012</a:t>
             </a:fld>
             <a:endParaRPr lang="de-DE"/>
           </a:p>
@@ -456,7 +456,7 @@
             <a:fld id="{B9E39FB9-1184-4BFA-89AE-DC8B5833E156}" type="datetimeFigureOut">
               <a:rPr lang="de-DE" smtClean="0"/>
               <a:pPr/>
-              <a:t>23.08.2012</a:t>
+              <a:t>25.08.2012</a:t>
             </a:fld>
             <a:endParaRPr lang="de-DE"/>
           </a:p>
@@ -633,7 +633,7 @@
             <a:fld id="{B9E39FB9-1184-4BFA-89AE-DC8B5833E156}" type="datetimeFigureOut">
               <a:rPr lang="de-DE" smtClean="0"/>
               <a:pPr/>
-              <a:t>23.08.2012</a:t>
+              <a:t>25.08.2012</a:t>
             </a:fld>
             <a:endParaRPr lang="de-DE"/>
           </a:p>
@@ -800,7 +800,7 @@
             <a:fld id="{B9E39FB9-1184-4BFA-89AE-DC8B5833E156}" type="datetimeFigureOut">
               <a:rPr lang="de-DE" smtClean="0"/>
               <a:pPr/>
-              <a:t>23.08.2012</a:t>
+              <a:t>25.08.2012</a:t>
             </a:fld>
             <a:endParaRPr lang="de-DE"/>
           </a:p>
@@ -1043,7 +1043,7 @@
             <a:fld id="{B9E39FB9-1184-4BFA-89AE-DC8B5833E156}" type="datetimeFigureOut">
               <a:rPr lang="de-DE" smtClean="0"/>
               <a:pPr/>
-              <a:t>23.08.2012</a:t>
+              <a:t>25.08.2012</a:t>
             </a:fld>
             <a:endParaRPr lang="de-DE"/>
           </a:p>
@@ -1328,7 +1328,7 @@
             <a:fld id="{B9E39FB9-1184-4BFA-89AE-DC8B5833E156}" type="datetimeFigureOut">
               <a:rPr lang="de-DE" smtClean="0"/>
               <a:pPr/>
-              <a:t>23.08.2012</a:t>
+              <a:t>25.08.2012</a:t>
             </a:fld>
             <a:endParaRPr lang="de-DE"/>
           </a:p>
@@ -1747,7 +1747,7 @@
             <a:fld id="{B9E39FB9-1184-4BFA-89AE-DC8B5833E156}" type="datetimeFigureOut">
               <a:rPr lang="de-DE" smtClean="0"/>
               <a:pPr/>
-              <a:t>23.08.2012</a:t>
+              <a:t>25.08.2012</a:t>
             </a:fld>
             <a:endParaRPr lang="de-DE"/>
           </a:p>
@@ -1862,7 +1862,7 @@
             <a:fld id="{B9E39FB9-1184-4BFA-89AE-DC8B5833E156}" type="datetimeFigureOut">
               <a:rPr lang="de-DE" smtClean="0"/>
               <a:pPr/>
-              <a:t>23.08.2012</a:t>
+              <a:t>25.08.2012</a:t>
             </a:fld>
             <a:endParaRPr lang="de-DE"/>
           </a:p>
@@ -1954,7 +1954,7 @@
             <a:fld id="{B9E39FB9-1184-4BFA-89AE-DC8B5833E156}" type="datetimeFigureOut">
               <a:rPr lang="de-DE" smtClean="0"/>
               <a:pPr/>
-              <a:t>23.08.2012</a:t>
+              <a:t>25.08.2012</a:t>
             </a:fld>
             <a:endParaRPr lang="de-DE"/>
           </a:p>
@@ -2228,7 +2228,7 @@
             <a:fld id="{B9E39FB9-1184-4BFA-89AE-DC8B5833E156}" type="datetimeFigureOut">
               <a:rPr lang="de-DE" smtClean="0"/>
               <a:pPr/>
-              <a:t>23.08.2012</a:t>
+              <a:t>25.08.2012</a:t>
             </a:fld>
             <a:endParaRPr lang="de-DE"/>
           </a:p>
@@ -2478,7 +2478,7 @@
             <a:fld id="{B9E39FB9-1184-4BFA-89AE-DC8B5833E156}" type="datetimeFigureOut">
               <a:rPr lang="de-DE" smtClean="0"/>
               <a:pPr/>
-              <a:t>23.08.2012</a:t>
+              <a:t>25.08.2012</a:t>
             </a:fld>
             <a:endParaRPr lang="de-DE"/>
           </a:p>
@@ -2688,7 +2688,7 @@
             <a:fld id="{B9E39FB9-1184-4BFA-89AE-DC8B5833E156}" type="datetimeFigureOut">
               <a:rPr lang="de-DE" smtClean="0"/>
               <a:pPr/>
-              <a:t>23.08.2012</a:t>
+              <a:t>25.08.2012</a:t>
             </a:fld>
             <a:endParaRPr lang="de-DE"/>
           </a:p>
@@ -14744,7 +14744,7 @@
             <a:r>
               <a:rPr lang="es-ES_tradnl" sz="1000" dirty="0">
                 <a:solidFill>
-                  <a:srgbClr val="7030A0"/>
+                  <a:srgbClr val="FF0000"/>
                 </a:solidFill>
                 <a:latin typeface="Arial" pitchFamily="34" charset="0"/>
                 <a:cs typeface="Arial" pitchFamily="34" charset="0"/>
@@ -14937,7 +14937,7 @@
             <a:r>
               <a:rPr lang="es-ES_tradnl" sz="1100" dirty="0" smtClean="0">
                 <a:solidFill>
-                  <a:srgbClr val="7030A0"/>
+                  <a:srgbClr val="FF0000"/>
                 </a:solidFill>
                 <a:latin typeface="Arial" pitchFamily="34" charset="0"/>
                 <a:cs typeface="Arial" pitchFamily="34" charset="0"/>
@@ -14946,7 +14946,7 @@
             </a:r>
             <a:endParaRPr lang="es-ES_tradnl" sz="1100" dirty="0">
               <a:solidFill>
-                <a:srgbClr val="7030A0"/>
+                <a:srgbClr val="FF0000"/>
               </a:solidFill>
               <a:latin typeface="Arial" pitchFamily="34" charset="0"/>
               <a:cs typeface="Arial" pitchFamily="34" charset="0"/>

</xml_diff>